<commit_message>
Updated documentation, more of literature review written on shareLatex
</commit_message>
<xml_diff>
--- a/Report/Dissertation/Images/TestSetup1.pptx
+++ b/Report/Dissertation/Images/TestSetup1.pptx
@@ -6,6 +6,7 @@
   </p:sldMasterIdLst>
   <p:sldIdLst>
     <p:sldId id="256" r:id="rId2"/>
+    <p:sldId id="257" r:id="rId3"/>
   </p:sldIdLst>
   <p:sldSz cx="12192000" cy="6858000"/>
   <p:notesSz cx="6858000" cy="9144000"/>
@@ -104,6 +105,11 @@
       </a:defRPr>
     </a:lvl9pPr>
   </p:defaultTextStyle>
+  <p:extLst>
+    <p:ext uri="{EFAFB233-063F-42B5-8137-9DF3F51BA10A}">
+      <p15:sldGuideLst xmlns:p15="http://schemas.microsoft.com/office/powerpoint/2012/main"/>
+    </p:ext>
+  </p:extLst>
 </p:presentation>
 </file>
 
@@ -238,7 +244,7 @@
           <a:p>
             <a:fld id="{89D09D1E-3207-441C-A9AD-878DAAA5462A}" type="datetimeFigureOut">
               <a:rPr lang="en-GB" smtClean="0"/>
-              <a:t>31/07/2018</a:t>
+              <a:t>02/08/2018</a:t>
             </a:fld>
             <a:endParaRPr lang="en-GB"/>
           </a:p>
@@ -408,7 +414,7 @@
           <a:p>
             <a:fld id="{89D09D1E-3207-441C-A9AD-878DAAA5462A}" type="datetimeFigureOut">
               <a:rPr lang="en-GB" smtClean="0"/>
-              <a:t>31/07/2018</a:t>
+              <a:t>02/08/2018</a:t>
             </a:fld>
             <a:endParaRPr lang="en-GB"/>
           </a:p>
@@ -588,7 +594,7 @@
           <a:p>
             <a:fld id="{89D09D1E-3207-441C-A9AD-878DAAA5462A}" type="datetimeFigureOut">
               <a:rPr lang="en-GB" smtClean="0"/>
-              <a:t>31/07/2018</a:t>
+              <a:t>02/08/2018</a:t>
             </a:fld>
             <a:endParaRPr lang="en-GB"/>
           </a:p>
@@ -758,7 +764,7 @@
           <a:p>
             <a:fld id="{89D09D1E-3207-441C-A9AD-878DAAA5462A}" type="datetimeFigureOut">
               <a:rPr lang="en-GB" smtClean="0"/>
-              <a:t>31/07/2018</a:t>
+              <a:t>02/08/2018</a:t>
             </a:fld>
             <a:endParaRPr lang="en-GB"/>
           </a:p>
@@ -1004,7 +1010,7 @@
           <a:p>
             <a:fld id="{89D09D1E-3207-441C-A9AD-878DAAA5462A}" type="datetimeFigureOut">
               <a:rPr lang="en-GB" smtClean="0"/>
-              <a:t>31/07/2018</a:t>
+              <a:t>02/08/2018</a:t>
             </a:fld>
             <a:endParaRPr lang="en-GB"/>
           </a:p>
@@ -1236,7 +1242,7 @@
           <a:p>
             <a:fld id="{89D09D1E-3207-441C-A9AD-878DAAA5462A}" type="datetimeFigureOut">
               <a:rPr lang="en-GB" smtClean="0"/>
-              <a:t>31/07/2018</a:t>
+              <a:t>02/08/2018</a:t>
             </a:fld>
             <a:endParaRPr lang="en-GB"/>
           </a:p>
@@ -1603,7 +1609,7 @@
           <a:p>
             <a:fld id="{89D09D1E-3207-441C-A9AD-878DAAA5462A}" type="datetimeFigureOut">
               <a:rPr lang="en-GB" smtClean="0"/>
-              <a:t>31/07/2018</a:t>
+              <a:t>02/08/2018</a:t>
             </a:fld>
             <a:endParaRPr lang="en-GB"/>
           </a:p>
@@ -1721,7 +1727,7 @@
           <a:p>
             <a:fld id="{89D09D1E-3207-441C-A9AD-878DAAA5462A}" type="datetimeFigureOut">
               <a:rPr lang="en-GB" smtClean="0"/>
-              <a:t>31/07/2018</a:t>
+              <a:t>02/08/2018</a:t>
             </a:fld>
             <a:endParaRPr lang="en-GB"/>
           </a:p>
@@ -1816,7 +1822,7 @@
           <a:p>
             <a:fld id="{89D09D1E-3207-441C-A9AD-878DAAA5462A}" type="datetimeFigureOut">
               <a:rPr lang="en-GB" smtClean="0"/>
-              <a:t>31/07/2018</a:t>
+              <a:t>02/08/2018</a:t>
             </a:fld>
             <a:endParaRPr lang="en-GB"/>
           </a:p>
@@ -2093,7 +2099,7 @@
           <a:p>
             <a:fld id="{89D09D1E-3207-441C-A9AD-878DAAA5462A}" type="datetimeFigureOut">
               <a:rPr lang="en-GB" smtClean="0"/>
-              <a:t>31/07/2018</a:t>
+              <a:t>02/08/2018</a:t>
             </a:fld>
             <a:endParaRPr lang="en-GB"/>
           </a:p>
@@ -2346,7 +2352,7 @@
           <a:p>
             <a:fld id="{89D09D1E-3207-441C-A9AD-878DAAA5462A}" type="datetimeFigureOut">
               <a:rPr lang="en-GB" smtClean="0"/>
-              <a:t>31/07/2018</a:t>
+              <a:t>02/08/2018</a:t>
             </a:fld>
             <a:endParaRPr lang="en-GB"/>
           </a:p>
@@ -2559,7 +2565,7 @@
           <a:p>
             <a:fld id="{89D09D1E-3207-441C-A9AD-878DAAA5462A}" type="datetimeFigureOut">
               <a:rPr lang="en-GB" smtClean="0"/>
-              <a:t>31/07/2018</a:t>
+              <a:t>02/08/2018</a:t>
             </a:fld>
             <a:endParaRPr lang="en-GB"/>
           </a:p>
@@ -3578,6 +3584,208 @@
 </p:sld>
 </file>
 
+<file path=ppt/slides/slide2.xml><?xml version="1.0" encoding="utf-8"?>
+<p:sld xmlns:a="http://schemas.openxmlformats.org/drawingml/2006/main" xmlns:r="http://schemas.openxmlformats.org/officeDocument/2006/relationships" xmlns:p="http://schemas.openxmlformats.org/presentationml/2006/main">
+  <p:cSld>
+    <p:spTree>
+      <p:nvGrpSpPr>
+        <p:cNvPr id="1" name=""/>
+        <p:cNvGrpSpPr/>
+        <p:nvPr/>
+      </p:nvGrpSpPr>
+      <p:grpSpPr>
+        <a:xfrm>
+          <a:off x="0" y="0"/>
+          <a:ext cx="0" cy="0"/>
+          <a:chOff x="0" y="0"/>
+          <a:chExt cx="0" cy="0"/>
+        </a:xfrm>
+      </p:grpSpPr>
+      <p:pic>
+        <p:nvPicPr>
+          <p:cNvPr id="4" name="Picture 3"/>
+          <p:cNvPicPr>
+            <a:picLocks noChangeAspect="1"/>
+          </p:cNvPicPr>
+          <p:nvPr/>
+        </p:nvPicPr>
+        <p:blipFill>
+          <a:blip r:embed="rId2"/>
+          <a:stretch>
+            <a:fillRect/>
+          </a:stretch>
+        </p:blipFill>
+        <p:spPr>
+          <a:xfrm>
+            <a:off x="222250" y="1701799"/>
+            <a:ext cx="4848103" cy="2568575"/>
+          </a:xfrm>
+          <a:prstGeom prst="rect">
+            <a:avLst/>
+          </a:prstGeom>
+        </p:spPr>
+      </p:pic>
+      <p:pic>
+        <p:nvPicPr>
+          <p:cNvPr id="5" name="Picture 4"/>
+          <p:cNvPicPr>
+            <a:picLocks noChangeAspect="1"/>
+          </p:cNvPicPr>
+          <p:nvPr/>
+        </p:nvPicPr>
+        <p:blipFill>
+          <a:blip r:embed="rId3"/>
+          <a:stretch>
+            <a:fillRect/>
+          </a:stretch>
+        </p:blipFill>
+        <p:spPr>
+          <a:xfrm>
+            <a:off x="5129732" y="1701799"/>
+            <a:ext cx="4849200" cy="2568575"/>
+          </a:xfrm>
+          <a:prstGeom prst="rect">
+            <a:avLst/>
+          </a:prstGeom>
+        </p:spPr>
+      </p:pic>
+      <p:sp>
+        <p:nvSpPr>
+          <p:cNvPr id="6" name="TextBox 5"/>
+          <p:cNvSpPr txBox="1"/>
+          <p:nvPr/>
+        </p:nvSpPr>
+        <p:spPr>
+          <a:xfrm>
+            <a:off x="124864" y="1752600"/>
+            <a:ext cx="447675" cy="192360"/>
+          </a:xfrm>
+          <a:prstGeom prst="rect">
+            <a:avLst/>
+          </a:prstGeom>
+          <a:noFill/>
+        </p:spPr>
+        <p:txBody>
+          <a:bodyPr wrap="square" rtlCol="0">
+            <a:spAutoFit/>
+          </a:bodyPr>
+          <a:lstStyle/>
+          <a:p>
+            <a:r>
+              <a:rPr lang="en-GB" sz="650" dirty="0" smtClean="0"/>
+              <a:t>dB</a:t>
+            </a:r>
+            <a:endParaRPr lang="en-GB" sz="650" dirty="0"/>
+          </a:p>
+        </p:txBody>
+      </p:sp>
+      <p:sp>
+        <p:nvSpPr>
+          <p:cNvPr id="7" name="TextBox 6"/>
+          <p:cNvSpPr txBox="1"/>
+          <p:nvPr/>
+        </p:nvSpPr>
+        <p:spPr>
+          <a:xfrm>
+            <a:off x="4996902" y="1752600"/>
+            <a:ext cx="447675" cy="192360"/>
+          </a:xfrm>
+          <a:prstGeom prst="rect">
+            <a:avLst/>
+          </a:prstGeom>
+          <a:noFill/>
+        </p:spPr>
+        <p:txBody>
+          <a:bodyPr wrap="square" rtlCol="0">
+            <a:spAutoFit/>
+          </a:bodyPr>
+          <a:lstStyle/>
+          <a:p>
+            <a:r>
+              <a:rPr lang="en-GB" sz="650" dirty="0" smtClean="0"/>
+              <a:t>dB</a:t>
+            </a:r>
+            <a:endParaRPr lang="en-GB" sz="650" dirty="0"/>
+          </a:p>
+        </p:txBody>
+      </p:sp>
+      <p:sp>
+        <p:nvSpPr>
+          <p:cNvPr id="8" name="TextBox 7"/>
+          <p:cNvSpPr txBox="1"/>
+          <p:nvPr/>
+        </p:nvSpPr>
+        <p:spPr>
+          <a:xfrm>
+            <a:off x="631918" y="1733364"/>
+            <a:ext cx="447675" cy="230832"/>
+          </a:xfrm>
+          <a:prstGeom prst="rect">
+            <a:avLst/>
+          </a:prstGeom>
+          <a:noFill/>
+        </p:spPr>
+        <p:txBody>
+          <a:bodyPr wrap="square" rtlCol="0">
+            <a:spAutoFit/>
+          </a:bodyPr>
+          <a:lstStyle/>
+          <a:p>
+            <a:r>
+              <a:rPr lang="en-GB" sz="900" b="1" dirty="0" smtClean="0"/>
+              <a:t>a)</a:t>
+            </a:r>
+            <a:endParaRPr lang="en-GB" sz="900" b="1" dirty="0"/>
+          </a:p>
+        </p:txBody>
+      </p:sp>
+      <p:sp>
+        <p:nvSpPr>
+          <p:cNvPr id="9" name="TextBox 8"/>
+          <p:cNvSpPr txBox="1"/>
+          <p:nvPr/>
+        </p:nvSpPr>
+        <p:spPr>
+          <a:xfrm>
+            <a:off x="5444577" y="1733364"/>
+            <a:ext cx="447675" cy="230832"/>
+          </a:xfrm>
+          <a:prstGeom prst="rect">
+            <a:avLst/>
+          </a:prstGeom>
+          <a:noFill/>
+        </p:spPr>
+        <p:txBody>
+          <a:bodyPr wrap="square" rtlCol="0">
+            <a:spAutoFit/>
+          </a:bodyPr>
+          <a:lstStyle/>
+          <a:p>
+            <a:r>
+              <a:rPr lang="en-GB" sz="900" b="1" dirty="0"/>
+              <a:t>b</a:t>
+            </a:r>
+            <a:r>
+              <a:rPr lang="en-GB" sz="900" b="1" dirty="0" smtClean="0"/>
+              <a:t>)</a:t>
+            </a:r>
+            <a:endParaRPr lang="en-GB" sz="900" b="1" dirty="0"/>
+          </a:p>
+        </p:txBody>
+      </p:sp>
+    </p:spTree>
+    <p:extLst>
+      <p:ext uri="{BB962C8B-B14F-4D97-AF65-F5344CB8AC3E}">
+        <p14:creationId xmlns:p14="http://schemas.microsoft.com/office/powerpoint/2010/main" val="1604030590"/>
+      </p:ext>
+    </p:extLst>
+  </p:cSld>
+  <p:clrMapOvr>
+    <a:masterClrMapping/>
+  </p:clrMapOvr>
+</p:sld>
+</file>
+
 <file path=ppt/theme/theme1.xml><?xml version="1.0" encoding="utf-8"?>
 <a:theme xmlns:a="http://schemas.openxmlformats.org/drawingml/2006/main" name="Office Theme">
   <a:themeElements>

</xml_diff>

<commit_message>
Got graph showing correct processing of time data to frequency domain
</commit_message>
<xml_diff>
--- a/Report/Dissertation/Images/TestSetup1.pptx
+++ b/Report/Dissertation/Images/TestSetup1.pptx
@@ -7,6 +7,7 @@
   <p:sldIdLst>
     <p:sldId id="256" r:id="rId2"/>
     <p:sldId id="257" r:id="rId3"/>
+    <p:sldId id="258" r:id="rId4"/>
   </p:sldIdLst>
   <p:sldSz cx="12192000" cy="6858000"/>
   <p:notesSz cx="6858000" cy="9144000"/>
@@ -244,7 +245,7 @@
           <a:p>
             <a:fld id="{89D09D1E-3207-441C-A9AD-878DAAA5462A}" type="datetimeFigureOut">
               <a:rPr lang="en-GB" smtClean="0"/>
-              <a:t>02/08/2018</a:t>
+              <a:t>07/08/2018</a:t>
             </a:fld>
             <a:endParaRPr lang="en-GB"/>
           </a:p>
@@ -414,7 +415,7 @@
           <a:p>
             <a:fld id="{89D09D1E-3207-441C-A9AD-878DAAA5462A}" type="datetimeFigureOut">
               <a:rPr lang="en-GB" smtClean="0"/>
-              <a:t>02/08/2018</a:t>
+              <a:t>07/08/2018</a:t>
             </a:fld>
             <a:endParaRPr lang="en-GB"/>
           </a:p>
@@ -594,7 +595,7 @@
           <a:p>
             <a:fld id="{89D09D1E-3207-441C-A9AD-878DAAA5462A}" type="datetimeFigureOut">
               <a:rPr lang="en-GB" smtClean="0"/>
-              <a:t>02/08/2018</a:t>
+              <a:t>07/08/2018</a:t>
             </a:fld>
             <a:endParaRPr lang="en-GB"/>
           </a:p>
@@ -764,7 +765,7 @@
           <a:p>
             <a:fld id="{89D09D1E-3207-441C-A9AD-878DAAA5462A}" type="datetimeFigureOut">
               <a:rPr lang="en-GB" smtClean="0"/>
-              <a:t>02/08/2018</a:t>
+              <a:t>07/08/2018</a:t>
             </a:fld>
             <a:endParaRPr lang="en-GB"/>
           </a:p>
@@ -1010,7 +1011,7 @@
           <a:p>
             <a:fld id="{89D09D1E-3207-441C-A9AD-878DAAA5462A}" type="datetimeFigureOut">
               <a:rPr lang="en-GB" smtClean="0"/>
-              <a:t>02/08/2018</a:t>
+              <a:t>07/08/2018</a:t>
             </a:fld>
             <a:endParaRPr lang="en-GB"/>
           </a:p>
@@ -1242,7 +1243,7 @@
           <a:p>
             <a:fld id="{89D09D1E-3207-441C-A9AD-878DAAA5462A}" type="datetimeFigureOut">
               <a:rPr lang="en-GB" smtClean="0"/>
-              <a:t>02/08/2018</a:t>
+              <a:t>07/08/2018</a:t>
             </a:fld>
             <a:endParaRPr lang="en-GB"/>
           </a:p>
@@ -1609,7 +1610,7 @@
           <a:p>
             <a:fld id="{89D09D1E-3207-441C-A9AD-878DAAA5462A}" type="datetimeFigureOut">
               <a:rPr lang="en-GB" smtClean="0"/>
-              <a:t>02/08/2018</a:t>
+              <a:t>07/08/2018</a:t>
             </a:fld>
             <a:endParaRPr lang="en-GB"/>
           </a:p>
@@ -1727,7 +1728,7 @@
           <a:p>
             <a:fld id="{89D09D1E-3207-441C-A9AD-878DAAA5462A}" type="datetimeFigureOut">
               <a:rPr lang="en-GB" smtClean="0"/>
-              <a:t>02/08/2018</a:t>
+              <a:t>07/08/2018</a:t>
             </a:fld>
             <a:endParaRPr lang="en-GB"/>
           </a:p>
@@ -1822,7 +1823,7 @@
           <a:p>
             <a:fld id="{89D09D1E-3207-441C-A9AD-878DAAA5462A}" type="datetimeFigureOut">
               <a:rPr lang="en-GB" smtClean="0"/>
-              <a:t>02/08/2018</a:t>
+              <a:t>07/08/2018</a:t>
             </a:fld>
             <a:endParaRPr lang="en-GB"/>
           </a:p>
@@ -2099,7 +2100,7 @@
           <a:p>
             <a:fld id="{89D09D1E-3207-441C-A9AD-878DAAA5462A}" type="datetimeFigureOut">
               <a:rPr lang="en-GB" smtClean="0"/>
-              <a:t>02/08/2018</a:t>
+              <a:t>07/08/2018</a:t>
             </a:fld>
             <a:endParaRPr lang="en-GB"/>
           </a:p>
@@ -2352,7 +2353,7 @@
           <a:p>
             <a:fld id="{89D09D1E-3207-441C-A9AD-878DAAA5462A}" type="datetimeFigureOut">
               <a:rPr lang="en-GB" smtClean="0"/>
-              <a:t>02/08/2018</a:t>
+              <a:t>07/08/2018</a:t>
             </a:fld>
             <a:endParaRPr lang="en-GB"/>
           </a:p>
@@ -2565,7 +2566,7 @@
           <a:p>
             <a:fld id="{89D09D1E-3207-441C-A9AD-878DAAA5462A}" type="datetimeFigureOut">
               <a:rPr lang="en-GB" smtClean="0"/>
-              <a:t>02/08/2018</a:t>
+              <a:t>07/08/2018</a:t>
             </a:fld>
             <a:endParaRPr lang="en-GB"/>
           </a:p>
@@ -3786,6 +3787,153 @@
 </p:sld>
 </file>
 
+<file path=ppt/slides/slide3.xml><?xml version="1.0" encoding="utf-8"?>
+<p:sld xmlns:a="http://schemas.openxmlformats.org/drawingml/2006/main" xmlns:r="http://schemas.openxmlformats.org/officeDocument/2006/relationships" xmlns:p="http://schemas.openxmlformats.org/presentationml/2006/main">
+  <p:cSld>
+    <p:spTree>
+      <p:nvGrpSpPr>
+        <p:cNvPr id="1" name=""/>
+        <p:cNvGrpSpPr/>
+        <p:nvPr/>
+      </p:nvGrpSpPr>
+      <p:grpSpPr>
+        <a:xfrm>
+          <a:off x="0" y="0"/>
+          <a:ext cx="0" cy="0"/>
+          <a:chOff x="0" y="0"/>
+          <a:chExt cx="0" cy="0"/>
+        </a:xfrm>
+      </p:grpSpPr>
+      <p:pic>
+        <p:nvPicPr>
+          <p:cNvPr id="4" name="Picture 3"/>
+          <p:cNvPicPr>
+            <a:picLocks noChangeAspect="1"/>
+          </p:cNvPicPr>
+          <p:nvPr/>
+        </p:nvPicPr>
+        <p:blipFill>
+          <a:blip r:embed="rId2"/>
+          <a:stretch>
+            <a:fillRect/>
+          </a:stretch>
+        </p:blipFill>
+        <p:spPr>
+          <a:xfrm>
+            <a:off x="2125436" y="3488363"/>
+            <a:ext cx="7599136" cy="3369637"/>
+          </a:xfrm>
+          <a:prstGeom prst="rect">
+            <a:avLst/>
+          </a:prstGeom>
+        </p:spPr>
+      </p:pic>
+      <p:pic>
+        <p:nvPicPr>
+          <p:cNvPr id="6" name="Picture 5"/>
+          <p:cNvPicPr>
+            <a:picLocks noChangeAspect="1"/>
+          </p:cNvPicPr>
+          <p:nvPr/>
+        </p:nvPicPr>
+        <p:blipFill rotWithShape="1">
+          <a:blip r:embed="rId3" cstate="print">
+            <a:extLst>
+              <a:ext uri="{28A0092B-C50C-407E-A947-70E740481C1C}">
+                <a14:useLocalDpi xmlns:a14="http://schemas.microsoft.com/office/drawing/2010/main" val="0"/>
+              </a:ext>
+            </a:extLst>
+          </a:blip>
+          <a:srcRect b="13837"/>
+          <a:stretch/>
+        </p:blipFill>
+        <p:spPr>
+          <a:xfrm>
+            <a:off x="2658609" y="272228"/>
+            <a:ext cx="6532789" cy="3131334"/>
+          </a:xfrm>
+          <a:prstGeom prst="rect">
+            <a:avLst/>
+          </a:prstGeom>
+        </p:spPr>
+      </p:pic>
+      <p:sp>
+        <p:nvSpPr>
+          <p:cNvPr id="7" name="TextBox 6"/>
+          <p:cNvSpPr txBox="1"/>
+          <p:nvPr/>
+        </p:nvSpPr>
+        <p:spPr>
+          <a:xfrm>
+            <a:off x="2213037" y="391886"/>
+            <a:ext cx="445572" cy="400110"/>
+          </a:xfrm>
+          <a:prstGeom prst="rect">
+            <a:avLst/>
+          </a:prstGeom>
+          <a:noFill/>
+        </p:spPr>
+        <p:txBody>
+          <a:bodyPr wrap="square" rtlCol="0">
+            <a:spAutoFit/>
+          </a:bodyPr>
+          <a:lstStyle/>
+          <a:p>
+            <a:r>
+              <a:rPr lang="en-GB" sz="2000" b="1" dirty="0" smtClean="0"/>
+              <a:t>a)</a:t>
+            </a:r>
+            <a:endParaRPr lang="en-GB" sz="2000" b="1" dirty="0"/>
+          </a:p>
+        </p:txBody>
+      </p:sp>
+      <p:sp>
+        <p:nvSpPr>
+          <p:cNvPr id="8" name="TextBox 7"/>
+          <p:cNvSpPr txBox="1"/>
+          <p:nvPr/>
+        </p:nvSpPr>
+        <p:spPr>
+          <a:xfrm>
+            <a:off x="2213037" y="3488363"/>
+            <a:ext cx="445572" cy="400110"/>
+          </a:xfrm>
+          <a:prstGeom prst="rect">
+            <a:avLst/>
+          </a:prstGeom>
+          <a:noFill/>
+        </p:spPr>
+        <p:txBody>
+          <a:bodyPr wrap="square" rtlCol="0">
+            <a:spAutoFit/>
+          </a:bodyPr>
+          <a:lstStyle/>
+          <a:p>
+            <a:r>
+              <a:rPr lang="en-GB" sz="2000" b="1" dirty="0"/>
+              <a:t>b</a:t>
+            </a:r>
+            <a:r>
+              <a:rPr lang="en-GB" sz="2000" b="1" dirty="0" smtClean="0"/>
+              <a:t>)</a:t>
+            </a:r>
+            <a:endParaRPr lang="en-GB" sz="2000" b="1" dirty="0"/>
+          </a:p>
+        </p:txBody>
+      </p:sp>
+    </p:spTree>
+    <p:extLst>
+      <p:ext uri="{BB962C8B-B14F-4D97-AF65-F5344CB8AC3E}">
+        <p14:creationId xmlns:p14="http://schemas.microsoft.com/office/powerpoint/2010/main" val="1384766579"/>
+      </p:ext>
+    </p:extLst>
+  </p:cSld>
+  <p:clrMapOvr>
+    <a:masterClrMapping/>
+  </p:clrMapOvr>
+</p:sld>
+</file>
+
 <file path=ppt/theme/theme1.xml><?xml version="1.0" encoding="utf-8"?>
 <a:theme xmlns:a="http://schemas.openxmlformats.org/drawingml/2006/main" name="Office Theme">
   <a:themeElements>

</xml_diff>

<commit_message>
Further processing of test rig data
</commit_message>
<xml_diff>
--- a/Report/Dissertation/Images/TestSetup1.pptx
+++ b/Report/Dissertation/Images/TestSetup1.pptx
@@ -8,6 +8,7 @@
     <p:sldId id="256" r:id="rId2"/>
     <p:sldId id="257" r:id="rId3"/>
     <p:sldId id="258" r:id="rId4"/>
+    <p:sldId id="259" r:id="rId5"/>
   </p:sldIdLst>
   <p:sldSz cx="12192000" cy="6858000"/>
   <p:notesSz cx="6858000" cy="9144000"/>
@@ -245,7 +246,7 @@
           <a:p>
             <a:fld id="{89D09D1E-3207-441C-A9AD-878DAAA5462A}" type="datetimeFigureOut">
               <a:rPr lang="en-GB" smtClean="0"/>
-              <a:t>07/08/2018</a:t>
+              <a:t>09/08/2018</a:t>
             </a:fld>
             <a:endParaRPr lang="en-GB"/>
           </a:p>
@@ -415,7 +416,7 @@
           <a:p>
             <a:fld id="{89D09D1E-3207-441C-A9AD-878DAAA5462A}" type="datetimeFigureOut">
               <a:rPr lang="en-GB" smtClean="0"/>
-              <a:t>07/08/2018</a:t>
+              <a:t>09/08/2018</a:t>
             </a:fld>
             <a:endParaRPr lang="en-GB"/>
           </a:p>
@@ -595,7 +596,7 @@
           <a:p>
             <a:fld id="{89D09D1E-3207-441C-A9AD-878DAAA5462A}" type="datetimeFigureOut">
               <a:rPr lang="en-GB" smtClean="0"/>
-              <a:t>07/08/2018</a:t>
+              <a:t>09/08/2018</a:t>
             </a:fld>
             <a:endParaRPr lang="en-GB"/>
           </a:p>
@@ -765,7 +766,7 @@
           <a:p>
             <a:fld id="{89D09D1E-3207-441C-A9AD-878DAAA5462A}" type="datetimeFigureOut">
               <a:rPr lang="en-GB" smtClean="0"/>
-              <a:t>07/08/2018</a:t>
+              <a:t>09/08/2018</a:t>
             </a:fld>
             <a:endParaRPr lang="en-GB"/>
           </a:p>
@@ -1011,7 +1012,7 @@
           <a:p>
             <a:fld id="{89D09D1E-3207-441C-A9AD-878DAAA5462A}" type="datetimeFigureOut">
               <a:rPr lang="en-GB" smtClean="0"/>
-              <a:t>07/08/2018</a:t>
+              <a:t>09/08/2018</a:t>
             </a:fld>
             <a:endParaRPr lang="en-GB"/>
           </a:p>
@@ -1243,7 +1244,7 @@
           <a:p>
             <a:fld id="{89D09D1E-3207-441C-A9AD-878DAAA5462A}" type="datetimeFigureOut">
               <a:rPr lang="en-GB" smtClean="0"/>
-              <a:t>07/08/2018</a:t>
+              <a:t>09/08/2018</a:t>
             </a:fld>
             <a:endParaRPr lang="en-GB"/>
           </a:p>
@@ -1610,7 +1611,7 @@
           <a:p>
             <a:fld id="{89D09D1E-3207-441C-A9AD-878DAAA5462A}" type="datetimeFigureOut">
               <a:rPr lang="en-GB" smtClean="0"/>
-              <a:t>07/08/2018</a:t>
+              <a:t>09/08/2018</a:t>
             </a:fld>
             <a:endParaRPr lang="en-GB"/>
           </a:p>
@@ -1728,7 +1729,7 @@
           <a:p>
             <a:fld id="{89D09D1E-3207-441C-A9AD-878DAAA5462A}" type="datetimeFigureOut">
               <a:rPr lang="en-GB" smtClean="0"/>
-              <a:t>07/08/2018</a:t>
+              <a:t>09/08/2018</a:t>
             </a:fld>
             <a:endParaRPr lang="en-GB"/>
           </a:p>
@@ -1823,7 +1824,7 @@
           <a:p>
             <a:fld id="{89D09D1E-3207-441C-A9AD-878DAAA5462A}" type="datetimeFigureOut">
               <a:rPr lang="en-GB" smtClean="0"/>
-              <a:t>07/08/2018</a:t>
+              <a:t>09/08/2018</a:t>
             </a:fld>
             <a:endParaRPr lang="en-GB"/>
           </a:p>
@@ -2100,7 +2101,7 @@
           <a:p>
             <a:fld id="{89D09D1E-3207-441C-A9AD-878DAAA5462A}" type="datetimeFigureOut">
               <a:rPr lang="en-GB" smtClean="0"/>
-              <a:t>07/08/2018</a:t>
+              <a:t>09/08/2018</a:t>
             </a:fld>
             <a:endParaRPr lang="en-GB"/>
           </a:p>
@@ -2353,7 +2354,7 @@
           <a:p>
             <a:fld id="{89D09D1E-3207-441C-A9AD-878DAAA5462A}" type="datetimeFigureOut">
               <a:rPr lang="en-GB" smtClean="0"/>
-              <a:t>07/08/2018</a:t>
+              <a:t>09/08/2018</a:t>
             </a:fld>
             <a:endParaRPr lang="en-GB"/>
           </a:p>
@@ -2566,7 +2567,7 @@
           <a:p>
             <a:fld id="{89D09D1E-3207-441C-A9AD-878DAAA5462A}" type="datetimeFigureOut">
               <a:rPr lang="en-GB" smtClean="0"/>
-              <a:t>07/08/2018</a:t>
+              <a:t>09/08/2018</a:t>
             </a:fld>
             <a:endParaRPr lang="en-GB"/>
           </a:p>
@@ -3921,6 +3922,162 @@
           </a:p>
         </p:txBody>
       </p:sp>
+      <p:sp>
+        <p:nvSpPr>
+          <p:cNvPr id="2" name="TextBox 1"/>
+          <p:cNvSpPr txBox="1"/>
+          <p:nvPr/>
+        </p:nvSpPr>
+        <p:spPr>
+          <a:xfrm>
+            <a:off x="4818435" y="3836184"/>
+            <a:ext cx="621244" cy="184666"/>
+          </a:xfrm>
+          <a:prstGeom prst="rect">
+            <a:avLst/>
+          </a:prstGeom>
+          <a:solidFill>
+            <a:schemeClr val="bg1"/>
+          </a:solidFill>
+        </p:spPr>
+        <p:txBody>
+          <a:bodyPr wrap="square" lIns="0" tIns="0" rIns="0" bIns="0" rtlCol="0">
+            <a:spAutoFit/>
+          </a:bodyPr>
+          <a:lstStyle/>
+          <a:p>
+            <a:pPr algn="ctr"/>
+            <a:r>
+              <a:rPr lang="en-GB" sz="1200" dirty="0" smtClean="0">
+                <a:latin typeface="Times New Roman" panose="02020603050405020304" pitchFamily="18" charset="0"/>
+                <a:cs typeface="Times New Roman" panose="02020603050405020304" pitchFamily="18" charset="0"/>
+              </a:rPr>
+              <a:t>Bearing 3</a:t>
+            </a:r>
+            <a:endParaRPr lang="en-GB" sz="1200" dirty="0">
+              <a:latin typeface="Times New Roman" panose="02020603050405020304" pitchFamily="18" charset="0"/>
+              <a:cs typeface="Times New Roman" panose="02020603050405020304" pitchFamily="18" charset="0"/>
+            </a:endParaRPr>
+          </a:p>
+        </p:txBody>
+      </p:sp>
+      <p:sp>
+        <p:nvSpPr>
+          <p:cNvPr id="9" name="TextBox 8"/>
+          <p:cNvSpPr txBox="1"/>
+          <p:nvPr/>
+        </p:nvSpPr>
+        <p:spPr>
+          <a:xfrm>
+            <a:off x="5601846" y="5590453"/>
+            <a:ext cx="713054" cy="184666"/>
+          </a:xfrm>
+          <a:prstGeom prst="rect">
+            <a:avLst/>
+          </a:prstGeom>
+          <a:solidFill>
+            <a:schemeClr val="bg1"/>
+          </a:solidFill>
+        </p:spPr>
+        <p:txBody>
+          <a:bodyPr wrap="square" lIns="0" tIns="0" rIns="0" bIns="0" rtlCol="0">
+            <a:spAutoFit/>
+          </a:bodyPr>
+          <a:lstStyle/>
+          <a:p>
+            <a:pPr algn="ctr"/>
+            <a:r>
+              <a:rPr lang="en-GB" sz="1200" dirty="0" smtClean="0">
+                <a:latin typeface="Times New Roman" panose="02020603050405020304" pitchFamily="18" charset="0"/>
+                <a:cs typeface="Times New Roman" panose="02020603050405020304" pitchFamily="18" charset="0"/>
+              </a:rPr>
+              <a:t>Vibration 3</a:t>
+            </a:r>
+            <a:endParaRPr lang="en-GB" sz="1200" dirty="0">
+              <a:latin typeface="Times New Roman" panose="02020603050405020304" pitchFamily="18" charset="0"/>
+              <a:cs typeface="Times New Roman" panose="02020603050405020304" pitchFamily="18" charset="0"/>
+            </a:endParaRPr>
+          </a:p>
+        </p:txBody>
+      </p:sp>
+      <p:sp>
+        <p:nvSpPr>
+          <p:cNvPr id="13" name="TextBox 12"/>
+          <p:cNvSpPr txBox="1"/>
+          <p:nvPr/>
+        </p:nvSpPr>
+        <p:spPr>
+          <a:xfrm>
+            <a:off x="8001039" y="3776118"/>
+            <a:ext cx="621244" cy="184666"/>
+          </a:xfrm>
+          <a:prstGeom prst="rect">
+            <a:avLst/>
+          </a:prstGeom>
+          <a:solidFill>
+            <a:schemeClr val="bg1"/>
+          </a:solidFill>
+        </p:spPr>
+        <p:txBody>
+          <a:bodyPr wrap="square" lIns="0" tIns="0" rIns="0" bIns="0" rtlCol="0">
+            <a:spAutoFit/>
+          </a:bodyPr>
+          <a:lstStyle/>
+          <a:p>
+            <a:pPr algn="ctr"/>
+            <a:r>
+              <a:rPr lang="en-GB" sz="1200" dirty="0" smtClean="0">
+                <a:latin typeface="Times New Roman" panose="02020603050405020304" pitchFamily="18" charset="0"/>
+                <a:cs typeface="Times New Roman" panose="02020603050405020304" pitchFamily="18" charset="0"/>
+              </a:rPr>
+              <a:t>Bearing 1</a:t>
+            </a:r>
+            <a:endParaRPr lang="en-GB" sz="1200" dirty="0">
+              <a:latin typeface="Times New Roman" panose="02020603050405020304" pitchFamily="18" charset="0"/>
+              <a:cs typeface="Times New Roman" panose="02020603050405020304" pitchFamily="18" charset="0"/>
+            </a:endParaRPr>
+          </a:p>
+        </p:txBody>
+      </p:sp>
+      <p:sp>
+        <p:nvSpPr>
+          <p:cNvPr id="14" name="TextBox 13"/>
+          <p:cNvSpPr txBox="1"/>
+          <p:nvPr/>
+        </p:nvSpPr>
+        <p:spPr>
+          <a:xfrm>
+            <a:off x="8831168" y="5563757"/>
+            <a:ext cx="713054" cy="184666"/>
+          </a:xfrm>
+          <a:prstGeom prst="rect">
+            <a:avLst/>
+          </a:prstGeom>
+          <a:solidFill>
+            <a:schemeClr val="bg1"/>
+          </a:solidFill>
+        </p:spPr>
+        <p:txBody>
+          <a:bodyPr wrap="square" lIns="0" tIns="0" rIns="0" bIns="0" rtlCol="0">
+            <a:spAutoFit/>
+          </a:bodyPr>
+          <a:lstStyle/>
+          <a:p>
+            <a:pPr algn="ctr"/>
+            <a:r>
+              <a:rPr lang="en-GB" sz="1200" dirty="0" smtClean="0">
+                <a:latin typeface="Times New Roman" panose="02020603050405020304" pitchFamily="18" charset="0"/>
+                <a:cs typeface="Times New Roman" panose="02020603050405020304" pitchFamily="18" charset="0"/>
+              </a:rPr>
+              <a:t>Vibration 1</a:t>
+            </a:r>
+            <a:endParaRPr lang="en-GB" sz="1200" dirty="0">
+              <a:latin typeface="Times New Roman" panose="02020603050405020304" pitchFamily="18" charset="0"/>
+              <a:cs typeface="Times New Roman" panose="02020603050405020304" pitchFamily="18" charset="0"/>
+            </a:endParaRPr>
+          </a:p>
+        </p:txBody>
+      </p:sp>
     </p:spTree>
     <p:extLst>
       <p:ext uri="{BB962C8B-B14F-4D97-AF65-F5344CB8AC3E}">
@@ -3931,6 +4088,836 @@
   <p:clrMapOvr>
     <a:masterClrMapping/>
   </p:clrMapOvr>
+  <p:timing>
+    <p:tnLst>
+      <p:par>
+        <p:cTn id="1" dur="indefinite" restart="never" nodeType="tmRoot"/>
+      </p:par>
+    </p:tnLst>
+  </p:timing>
+</p:sld>
+</file>
+
+<file path=ppt/slides/slide4.xml><?xml version="1.0" encoding="utf-8"?>
+<p:sld xmlns:a="http://schemas.openxmlformats.org/drawingml/2006/main" xmlns:r="http://schemas.openxmlformats.org/officeDocument/2006/relationships" xmlns:p="http://schemas.openxmlformats.org/presentationml/2006/main">
+  <p:cSld>
+    <p:spTree>
+      <p:nvGrpSpPr>
+        <p:cNvPr id="1" name=""/>
+        <p:cNvGrpSpPr/>
+        <p:nvPr/>
+      </p:nvGrpSpPr>
+      <p:grpSpPr>
+        <a:xfrm>
+          <a:off x="0" y="0"/>
+          <a:ext cx="0" cy="0"/>
+          <a:chOff x="0" y="0"/>
+          <a:chExt cx="0" cy="0"/>
+        </a:xfrm>
+      </p:grpSpPr>
+      <p:pic>
+        <p:nvPicPr>
+          <p:cNvPr id="4" name="Picture 3"/>
+          <p:cNvPicPr>
+            <a:picLocks noChangeAspect="1"/>
+          </p:cNvPicPr>
+          <p:nvPr/>
+        </p:nvPicPr>
+        <p:blipFill>
+          <a:blip r:embed="rId2">
+            <a:extLst>
+              <a:ext uri="{28A0092B-C50C-407E-A947-70E740481C1C}">
+                <a14:useLocalDpi xmlns:a14="http://schemas.microsoft.com/office/drawing/2010/main" val="0"/>
+              </a:ext>
+            </a:extLst>
+          </a:blip>
+          <a:stretch>
+            <a:fillRect/>
+          </a:stretch>
+        </p:blipFill>
+        <p:spPr>
+          <a:xfrm>
+            <a:off x="12899" y="0"/>
+            <a:ext cx="12192000" cy="6705600"/>
+          </a:xfrm>
+          <a:prstGeom prst="rect">
+            <a:avLst/>
+          </a:prstGeom>
+        </p:spPr>
+      </p:pic>
+      <p:sp>
+        <p:nvSpPr>
+          <p:cNvPr id="5" name="TextBox 4"/>
+          <p:cNvSpPr txBox="1"/>
+          <p:nvPr/>
+        </p:nvSpPr>
+        <p:spPr>
+          <a:xfrm>
+            <a:off x="755650" y="234950"/>
+            <a:ext cx="1047750" cy="369332"/>
+          </a:xfrm>
+          <a:prstGeom prst="rect">
+            <a:avLst/>
+          </a:prstGeom>
+          <a:noFill/>
+        </p:spPr>
+        <p:txBody>
+          <a:bodyPr wrap="square" rtlCol="0">
+            <a:spAutoFit/>
+          </a:bodyPr>
+          <a:lstStyle/>
+          <a:p>
+            <a:r>
+              <a:rPr lang="en-GB" dirty="0" smtClean="0"/>
+              <a:t>f</a:t>
+            </a:r>
+            <a:r>
+              <a:rPr lang="en-GB" baseline="-25000" dirty="0" smtClean="0"/>
+              <a:t>r</a:t>
+            </a:r>
+            <a:endParaRPr lang="en-GB" baseline="-25000" dirty="0"/>
+          </a:p>
+        </p:txBody>
+      </p:sp>
+      <p:cxnSp>
+        <p:nvCxnSpPr>
+          <p:cNvPr id="7" name="Straight Arrow Connector 6"/>
+          <p:cNvCxnSpPr/>
+          <p:nvPr/>
+        </p:nvCxnSpPr>
+        <p:spPr>
+          <a:xfrm flipH="1">
+            <a:off x="704850" y="495300"/>
+            <a:ext cx="139700" cy="88900"/>
+          </a:xfrm>
+          <a:prstGeom prst="straightConnector1">
+            <a:avLst/>
+          </a:prstGeom>
+          <a:ln>
+            <a:solidFill>
+              <a:schemeClr val="tx1"/>
+            </a:solidFill>
+            <a:tailEnd type="triangle"/>
+          </a:ln>
+        </p:spPr>
+        <p:style>
+          <a:lnRef idx="1">
+            <a:schemeClr val="accent1"/>
+          </a:lnRef>
+          <a:fillRef idx="0">
+            <a:schemeClr val="accent1"/>
+          </a:fillRef>
+          <a:effectRef idx="0">
+            <a:schemeClr val="accent1"/>
+          </a:effectRef>
+          <a:fontRef idx="minor">
+            <a:schemeClr val="tx1"/>
+          </a:fontRef>
+        </p:style>
+      </p:cxnSp>
+      <p:cxnSp>
+        <p:nvCxnSpPr>
+          <p:cNvPr id="10" name="Straight Arrow Connector 9"/>
+          <p:cNvCxnSpPr/>
+          <p:nvPr/>
+        </p:nvCxnSpPr>
+        <p:spPr>
+          <a:xfrm>
+            <a:off x="651470" y="2707574"/>
+            <a:ext cx="8930" cy="1089726"/>
+          </a:xfrm>
+          <a:prstGeom prst="straightConnector1">
+            <a:avLst/>
+          </a:prstGeom>
+          <a:ln>
+            <a:solidFill>
+              <a:schemeClr val="tx1"/>
+            </a:solidFill>
+            <a:tailEnd type="triangle"/>
+          </a:ln>
+        </p:spPr>
+        <p:style>
+          <a:lnRef idx="1">
+            <a:schemeClr val="accent1"/>
+          </a:lnRef>
+          <a:fillRef idx="0">
+            <a:schemeClr val="accent1"/>
+          </a:fillRef>
+          <a:effectRef idx="0">
+            <a:schemeClr val="accent1"/>
+          </a:effectRef>
+          <a:fontRef idx="minor">
+            <a:schemeClr val="tx1"/>
+          </a:fontRef>
+        </p:style>
+      </p:cxnSp>
+      <p:sp>
+        <p:nvSpPr>
+          <p:cNvPr id="11" name="TextBox 10"/>
+          <p:cNvSpPr txBox="1"/>
+          <p:nvPr/>
+        </p:nvSpPr>
+        <p:spPr>
+          <a:xfrm>
+            <a:off x="844550" y="4368800"/>
+            <a:ext cx="2495550" cy="369332"/>
+          </a:xfrm>
+          <a:prstGeom prst="rect">
+            <a:avLst/>
+          </a:prstGeom>
+          <a:noFill/>
+        </p:spPr>
+        <p:txBody>
+          <a:bodyPr wrap="square" rtlCol="0">
+            <a:spAutoFit/>
+          </a:bodyPr>
+          <a:lstStyle/>
+          <a:p>
+            <a:r>
+              <a:rPr lang="en-GB" dirty="0" smtClean="0"/>
+              <a:t>f</a:t>
+            </a:r>
+            <a:r>
+              <a:rPr lang="en-GB" baseline="-25000" dirty="0" smtClean="0"/>
+              <a:t>r </a:t>
+            </a:r>
+            <a:r>
+              <a:rPr lang="en-GB" dirty="0"/>
+              <a:t> </a:t>
+            </a:r>
+            <a:r>
+              <a:rPr lang="en-GB" sz="1400" dirty="0" smtClean="0"/>
+              <a:t>with increased magnitude</a:t>
+            </a:r>
+            <a:endParaRPr lang="en-GB" sz="1400" baseline="-25000" dirty="0"/>
+          </a:p>
+        </p:txBody>
+      </p:sp>
+      <p:cxnSp>
+        <p:nvCxnSpPr>
+          <p:cNvPr id="12" name="Straight Arrow Connector 11"/>
+          <p:cNvCxnSpPr>
+            <a:stCxn id="11" idx="1"/>
+          </p:cNvCxnSpPr>
+          <p:nvPr/>
+        </p:nvCxnSpPr>
+        <p:spPr>
+          <a:xfrm flipH="1">
+            <a:off x="711200" y="4553466"/>
+            <a:ext cx="133350" cy="4"/>
+          </a:xfrm>
+          <a:prstGeom prst="straightConnector1">
+            <a:avLst/>
+          </a:prstGeom>
+          <a:ln>
+            <a:solidFill>
+              <a:schemeClr val="tx1"/>
+            </a:solidFill>
+            <a:tailEnd type="triangle"/>
+          </a:ln>
+        </p:spPr>
+        <p:style>
+          <a:lnRef idx="1">
+            <a:schemeClr val="accent1"/>
+          </a:lnRef>
+          <a:fillRef idx="0">
+            <a:schemeClr val="accent1"/>
+          </a:fillRef>
+          <a:effectRef idx="0">
+            <a:schemeClr val="accent1"/>
+          </a:effectRef>
+          <a:fontRef idx="minor">
+            <a:schemeClr val="tx1"/>
+          </a:fontRef>
+        </p:style>
+      </p:cxnSp>
+      <p:sp>
+        <p:nvSpPr>
+          <p:cNvPr id="18" name="TextBox 17"/>
+          <p:cNvSpPr txBox="1"/>
+          <p:nvPr/>
+        </p:nvSpPr>
+        <p:spPr>
+          <a:xfrm>
+            <a:off x="686594" y="2964468"/>
+            <a:ext cx="1804194" cy="523220"/>
+          </a:xfrm>
+          <a:prstGeom prst="rect">
+            <a:avLst/>
+          </a:prstGeom>
+          <a:noFill/>
+        </p:spPr>
+        <p:txBody>
+          <a:bodyPr wrap="square" rtlCol="0">
+            <a:spAutoFit/>
+          </a:bodyPr>
+          <a:lstStyle/>
+          <a:p>
+            <a:r>
+              <a:rPr lang="en-GB" sz="1400" dirty="0" smtClean="0"/>
+              <a:t>Increasing harmonics indicating bending</a:t>
+            </a:r>
+            <a:endParaRPr lang="en-GB" baseline="-25000" dirty="0"/>
+          </a:p>
+        </p:txBody>
+      </p:sp>
+      <p:cxnSp>
+        <p:nvCxnSpPr>
+          <p:cNvPr id="19" name="Straight Arrow Connector 18"/>
+          <p:cNvCxnSpPr/>
+          <p:nvPr/>
+        </p:nvCxnSpPr>
+        <p:spPr>
+          <a:xfrm flipH="1">
+            <a:off x="866776" y="3455194"/>
+            <a:ext cx="107155" cy="250031"/>
+          </a:xfrm>
+          <a:prstGeom prst="straightConnector1">
+            <a:avLst/>
+          </a:prstGeom>
+          <a:ln>
+            <a:solidFill>
+              <a:schemeClr val="tx1"/>
+            </a:solidFill>
+            <a:tailEnd type="triangle"/>
+          </a:ln>
+        </p:spPr>
+        <p:style>
+          <a:lnRef idx="1">
+            <a:schemeClr val="accent1"/>
+          </a:lnRef>
+          <a:fillRef idx="0">
+            <a:schemeClr val="accent1"/>
+          </a:fillRef>
+          <a:effectRef idx="0">
+            <a:schemeClr val="accent1"/>
+          </a:effectRef>
+          <a:fontRef idx="minor">
+            <a:schemeClr val="tx1"/>
+          </a:fontRef>
+        </p:style>
+      </p:cxnSp>
+      <p:cxnSp>
+        <p:nvCxnSpPr>
+          <p:cNvPr id="23" name="Straight Arrow Connector 22"/>
+          <p:cNvCxnSpPr/>
+          <p:nvPr/>
+        </p:nvCxnSpPr>
+        <p:spPr>
+          <a:xfrm flipH="1">
+            <a:off x="1042593" y="3451577"/>
+            <a:ext cx="31549" cy="211440"/>
+          </a:xfrm>
+          <a:prstGeom prst="straightConnector1">
+            <a:avLst/>
+          </a:prstGeom>
+          <a:ln>
+            <a:solidFill>
+              <a:schemeClr val="tx1"/>
+            </a:solidFill>
+            <a:tailEnd type="triangle"/>
+          </a:ln>
+        </p:spPr>
+        <p:style>
+          <a:lnRef idx="1">
+            <a:schemeClr val="accent1"/>
+          </a:lnRef>
+          <a:fillRef idx="0">
+            <a:schemeClr val="accent1"/>
+          </a:fillRef>
+          <a:effectRef idx="0">
+            <a:schemeClr val="accent1"/>
+          </a:effectRef>
+          <a:fontRef idx="minor">
+            <a:schemeClr val="tx1"/>
+          </a:fontRef>
+        </p:style>
+      </p:cxnSp>
+      <p:sp>
+        <p:nvSpPr>
+          <p:cNvPr id="25" name="TextBox 24"/>
+          <p:cNvSpPr txBox="1"/>
+          <p:nvPr/>
+        </p:nvSpPr>
+        <p:spPr>
+          <a:xfrm>
+            <a:off x="2223294" y="3263900"/>
+            <a:ext cx="1804194" cy="307777"/>
+          </a:xfrm>
+          <a:prstGeom prst="rect">
+            <a:avLst/>
+          </a:prstGeom>
+          <a:noFill/>
+        </p:spPr>
+        <p:txBody>
+          <a:bodyPr wrap="square" rtlCol="0">
+            <a:spAutoFit/>
+          </a:bodyPr>
+          <a:lstStyle/>
+          <a:p>
+            <a:r>
+              <a:rPr lang="en-GB" sz="1400" dirty="0" smtClean="0"/>
+              <a:t>Very noisy</a:t>
+            </a:r>
+            <a:endParaRPr lang="en-GB" baseline="-25000" dirty="0"/>
+          </a:p>
+        </p:txBody>
+      </p:sp>
+      <p:cxnSp>
+        <p:nvCxnSpPr>
+          <p:cNvPr id="26" name="Straight Arrow Connector 25"/>
+          <p:cNvCxnSpPr/>
+          <p:nvPr/>
+        </p:nvCxnSpPr>
+        <p:spPr>
+          <a:xfrm>
+            <a:off x="2579292" y="3571677"/>
+            <a:ext cx="0" cy="136723"/>
+          </a:xfrm>
+          <a:prstGeom prst="straightConnector1">
+            <a:avLst/>
+          </a:prstGeom>
+          <a:ln>
+            <a:solidFill>
+              <a:schemeClr val="tx1"/>
+            </a:solidFill>
+            <a:tailEnd type="triangle"/>
+          </a:ln>
+        </p:spPr>
+        <p:style>
+          <a:lnRef idx="1">
+            <a:schemeClr val="accent1"/>
+          </a:lnRef>
+          <a:fillRef idx="0">
+            <a:schemeClr val="accent1"/>
+          </a:fillRef>
+          <a:effectRef idx="0">
+            <a:schemeClr val="accent1"/>
+          </a:effectRef>
+          <a:fontRef idx="minor">
+            <a:schemeClr val="tx1"/>
+          </a:fontRef>
+        </p:style>
+      </p:cxnSp>
+      <p:sp>
+        <p:nvSpPr>
+          <p:cNvPr id="29" name="Oval 28"/>
+          <p:cNvSpPr/>
+          <p:nvPr/>
+        </p:nvSpPr>
+        <p:spPr>
+          <a:xfrm>
+            <a:off x="1803400" y="3730427"/>
+            <a:ext cx="1631950" cy="469900"/>
+          </a:xfrm>
+          <a:prstGeom prst="ellipse">
+            <a:avLst/>
+          </a:prstGeom>
+          <a:noFill/>
+          <a:ln>
+            <a:solidFill>
+              <a:schemeClr val="tx1"/>
+            </a:solidFill>
+          </a:ln>
+        </p:spPr>
+        <p:style>
+          <a:lnRef idx="2">
+            <a:schemeClr val="accent1">
+              <a:shade val="50000"/>
+            </a:schemeClr>
+          </a:lnRef>
+          <a:fillRef idx="1">
+            <a:schemeClr val="accent1"/>
+          </a:fillRef>
+          <a:effectRef idx="0">
+            <a:schemeClr val="accent1"/>
+          </a:effectRef>
+          <a:fontRef idx="minor">
+            <a:schemeClr val="lt1"/>
+          </a:fontRef>
+        </p:style>
+        <p:txBody>
+          <a:bodyPr rtlCol="0" anchor="ctr"/>
+          <a:lstStyle/>
+          <a:p>
+            <a:pPr algn="ctr"/>
+            <a:endParaRPr lang="en-GB"/>
+          </a:p>
+        </p:txBody>
+      </p:sp>
+      <p:cxnSp>
+        <p:nvCxnSpPr>
+          <p:cNvPr id="30" name="Straight Arrow Connector 29"/>
+          <p:cNvCxnSpPr/>
+          <p:nvPr/>
+        </p:nvCxnSpPr>
+        <p:spPr>
+          <a:xfrm flipH="1">
+            <a:off x="1239440" y="3455194"/>
+            <a:ext cx="101" cy="342106"/>
+          </a:xfrm>
+          <a:prstGeom prst="straightConnector1">
+            <a:avLst/>
+          </a:prstGeom>
+          <a:ln>
+            <a:solidFill>
+              <a:schemeClr val="tx1"/>
+            </a:solidFill>
+            <a:tailEnd type="triangle"/>
+          </a:ln>
+        </p:spPr>
+        <p:style>
+          <a:lnRef idx="1">
+            <a:schemeClr val="accent1"/>
+          </a:lnRef>
+          <a:fillRef idx="0">
+            <a:schemeClr val="accent1"/>
+          </a:fillRef>
+          <a:effectRef idx="0">
+            <a:schemeClr val="accent1"/>
+          </a:effectRef>
+          <a:fontRef idx="minor">
+            <a:schemeClr val="tx1"/>
+          </a:fontRef>
+        </p:style>
+      </p:cxnSp>
+      <p:cxnSp>
+        <p:nvCxnSpPr>
+          <p:cNvPr id="32" name="Straight Arrow Connector 31"/>
+          <p:cNvCxnSpPr>
+            <a:stCxn id="18" idx="2"/>
+          </p:cNvCxnSpPr>
+          <p:nvPr/>
+        </p:nvCxnSpPr>
+        <p:spPr>
+          <a:xfrm>
+            <a:off x="1588691" y="3487688"/>
+            <a:ext cx="6747" cy="416024"/>
+          </a:xfrm>
+          <a:prstGeom prst="straightConnector1">
+            <a:avLst/>
+          </a:prstGeom>
+          <a:ln>
+            <a:solidFill>
+              <a:schemeClr val="tx1"/>
+            </a:solidFill>
+            <a:tailEnd type="triangle"/>
+          </a:ln>
+        </p:spPr>
+        <p:style>
+          <a:lnRef idx="1">
+            <a:schemeClr val="accent1"/>
+          </a:lnRef>
+          <a:fillRef idx="0">
+            <a:schemeClr val="accent1"/>
+          </a:fillRef>
+          <a:effectRef idx="0">
+            <a:schemeClr val="accent1"/>
+          </a:effectRef>
+          <a:fontRef idx="minor">
+            <a:schemeClr val="tx1"/>
+          </a:fontRef>
+        </p:style>
+      </p:cxnSp>
+      <p:sp>
+        <p:nvSpPr>
+          <p:cNvPr id="43" name="TextBox 42"/>
+          <p:cNvSpPr txBox="1"/>
+          <p:nvPr/>
+        </p:nvSpPr>
+        <p:spPr>
+          <a:xfrm>
+            <a:off x="504124" y="2323068"/>
+            <a:ext cx="2495550" cy="369332"/>
+          </a:xfrm>
+          <a:prstGeom prst="rect">
+            <a:avLst/>
+          </a:prstGeom>
+          <a:noFill/>
+        </p:spPr>
+        <p:txBody>
+          <a:bodyPr wrap="square" rtlCol="0">
+            <a:spAutoFit/>
+          </a:bodyPr>
+          <a:lstStyle/>
+          <a:p>
+            <a:r>
+              <a:rPr lang="en-GB" dirty="0" smtClean="0"/>
+              <a:t>f</a:t>
+            </a:r>
+            <a:r>
+              <a:rPr lang="en-GB" baseline="-25000" dirty="0" smtClean="0"/>
+              <a:t>r </a:t>
+            </a:r>
+            <a:r>
+              <a:rPr lang="en-GB" dirty="0"/>
+              <a:t> </a:t>
+            </a:r>
+            <a:r>
+              <a:rPr lang="en-GB" sz="1400" dirty="0" smtClean="0"/>
+              <a:t>with reduced magnitude</a:t>
+            </a:r>
+            <a:endParaRPr lang="en-GB" sz="1400" baseline="-25000" dirty="0"/>
+          </a:p>
+        </p:txBody>
+      </p:sp>
+      <p:sp>
+        <p:nvSpPr>
+          <p:cNvPr id="45" name="TextBox 44"/>
+          <p:cNvSpPr txBox="1"/>
+          <p:nvPr/>
+        </p:nvSpPr>
+        <p:spPr>
+          <a:xfrm>
+            <a:off x="8098405" y="5233719"/>
+            <a:ext cx="2815030" cy="338554"/>
+          </a:xfrm>
+          <a:prstGeom prst="rect">
+            <a:avLst/>
+          </a:prstGeom>
+          <a:noFill/>
+        </p:spPr>
+        <p:txBody>
+          <a:bodyPr wrap="square" rtlCol="0">
+            <a:spAutoFit/>
+          </a:bodyPr>
+          <a:lstStyle/>
+          <a:p>
+            <a:r>
+              <a:rPr lang="en-GB" sz="1600" dirty="0" smtClean="0"/>
+              <a:t>Distinct peak at high frequency</a:t>
+            </a:r>
+            <a:endParaRPr lang="en-GB" sz="1200" baseline="-25000" dirty="0"/>
+          </a:p>
+        </p:txBody>
+      </p:sp>
+      <p:cxnSp>
+        <p:nvCxnSpPr>
+          <p:cNvPr id="46" name="Straight Arrow Connector 45"/>
+          <p:cNvCxnSpPr/>
+          <p:nvPr/>
+        </p:nvCxnSpPr>
+        <p:spPr>
+          <a:xfrm>
+            <a:off x="9339943" y="5572273"/>
+            <a:ext cx="0" cy="454454"/>
+          </a:xfrm>
+          <a:prstGeom prst="straightConnector1">
+            <a:avLst/>
+          </a:prstGeom>
+          <a:ln>
+            <a:solidFill>
+              <a:schemeClr val="tx1"/>
+            </a:solidFill>
+            <a:tailEnd type="triangle"/>
+          </a:ln>
+        </p:spPr>
+        <p:style>
+          <a:lnRef idx="1">
+            <a:schemeClr val="accent1"/>
+          </a:lnRef>
+          <a:fillRef idx="0">
+            <a:schemeClr val="accent1"/>
+          </a:fillRef>
+          <a:effectRef idx="0">
+            <a:schemeClr val="accent1"/>
+          </a:effectRef>
+          <a:fontRef idx="minor">
+            <a:schemeClr val="tx1"/>
+          </a:fontRef>
+        </p:style>
+      </p:cxnSp>
+      <p:sp>
+        <p:nvSpPr>
+          <p:cNvPr id="52" name="TextBox 51"/>
+          <p:cNvSpPr txBox="1"/>
+          <p:nvPr/>
+        </p:nvSpPr>
+        <p:spPr>
+          <a:xfrm>
+            <a:off x="704850" y="1108730"/>
+            <a:ext cx="1804194" cy="523220"/>
+          </a:xfrm>
+          <a:prstGeom prst="rect">
+            <a:avLst/>
+          </a:prstGeom>
+          <a:noFill/>
+        </p:spPr>
+        <p:txBody>
+          <a:bodyPr wrap="square" rtlCol="0">
+            <a:spAutoFit/>
+          </a:bodyPr>
+          <a:lstStyle/>
+          <a:p>
+            <a:r>
+              <a:rPr lang="en-GB" sz="1400" dirty="0" smtClean="0"/>
+              <a:t>Harmonics with low magnitude</a:t>
+            </a:r>
+            <a:endParaRPr lang="en-GB" baseline="-25000" dirty="0"/>
+          </a:p>
+        </p:txBody>
+      </p:sp>
+      <p:cxnSp>
+        <p:nvCxnSpPr>
+          <p:cNvPr id="53" name="Straight Arrow Connector 52"/>
+          <p:cNvCxnSpPr/>
+          <p:nvPr/>
+        </p:nvCxnSpPr>
+        <p:spPr>
+          <a:xfrm flipH="1">
+            <a:off x="1064023" y="1587885"/>
+            <a:ext cx="31550" cy="243296"/>
+          </a:xfrm>
+          <a:prstGeom prst="straightConnector1">
+            <a:avLst/>
+          </a:prstGeom>
+          <a:ln>
+            <a:solidFill>
+              <a:schemeClr val="tx1"/>
+            </a:solidFill>
+            <a:tailEnd type="triangle"/>
+          </a:ln>
+        </p:spPr>
+        <p:style>
+          <a:lnRef idx="1">
+            <a:schemeClr val="accent1"/>
+          </a:lnRef>
+          <a:fillRef idx="0">
+            <a:schemeClr val="accent1"/>
+          </a:fillRef>
+          <a:effectRef idx="0">
+            <a:schemeClr val="accent1"/>
+          </a:effectRef>
+          <a:fontRef idx="minor">
+            <a:schemeClr val="tx1"/>
+          </a:fontRef>
+        </p:style>
+      </p:cxnSp>
+      <p:cxnSp>
+        <p:nvCxnSpPr>
+          <p:cNvPr id="58" name="Straight Arrow Connector 57"/>
+          <p:cNvCxnSpPr/>
+          <p:nvPr/>
+        </p:nvCxnSpPr>
+        <p:spPr>
+          <a:xfrm flipH="1">
+            <a:off x="1252538" y="1585504"/>
+            <a:ext cx="2082" cy="304791"/>
+          </a:xfrm>
+          <a:prstGeom prst="straightConnector1">
+            <a:avLst/>
+          </a:prstGeom>
+          <a:ln>
+            <a:solidFill>
+              <a:schemeClr val="tx1"/>
+            </a:solidFill>
+            <a:tailEnd type="triangle"/>
+          </a:ln>
+        </p:spPr>
+        <p:style>
+          <a:lnRef idx="1">
+            <a:schemeClr val="accent1"/>
+          </a:lnRef>
+          <a:fillRef idx="0">
+            <a:schemeClr val="accent1"/>
+          </a:fillRef>
+          <a:effectRef idx="0">
+            <a:schemeClr val="accent1"/>
+          </a:effectRef>
+          <a:fontRef idx="minor">
+            <a:schemeClr val="tx1"/>
+          </a:fontRef>
+        </p:style>
+      </p:cxnSp>
+      <p:cxnSp>
+        <p:nvCxnSpPr>
+          <p:cNvPr id="61" name="Straight Arrow Connector 60"/>
+          <p:cNvCxnSpPr/>
+          <p:nvPr/>
+        </p:nvCxnSpPr>
+        <p:spPr>
+          <a:xfrm>
+            <a:off x="1433512" y="1587885"/>
+            <a:ext cx="4763" cy="252076"/>
+          </a:xfrm>
+          <a:prstGeom prst="straightConnector1">
+            <a:avLst/>
+          </a:prstGeom>
+          <a:ln>
+            <a:solidFill>
+              <a:schemeClr val="tx1"/>
+            </a:solidFill>
+            <a:tailEnd type="triangle"/>
+          </a:ln>
+        </p:spPr>
+        <p:style>
+          <a:lnRef idx="1">
+            <a:schemeClr val="accent1"/>
+          </a:lnRef>
+          <a:fillRef idx="0">
+            <a:schemeClr val="accent1"/>
+          </a:fillRef>
+          <a:effectRef idx="0">
+            <a:schemeClr val="accent1"/>
+          </a:effectRef>
+          <a:fontRef idx="minor">
+            <a:schemeClr val="tx1"/>
+          </a:fontRef>
+        </p:style>
+      </p:cxnSp>
+      <p:cxnSp>
+        <p:nvCxnSpPr>
+          <p:cNvPr id="65" name="Straight Arrow Connector 64"/>
+          <p:cNvCxnSpPr/>
+          <p:nvPr/>
+        </p:nvCxnSpPr>
+        <p:spPr>
+          <a:xfrm>
+            <a:off x="1712119" y="1585504"/>
+            <a:ext cx="90189" cy="279015"/>
+          </a:xfrm>
+          <a:prstGeom prst="straightConnector1">
+            <a:avLst/>
+          </a:prstGeom>
+          <a:ln>
+            <a:solidFill>
+              <a:schemeClr val="tx1"/>
+            </a:solidFill>
+            <a:tailEnd type="triangle"/>
+          </a:ln>
+        </p:spPr>
+        <p:style>
+          <a:lnRef idx="1">
+            <a:schemeClr val="accent1"/>
+          </a:lnRef>
+          <a:fillRef idx="0">
+            <a:schemeClr val="accent1"/>
+          </a:fillRef>
+          <a:effectRef idx="0">
+            <a:schemeClr val="accent1"/>
+          </a:effectRef>
+          <a:fontRef idx="minor">
+            <a:schemeClr val="tx1"/>
+          </a:fontRef>
+        </p:style>
+      </p:cxnSp>
+    </p:spTree>
+    <p:extLst>
+      <p:ext uri="{BB962C8B-B14F-4D97-AF65-F5344CB8AC3E}">
+        <p14:creationId xmlns:p14="http://schemas.microsoft.com/office/powerpoint/2010/main" val="3526481749"/>
+      </p:ext>
+    </p:extLst>
+  </p:cSld>
+  <p:clrMapOvr>
+    <a:masterClrMapping/>
+  </p:clrMapOvr>
+  <p:timing>
+    <p:tnLst>
+      <p:par>
+        <p:cTn id="1" dur="indefinite" restart="never" nodeType="tmRoot"/>
+      </p:par>
+    </p:tnLst>
+  </p:timing>
 </p:sld>
 </file>
 

</xml_diff>

<commit_message>
Analysis of current sensor data
</commit_message>
<xml_diff>
--- a/Report/Dissertation/Images/TestSetup1.pptx
+++ b/Report/Dissertation/Images/TestSetup1.pptx
@@ -9,6 +9,7 @@
     <p:sldId id="257" r:id="rId3"/>
     <p:sldId id="258" r:id="rId4"/>
     <p:sldId id="259" r:id="rId5"/>
+    <p:sldId id="260" r:id="rId6"/>
   </p:sldIdLst>
   <p:sldSz cx="12192000" cy="6858000"/>
   <p:notesSz cx="6858000" cy="9144000"/>
@@ -246,7 +247,7 @@
           <a:p>
             <a:fld id="{89D09D1E-3207-441C-A9AD-878DAAA5462A}" type="datetimeFigureOut">
               <a:rPr lang="en-GB" smtClean="0"/>
-              <a:t>09/08/2018</a:t>
+              <a:t>14/08/2018</a:t>
             </a:fld>
             <a:endParaRPr lang="en-GB"/>
           </a:p>
@@ -416,7 +417,7 @@
           <a:p>
             <a:fld id="{89D09D1E-3207-441C-A9AD-878DAAA5462A}" type="datetimeFigureOut">
               <a:rPr lang="en-GB" smtClean="0"/>
-              <a:t>09/08/2018</a:t>
+              <a:t>14/08/2018</a:t>
             </a:fld>
             <a:endParaRPr lang="en-GB"/>
           </a:p>
@@ -596,7 +597,7 @@
           <a:p>
             <a:fld id="{89D09D1E-3207-441C-A9AD-878DAAA5462A}" type="datetimeFigureOut">
               <a:rPr lang="en-GB" smtClean="0"/>
-              <a:t>09/08/2018</a:t>
+              <a:t>14/08/2018</a:t>
             </a:fld>
             <a:endParaRPr lang="en-GB"/>
           </a:p>
@@ -766,7 +767,7 @@
           <a:p>
             <a:fld id="{89D09D1E-3207-441C-A9AD-878DAAA5462A}" type="datetimeFigureOut">
               <a:rPr lang="en-GB" smtClean="0"/>
-              <a:t>09/08/2018</a:t>
+              <a:t>14/08/2018</a:t>
             </a:fld>
             <a:endParaRPr lang="en-GB"/>
           </a:p>
@@ -1012,7 +1013,7 @@
           <a:p>
             <a:fld id="{89D09D1E-3207-441C-A9AD-878DAAA5462A}" type="datetimeFigureOut">
               <a:rPr lang="en-GB" smtClean="0"/>
-              <a:t>09/08/2018</a:t>
+              <a:t>14/08/2018</a:t>
             </a:fld>
             <a:endParaRPr lang="en-GB"/>
           </a:p>
@@ -1244,7 +1245,7 @@
           <a:p>
             <a:fld id="{89D09D1E-3207-441C-A9AD-878DAAA5462A}" type="datetimeFigureOut">
               <a:rPr lang="en-GB" smtClean="0"/>
-              <a:t>09/08/2018</a:t>
+              <a:t>14/08/2018</a:t>
             </a:fld>
             <a:endParaRPr lang="en-GB"/>
           </a:p>
@@ -1611,7 +1612,7 @@
           <a:p>
             <a:fld id="{89D09D1E-3207-441C-A9AD-878DAAA5462A}" type="datetimeFigureOut">
               <a:rPr lang="en-GB" smtClean="0"/>
-              <a:t>09/08/2018</a:t>
+              <a:t>14/08/2018</a:t>
             </a:fld>
             <a:endParaRPr lang="en-GB"/>
           </a:p>
@@ -1729,7 +1730,7 @@
           <a:p>
             <a:fld id="{89D09D1E-3207-441C-A9AD-878DAAA5462A}" type="datetimeFigureOut">
               <a:rPr lang="en-GB" smtClean="0"/>
-              <a:t>09/08/2018</a:t>
+              <a:t>14/08/2018</a:t>
             </a:fld>
             <a:endParaRPr lang="en-GB"/>
           </a:p>
@@ -1824,7 +1825,7 @@
           <a:p>
             <a:fld id="{89D09D1E-3207-441C-A9AD-878DAAA5462A}" type="datetimeFigureOut">
               <a:rPr lang="en-GB" smtClean="0"/>
-              <a:t>09/08/2018</a:t>
+              <a:t>14/08/2018</a:t>
             </a:fld>
             <a:endParaRPr lang="en-GB"/>
           </a:p>
@@ -2101,7 +2102,7 @@
           <a:p>
             <a:fld id="{89D09D1E-3207-441C-A9AD-878DAAA5462A}" type="datetimeFigureOut">
               <a:rPr lang="en-GB" smtClean="0"/>
-              <a:t>09/08/2018</a:t>
+              <a:t>14/08/2018</a:t>
             </a:fld>
             <a:endParaRPr lang="en-GB"/>
           </a:p>
@@ -2354,7 +2355,7 @@
           <a:p>
             <a:fld id="{89D09D1E-3207-441C-A9AD-878DAAA5462A}" type="datetimeFigureOut">
               <a:rPr lang="en-GB" smtClean="0"/>
-              <a:t>09/08/2018</a:t>
+              <a:t>14/08/2018</a:t>
             </a:fld>
             <a:endParaRPr lang="en-GB"/>
           </a:p>
@@ -2567,7 +2568,7 @@
           <a:p>
             <a:fld id="{89D09D1E-3207-441C-A9AD-878DAAA5462A}" type="datetimeFigureOut">
               <a:rPr lang="en-GB" smtClean="0"/>
-              <a:t>09/08/2018</a:t>
+              <a:t>14/08/2018</a:t>
             </a:fld>
             <a:endParaRPr lang="en-GB"/>
           </a:p>
@@ -4921,6 +4922,1111 @@
 </p:sld>
 </file>
 
+<file path=ppt/slides/slide5.xml><?xml version="1.0" encoding="utf-8"?>
+<p:sld xmlns:a="http://schemas.openxmlformats.org/drawingml/2006/main" xmlns:r="http://schemas.openxmlformats.org/officeDocument/2006/relationships" xmlns:p="http://schemas.openxmlformats.org/presentationml/2006/main">
+  <p:cSld>
+    <p:spTree>
+      <p:nvGrpSpPr>
+        <p:cNvPr id="1" name=""/>
+        <p:cNvGrpSpPr/>
+        <p:nvPr/>
+      </p:nvGrpSpPr>
+      <p:grpSpPr>
+        <a:xfrm>
+          <a:off x="0" y="0"/>
+          <a:ext cx="0" cy="0"/>
+          <a:chOff x="0" y="0"/>
+          <a:chExt cx="0" cy="0"/>
+        </a:xfrm>
+      </p:grpSpPr>
+      <p:cxnSp>
+        <p:nvCxnSpPr>
+          <p:cNvPr id="15" name="Straight Connector 14"/>
+          <p:cNvCxnSpPr>
+            <a:stCxn id="1036" idx="1"/>
+          </p:cNvCxnSpPr>
+          <p:nvPr/>
+        </p:nvCxnSpPr>
+        <p:spPr>
+          <a:xfrm flipV="1">
+            <a:off x="5321438" y="3436144"/>
+            <a:ext cx="0" cy="1036060"/>
+          </a:xfrm>
+          <a:prstGeom prst="line">
+            <a:avLst/>
+          </a:prstGeom>
+          <a:ln w="28575">
+            <a:solidFill>
+              <a:schemeClr val="tx1"/>
+            </a:solidFill>
+          </a:ln>
+        </p:spPr>
+        <p:style>
+          <a:lnRef idx="1">
+            <a:schemeClr val="accent1"/>
+          </a:lnRef>
+          <a:fillRef idx="0">
+            <a:schemeClr val="accent1"/>
+          </a:fillRef>
+          <a:effectRef idx="0">
+            <a:schemeClr val="accent1"/>
+          </a:effectRef>
+          <a:fontRef idx="minor">
+            <a:schemeClr val="tx1"/>
+          </a:fontRef>
+        </p:style>
+      </p:cxnSp>
+      <p:cxnSp>
+        <p:nvCxnSpPr>
+          <p:cNvPr id="39" name="Straight Connector 38"/>
+          <p:cNvCxnSpPr>
+            <a:stCxn id="44" idx="4"/>
+            <a:endCxn id="32" idx="4"/>
+          </p:cNvCxnSpPr>
+          <p:nvPr/>
+        </p:nvCxnSpPr>
+        <p:spPr>
+          <a:xfrm flipV="1">
+            <a:off x="5321437" y="3670300"/>
+            <a:ext cx="1" cy="80468"/>
+          </a:xfrm>
+          <a:prstGeom prst="line">
+            <a:avLst/>
+          </a:prstGeom>
+          <a:ln w="28575">
+            <a:solidFill>
+              <a:schemeClr val="bg1"/>
+            </a:solidFill>
+          </a:ln>
+        </p:spPr>
+        <p:style>
+          <a:lnRef idx="1">
+            <a:schemeClr val="accent1"/>
+          </a:lnRef>
+          <a:fillRef idx="0">
+            <a:schemeClr val="accent1"/>
+          </a:fillRef>
+          <a:effectRef idx="0">
+            <a:schemeClr val="accent1"/>
+          </a:effectRef>
+          <a:fontRef idx="minor">
+            <a:schemeClr val="tx1"/>
+          </a:fontRef>
+        </p:style>
+      </p:cxnSp>
+      <p:pic>
+        <p:nvPicPr>
+          <p:cNvPr id="1026" name="Picture 2" descr="Image result for ac voltage"/>
+          <p:cNvPicPr>
+            <a:picLocks noChangeAspect="1" noChangeArrowheads="1"/>
+          </p:cNvPicPr>
+          <p:nvPr/>
+        </p:nvPicPr>
+        <p:blipFill>
+          <a:blip r:embed="rId2" cstate="print">
+            <a:extLst>
+              <a:ext uri="{28A0092B-C50C-407E-A947-70E740481C1C}">
+                <a14:useLocalDpi xmlns:a14="http://schemas.microsoft.com/office/drawing/2010/main" val="0"/>
+              </a:ext>
+            </a:extLst>
+          </a:blip>
+          <a:srcRect/>
+          <a:stretch>
+            <a:fillRect/>
+          </a:stretch>
+        </p:blipFill>
+        <p:spPr bwMode="auto">
+          <a:xfrm>
+            <a:off x="8233704" y="1945247"/>
+            <a:ext cx="819150" cy="819150"/>
+          </a:xfrm>
+          <a:prstGeom prst="rect">
+            <a:avLst/>
+          </a:prstGeom>
+          <a:noFill/>
+          <a:extLst>
+            <a:ext uri="{909E8E84-426E-40DD-AFC4-6F175D3DCCD1}">
+              <a14:hiddenFill xmlns:a14="http://schemas.microsoft.com/office/drawing/2010/main">
+                <a:solidFill>
+                  <a:srgbClr val="FFFFFF"/>
+                </a:solidFill>
+              </a14:hiddenFill>
+            </a:ext>
+          </a:extLst>
+        </p:spPr>
+      </p:pic>
+      <p:pic>
+        <p:nvPicPr>
+          <p:cNvPr id="1030" name="Picture 6" descr="Image result for resistor symbol europe"/>
+          <p:cNvPicPr>
+            <a:picLocks noChangeAspect="1" noChangeArrowheads="1"/>
+          </p:cNvPicPr>
+          <p:nvPr/>
+        </p:nvPicPr>
+        <p:blipFill rotWithShape="1">
+          <a:blip r:embed="rId3" cstate="print">
+            <a:extLst>
+              <a:ext uri="{28A0092B-C50C-407E-A947-70E740481C1C}">
+                <a14:useLocalDpi xmlns:a14="http://schemas.microsoft.com/office/drawing/2010/main" val="0"/>
+              </a:ext>
+            </a:extLst>
+          </a:blip>
+          <a:srcRect l="12509" r="12147"/>
+          <a:stretch/>
+        </p:blipFill>
+        <p:spPr bwMode="auto">
+          <a:xfrm>
+            <a:off x="9702141" y="4023343"/>
+            <a:ext cx="1330036" cy="882648"/>
+          </a:xfrm>
+          <a:prstGeom prst="rect">
+            <a:avLst/>
+          </a:prstGeom>
+          <a:noFill/>
+          <a:extLst>
+            <a:ext uri="{909E8E84-426E-40DD-AFC4-6F175D3DCCD1}">
+              <a14:hiddenFill xmlns:a14="http://schemas.microsoft.com/office/drawing/2010/main">
+                <a:solidFill>
+                  <a:srgbClr val="FFFFFF"/>
+                </a:solidFill>
+              </a14:hiddenFill>
+            </a:ext>
+          </a:extLst>
+        </p:spPr>
+      </p:pic>
+      <p:pic>
+        <p:nvPicPr>
+          <p:cNvPr id="1032" name="Picture 8" descr="Image result for resistor symbol"/>
+          <p:cNvPicPr>
+            <a:picLocks noChangeAspect="1" noChangeArrowheads="1"/>
+          </p:cNvPicPr>
+          <p:nvPr/>
+        </p:nvPicPr>
+        <p:blipFill>
+          <a:blip r:embed="rId4" cstate="print">
+            <a:extLst>
+              <a:ext uri="{28A0092B-C50C-407E-A947-70E740481C1C}">
+                <a14:useLocalDpi xmlns:a14="http://schemas.microsoft.com/office/drawing/2010/main" val="0"/>
+              </a:ext>
+            </a:extLst>
+          </a:blip>
+          <a:srcRect/>
+          <a:stretch>
+            <a:fillRect/>
+          </a:stretch>
+        </p:blipFill>
+        <p:spPr bwMode="auto">
+          <a:xfrm>
+            <a:off x="7048954" y="3974128"/>
+            <a:ext cx="1863725" cy="931863"/>
+          </a:xfrm>
+          <a:prstGeom prst="rect">
+            <a:avLst/>
+          </a:prstGeom>
+          <a:noFill/>
+          <a:extLst>
+            <a:ext uri="{909E8E84-426E-40DD-AFC4-6F175D3DCCD1}">
+              <a14:hiddenFill xmlns:a14="http://schemas.microsoft.com/office/drawing/2010/main">
+                <a:solidFill>
+                  <a:srgbClr val="FFFFFF"/>
+                </a:solidFill>
+              </a14:hiddenFill>
+            </a:ext>
+          </a:extLst>
+        </p:spPr>
+      </p:pic>
+      <p:pic>
+        <p:nvPicPr>
+          <p:cNvPr id="1034" name="Picture 10" descr="Image result for voltmeter wikimedia"/>
+          <p:cNvPicPr>
+            <a:picLocks noChangeAspect="1" noChangeArrowheads="1"/>
+          </p:cNvPicPr>
+          <p:nvPr/>
+        </p:nvPicPr>
+        <p:blipFill>
+          <a:blip r:embed="rId5" cstate="print">
+            <a:extLst>
+              <a:ext uri="{28A0092B-C50C-407E-A947-70E740481C1C}">
+                <a14:useLocalDpi xmlns:a14="http://schemas.microsoft.com/office/drawing/2010/main" val="0"/>
+              </a:ext>
+            </a:extLst>
+          </a:blip>
+          <a:srcRect/>
+          <a:stretch>
+            <a:fillRect/>
+          </a:stretch>
+        </p:blipFill>
+        <p:spPr bwMode="auto">
+          <a:xfrm>
+            <a:off x="8643279" y="5225945"/>
+            <a:ext cx="1407212" cy="697837"/>
+          </a:xfrm>
+          <a:prstGeom prst="rect">
+            <a:avLst/>
+          </a:prstGeom>
+          <a:noFill/>
+          <a:extLst>
+            <a:ext uri="{909E8E84-426E-40DD-AFC4-6F175D3DCCD1}">
+              <a14:hiddenFill xmlns:a14="http://schemas.microsoft.com/office/drawing/2010/main">
+                <a:solidFill>
+                  <a:srgbClr val="FFFFFF"/>
+                </a:solidFill>
+              </a14:hiddenFill>
+            </a:ext>
+          </a:extLst>
+        </p:spPr>
+      </p:pic>
+      <p:pic>
+        <p:nvPicPr>
+          <p:cNvPr id="1036" name="Picture 12" descr="Image result for ammeter wikimedia"/>
+          <p:cNvPicPr>
+            <a:picLocks noChangeAspect="1" noChangeArrowheads="1"/>
+          </p:cNvPicPr>
+          <p:nvPr/>
+        </p:nvPicPr>
+        <p:blipFill>
+          <a:blip r:embed="rId6" cstate="print">
+            <a:extLst>
+              <a:ext uri="{28A0092B-C50C-407E-A947-70E740481C1C}">
+                <a14:useLocalDpi xmlns:a14="http://schemas.microsoft.com/office/drawing/2010/main" val="0"/>
+              </a:ext>
+            </a:extLst>
+          </a:blip>
+          <a:srcRect/>
+          <a:stretch>
+            <a:fillRect/>
+          </a:stretch>
+        </p:blipFill>
+        <p:spPr bwMode="auto">
+          <a:xfrm>
+            <a:off x="5321438" y="4164590"/>
+            <a:ext cx="1240623" cy="615227"/>
+          </a:xfrm>
+          <a:prstGeom prst="rect">
+            <a:avLst/>
+          </a:prstGeom>
+          <a:noFill/>
+          <a:extLst>
+            <a:ext uri="{909E8E84-426E-40DD-AFC4-6F175D3DCCD1}">
+              <a14:hiddenFill xmlns:a14="http://schemas.microsoft.com/office/drawing/2010/main">
+                <a:solidFill>
+                  <a:srgbClr val="FFFFFF"/>
+                </a:solidFill>
+              </a14:hiddenFill>
+            </a:ext>
+          </a:extLst>
+        </p:spPr>
+      </p:pic>
+      <p:cxnSp>
+        <p:nvCxnSpPr>
+          <p:cNvPr id="5" name="Straight Connector 4"/>
+          <p:cNvCxnSpPr>
+            <a:stCxn id="1026" idx="3"/>
+          </p:cNvCxnSpPr>
+          <p:nvPr/>
+        </p:nvCxnSpPr>
+        <p:spPr>
+          <a:xfrm>
+            <a:off x="9052854" y="2354822"/>
+            <a:ext cx="2406835" cy="0"/>
+          </a:xfrm>
+          <a:prstGeom prst="line">
+            <a:avLst/>
+          </a:prstGeom>
+          <a:ln w="28575">
+            <a:solidFill>
+              <a:schemeClr val="tx1"/>
+            </a:solidFill>
+          </a:ln>
+        </p:spPr>
+        <p:style>
+          <a:lnRef idx="1">
+            <a:schemeClr val="dk1"/>
+          </a:lnRef>
+          <a:fillRef idx="0">
+            <a:schemeClr val="dk1"/>
+          </a:fillRef>
+          <a:effectRef idx="0">
+            <a:schemeClr val="dk1"/>
+          </a:effectRef>
+          <a:fontRef idx="minor">
+            <a:schemeClr val="tx1"/>
+          </a:fontRef>
+        </p:style>
+      </p:cxnSp>
+      <p:cxnSp>
+        <p:nvCxnSpPr>
+          <p:cNvPr id="7" name="Straight Connector 6"/>
+          <p:cNvCxnSpPr/>
+          <p:nvPr/>
+        </p:nvCxnSpPr>
+        <p:spPr>
+          <a:xfrm>
+            <a:off x="11465626" y="2354822"/>
+            <a:ext cx="0" cy="2105505"/>
+          </a:xfrm>
+          <a:prstGeom prst="line">
+            <a:avLst/>
+          </a:prstGeom>
+          <a:ln w="28575">
+            <a:solidFill>
+              <a:schemeClr val="tx1"/>
+            </a:solidFill>
+          </a:ln>
+        </p:spPr>
+        <p:style>
+          <a:lnRef idx="1">
+            <a:schemeClr val="accent1"/>
+          </a:lnRef>
+          <a:fillRef idx="0">
+            <a:schemeClr val="accent1"/>
+          </a:fillRef>
+          <a:effectRef idx="0">
+            <a:schemeClr val="accent1"/>
+          </a:effectRef>
+          <a:fontRef idx="minor">
+            <a:schemeClr val="tx1"/>
+          </a:fontRef>
+        </p:style>
+      </p:cxnSp>
+      <p:cxnSp>
+        <p:nvCxnSpPr>
+          <p:cNvPr id="9" name="Straight Connector 8"/>
+          <p:cNvCxnSpPr/>
+          <p:nvPr/>
+        </p:nvCxnSpPr>
+        <p:spPr>
+          <a:xfrm flipH="1">
+            <a:off x="11001362" y="4460327"/>
+            <a:ext cx="470203" cy="0"/>
+          </a:xfrm>
+          <a:prstGeom prst="line">
+            <a:avLst/>
+          </a:prstGeom>
+          <a:ln w="28575">
+            <a:solidFill>
+              <a:schemeClr val="tx1"/>
+            </a:solidFill>
+          </a:ln>
+        </p:spPr>
+        <p:style>
+          <a:lnRef idx="1">
+            <a:schemeClr val="accent1"/>
+          </a:lnRef>
+          <a:fillRef idx="0">
+            <a:schemeClr val="accent1"/>
+          </a:fillRef>
+          <a:effectRef idx="0">
+            <a:schemeClr val="accent1"/>
+          </a:effectRef>
+          <a:fontRef idx="minor">
+            <a:schemeClr val="tx1"/>
+          </a:fontRef>
+        </p:style>
+      </p:cxnSp>
+      <p:cxnSp>
+        <p:nvCxnSpPr>
+          <p:cNvPr id="11" name="Straight Connector 10"/>
+          <p:cNvCxnSpPr/>
+          <p:nvPr/>
+        </p:nvCxnSpPr>
+        <p:spPr>
+          <a:xfrm flipH="1">
+            <a:off x="8752116" y="4464667"/>
+            <a:ext cx="967838" cy="0"/>
+          </a:xfrm>
+          <a:prstGeom prst="line">
+            <a:avLst/>
+          </a:prstGeom>
+          <a:ln w="28575">
+            <a:solidFill>
+              <a:schemeClr val="tx1"/>
+            </a:solidFill>
+          </a:ln>
+        </p:spPr>
+        <p:style>
+          <a:lnRef idx="1">
+            <a:schemeClr val="accent1"/>
+          </a:lnRef>
+          <a:fillRef idx="0">
+            <a:schemeClr val="accent1"/>
+          </a:fillRef>
+          <a:effectRef idx="0">
+            <a:schemeClr val="accent1"/>
+          </a:effectRef>
+          <a:fontRef idx="minor">
+            <a:schemeClr val="tx1"/>
+          </a:fontRef>
+        </p:style>
+      </p:cxnSp>
+      <p:cxnSp>
+        <p:nvCxnSpPr>
+          <p:cNvPr id="13" name="Straight Connector 12"/>
+          <p:cNvCxnSpPr/>
+          <p:nvPr/>
+        </p:nvCxnSpPr>
+        <p:spPr>
+          <a:xfrm flipH="1">
+            <a:off x="6252359" y="4466265"/>
+            <a:ext cx="991590" cy="0"/>
+          </a:xfrm>
+          <a:prstGeom prst="line">
+            <a:avLst/>
+          </a:prstGeom>
+          <a:ln w="28575">
+            <a:solidFill>
+              <a:schemeClr val="tx1"/>
+            </a:solidFill>
+          </a:ln>
+        </p:spPr>
+        <p:style>
+          <a:lnRef idx="1">
+            <a:schemeClr val="accent1"/>
+          </a:lnRef>
+          <a:fillRef idx="0">
+            <a:schemeClr val="accent1"/>
+          </a:fillRef>
+          <a:effectRef idx="0">
+            <a:schemeClr val="accent1"/>
+          </a:effectRef>
+          <a:fontRef idx="minor">
+            <a:schemeClr val="tx1"/>
+          </a:fontRef>
+        </p:style>
+      </p:cxnSp>
+      <p:cxnSp>
+        <p:nvCxnSpPr>
+          <p:cNvPr id="17" name="Straight Connector 16"/>
+          <p:cNvCxnSpPr>
+            <a:stCxn id="1026" idx="1"/>
+          </p:cNvCxnSpPr>
+          <p:nvPr/>
+        </p:nvCxnSpPr>
+        <p:spPr>
+          <a:xfrm flipH="1">
+            <a:off x="5321438" y="2354822"/>
+            <a:ext cx="2912266" cy="0"/>
+          </a:xfrm>
+          <a:prstGeom prst="line">
+            <a:avLst/>
+          </a:prstGeom>
+          <a:ln w="28575">
+            <a:solidFill>
+              <a:schemeClr val="tx1"/>
+            </a:solidFill>
+          </a:ln>
+        </p:spPr>
+        <p:style>
+          <a:lnRef idx="1">
+            <a:schemeClr val="accent1"/>
+          </a:lnRef>
+          <a:fillRef idx="0">
+            <a:schemeClr val="accent1"/>
+          </a:fillRef>
+          <a:effectRef idx="0">
+            <a:schemeClr val="accent1"/>
+          </a:effectRef>
+          <a:fontRef idx="minor">
+            <a:schemeClr val="tx1"/>
+          </a:fontRef>
+        </p:style>
+      </p:cxnSp>
+      <p:cxnSp>
+        <p:nvCxnSpPr>
+          <p:cNvPr id="27" name="Straight Connector 26"/>
+          <p:cNvCxnSpPr>
+            <a:endCxn id="1036" idx="1"/>
+          </p:cNvCxnSpPr>
+          <p:nvPr/>
+        </p:nvCxnSpPr>
+        <p:spPr>
+          <a:xfrm flipH="1">
+            <a:off x="5321438" y="4472204"/>
+            <a:ext cx="303810" cy="0"/>
+          </a:xfrm>
+          <a:prstGeom prst="line">
+            <a:avLst/>
+          </a:prstGeom>
+          <a:ln w="28575">
+            <a:solidFill>
+              <a:schemeClr val="tx1"/>
+            </a:solidFill>
+          </a:ln>
+        </p:spPr>
+        <p:style>
+          <a:lnRef idx="1">
+            <a:schemeClr val="accent1"/>
+          </a:lnRef>
+          <a:fillRef idx="0">
+            <a:schemeClr val="accent1"/>
+          </a:fillRef>
+          <a:effectRef idx="0">
+            <a:schemeClr val="accent1"/>
+          </a:effectRef>
+          <a:fontRef idx="minor">
+            <a:schemeClr val="tx1"/>
+          </a:fontRef>
+        </p:style>
+      </p:cxnSp>
+      <p:cxnSp>
+        <p:nvCxnSpPr>
+          <p:cNvPr id="33" name="Straight Connector 32"/>
+          <p:cNvCxnSpPr/>
+          <p:nvPr/>
+        </p:nvCxnSpPr>
+        <p:spPr>
+          <a:xfrm>
+            <a:off x="11222608" y="4472203"/>
+            <a:ext cx="0" cy="1102660"/>
+          </a:xfrm>
+          <a:prstGeom prst="line">
+            <a:avLst/>
+          </a:prstGeom>
+          <a:ln w="28575">
+            <a:solidFill>
+              <a:schemeClr val="tx1"/>
+            </a:solidFill>
+          </a:ln>
+        </p:spPr>
+        <p:style>
+          <a:lnRef idx="1">
+            <a:schemeClr val="accent1"/>
+          </a:lnRef>
+          <a:fillRef idx="0">
+            <a:schemeClr val="accent1"/>
+          </a:fillRef>
+          <a:effectRef idx="0">
+            <a:schemeClr val="accent1"/>
+          </a:effectRef>
+          <a:fontRef idx="minor">
+            <a:schemeClr val="tx1"/>
+          </a:fontRef>
+        </p:style>
+      </p:cxnSp>
+      <p:cxnSp>
+        <p:nvCxnSpPr>
+          <p:cNvPr id="35" name="Straight Connector 34"/>
+          <p:cNvCxnSpPr/>
+          <p:nvPr/>
+        </p:nvCxnSpPr>
+        <p:spPr>
+          <a:xfrm flipH="1">
+            <a:off x="9640786" y="5574863"/>
+            <a:ext cx="1581822" cy="0"/>
+          </a:xfrm>
+          <a:prstGeom prst="line">
+            <a:avLst/>
+          </a:prstGeom>
+          <a:ln w="28575">
+            <a:solidFill>
+              <a:schemeClr val="tx1"/>
+            </a:solidFill>
+          </a:ln>
+        </p:spPr>
+        <p:style>
+          <a:lnRef idx="1">
+            <a:schemeClr val="accent1"/>
+          </a:lnRef>
+          <a:fillRef idx="0">
+            <a:schemeClr val="accent1"/>
+          </a:fillRef>
+          <a:effectRef idx="0">
+            <a:schemeClr val="accent1"/>
+          </a:effectRef>
+          <a:fontRef idx="minor">
+            <a:schemeClr val="tx1"/>
+          </a:fontRef>
+        </p:style>
+      </p:cxnSp>
+      <p:cxnSp>
+        <p:nvCxnSpPr>
+          <p:cNvPr id="37" name="Straight Connector 36"/>
+          <p:cNvCxnSpPr/>
+          <p:nvPr/>
+        </p:nvCxnSpPr>
+        <p:spPr>
+          <a:xfrm>
+            <a:off x="6880197" y="4472203"/>
+            <a:ext cx="0" cy="1102660"/>
+          </a:xfrm>
+          <a:prstGeom prst="line">
+            <a:avLst/>
+          </a:prstGeom>
+          <a:ln w="28575">
+            <a:solidFill>
+              <a:schemeClr val="tx1"/>
+            </a:solidFill>
+          </a:ln>
+        </p:spPr>
+        <p:style>
+          <a:lnRef idx="1">
+            <a:schemeClr val="accent1"/>
+          </a:lnRef>
+          <a:fillRef idx="0">
+            <a:schemeClr val="accent1"/>
+          </a:fillRef>
+          <a:effectRef idx="0">
+            <a:schemeClr val="accent1"/>
+          </a:effectRef>
+          <a:fontRef idx="minor">
+            <a:schemeClr val="tx1"/>
+          </a:fontRef>
+        </p:style>
+      </p:cxnSp>
+      <p:cxnSp>
+        <p:nvCxnSpPr>
+          <p:cNvPr id="38" name="Straight Connector 37"/>
+          <p:cNvCxnSpPr/>
+          <p:nvPr/>
+        </p:nvCxnSpPr>
+        <p:spPr>
+          <a:xfrm flipH="1">
+            <a:off x="6880197" y="5574863"/>
+            <a:ext cx="2113808" cy="0"/>
+          </a:xfrm>
+          <a:prstGeom prst="line">
+            <a:avLst/>
+          </a:prstGeom>
+          <a:ln w="28575">
+            <a:solidFill>
+              <a:schemeClr val="tx1"/>
+            </a:solidFill>
+          </a:ln>
+        </p:spPr>
+        <p:style>
+          <a:lnRef idx="1">
+            <a:schemeClr val="accent1"/>
+          </a:lnRef>
+          <a:fillRef idx="0">
+            <a:schemeClr val="accent1"/>
+          </a:fillRef>
+          <a:effectRef idx="0">
+            <a:schemeClr val="accent1"/>
+          </a:effectRef>
+          <a:fontRef idx="minor">
+            <a:schemeClr val="tx1"/>
+          </a:fontRef>
+        </p:style>
+      </p:cxnSp>
+      <p:sp>
+        <p:nvSpPr>
+          <p:cNvPr id="42" name="AutoShape 4"/>
+          <p:cNvSpPr>
+            <a:spLocks noChangeArrowheads="1"/>
+          </p:cNvSpPr>
+          <p:nvPr/>
+        </p:nvSpPr>
+        <p:spPr bwMode="auto">
+          <a:xfrm>
+            <a:off x="2278233" y="2552172"/>
+            <a:ext cx="1314872" cy="1720439"/>
+          </a:xfrm>
+          <a:prstGeom prst="cube">
+            <a:avLst>
+              <a:gd name="adj" fmla="val 0"/>
+            </a:avLst>
+          </a:prstGeom>
+          <a:solidFill>
+            <a:srgbClr val="FF3300"/>
+          </a:solidFill>
+          <a:ln w="9525">
+            <a:solidFill>
+              <a:schemeClr val="tx1"/>
+            </a:solidFill>
+            <a:miter lim="800000"/>
+            <a:headEnd/>
+            <a:tailEnd/>
+          </a:ln>
+          <a:effectLst/>
+          <a:scene3d>
+            <a:camera prst="orthographicFront">
+              <a:rot lat="0" lon="0" rev="0"/>
+            </a:camera>
+            <a:lightRig rig="threePt" dir="t"/>
+          </a:scene3d>
+          <a:extLst>
+            <a:ext uri="{AF507438-7753-43E0-B8FC-AC1667EBCBE1}">
+              <a14:hiddenEffects xmlns:a14="http://schemas.microsoft.com/office/drawing/2010/main">
+                <a:effectLst>
+                  <a:outerShdw dist="35921" dir="2700000" algn="ctr" rotWithShape="0">
+                    <a:schemeClr val="bg2"/>
+                  </a:outerShdw>
+                </a:effectLst>
+              </a14:hiddenEffects>
+            </a:ext>
+          </a:extLst>
+        </p:spPr>
+        <p:txBody>
+          <a:bodyPr wrap="none" anchor="ctr"/>
+          <a:lstStyle/>
+          <a:p>
+            <a:pPr algn="ctr"/>
+            <a:r>
+              <a:rPr lang="en-GB" dirty="0" smtClean="0"/>
+              <a:t>MSP432 </a:t>
+            </a:r>
+          </a:p>
+          <a:p>
+            <a:pPr algn="ctr"/>
+            <a:r>
+              <a:rPr lang="en-GB" dirty="0" smtClean="0"/>
+              <a:t>Launchpad</a:t>
+            </a:r>
+            <a:endParaRPr lang="en-GB" dirty="0"/>
+          </a:p>
+        </p:txBody>
+      </p:sp>
+      <p:grpSp>
+        <p:nvGrpSpPr>
+          <p:cNvPr id="34" name="Group 33"/>
+          <p:cNvGrpSpPr/>
+          <p:nvPr/>
+        </p:nvGrpSpPr>
+        <p:grpSpPr>
+          <a:xfrm>
+            <a:off x="4716920" y="3079022"/>
+            <a:ext cx="1209033" cy="671746"/>
+            <a:chOff x="4716920" y="3079022"/>
+            <a:chExt cx="1209033" cy="671746"/>
+          </a:xfrm>
+        </p:grpSpPr>
+        <p:sp>
+          <p:nvSpPr>
+            <p:cNvPr id="32" name="Oval 31"/>
+            <p:cNvSpPr/>
+            <p:nvPr/>
+          </p:nvSpPr>
+          <p:spPr>
+            <a:xfrm>
+              <a:off x="4853194" y="3149982"/>
+              <a:ext cx="936487" cy="520318"/>
+            </a:xfrm>
+            <a:prstGeom prst="ellipse">
+              <a:avLst/>
+            </a:prstGeom>
+            <a:noFill/>
+            <a:ln w="38100">
+              <a:solidFill>
+                <a:srgbClr val="00B0F0"/>
+              </a:solidFill>
+            </a:ln>
+          </p:spPr>
+          <p:style>
+            <a:lnRef idx="2">
+              <a:schemeClr val="accent1">
+                <a:shade val="50000"/>
+              </a:schemeClr>
+            </a:lnRef>
+            <a:fillRef idx="1">
+              <a:schemeClr val="accent1"/>
+            </a:fillRef>
+            <a:effectRef idx="0">
+              <a:schemeClr val="accent1"/>
+            </a:effectRef>
+            <a:fontRef idx="minor">
+              <a:schemeClr val="lt1"/>
+            </a:fontRef>
+          </p:style>
+          <p:txBody>
+            <a:bodyPr rtlCol="0" anchor="ctr"/>
+            <a:lstStyle/>
+            <a:p>
+              <a:pPr algn="ctr"/>
+              <a:endParaRPr lang="en-GB"/>
+            </a:p>
+          </p:txBody>
+        </p:sp>
+        <p:sp>
+          <p:nvSpPr>
+            <p:cNvPr id="44" name="Oval 43"/>
+            <p:cNvSpPr/>
+            <p:nvPr/>
+          </p:nvSpPr>
+          <p:spPr>
+            <a:xfrm>
+              <a:off x="4716920" y="3079022"/>
+              <a:ext cx="1209033" cy="671746"/>
+            </a:xfrm>
+            <a:prstGeom prst="ellipse">
+              <a:avLst/>
+            </a:prstGeom>
+            <a:noFill/>
+            <a:ln w="38100">
+              <a:solidFill>
+                <a:srgbClr val="00B0F0"/>
+              </a:solidFill>
+            </a:ln>
+          </p:spPr>
+          <p:style>
+            <a:lnRef idx="2">
+              <a:schemeClr val="accent1">
+                <a:shade val="50000"/>
+              </a:schemeClr>
+            </a:lnRef>
+            <a:fillRef idx="1">
+              <a:schemeClr val="accent1"/>
+            </a:fillRef>
+            <a:effectRef idx="0">
+              <a:schemeClr val="accent1"/>
+            </a:effectRef>
+            <a:fontRef idx="minor">
+              <a:schemeClr val="lt1"/>
+            </a:fontRef>
+          </p:style>
+          <p:txBody>
+            <a:bodyPr rtlCol="0" anchor="ctr"/>
+            <a:lstStyle/>
+            <a:p>
+              <a:pPr algn="ctr"/>
+              <a:endParaRPr lang="en-GB"/>
+            </a:p>
+          </p:txBody>
+        </p:sp>
+      </p:grpSp>
+      <p:cxnSp>
+        <p:nvCxnSpPr>
+          <p:cNvPr id="50" name="Straight Connector 49"/>
+          <p:cNvCxnSpPr/>
+          <p:nvPr/>
+        </p:nvCxnSpPr>
+        <p:spPr>
+          <a:xfrm flipV="1">
+            <a:off x="5321436" y="2354822"/>
+            <a:ext cx="0" cy="1126566"/>
+          </a:xfrm>
+          <a:prstGeom prst="line">
+            <a:avLst/>
+          </a:prstGeom>
+          <a:ln w="28575">
+            <a:solidFill>
+              <a:schemeClr val="tx1"/>
+            </a:solidFill>
+          </a:ln>
+        </p:spPr>
+        <p:style>
+          <a:lnRef idx="1">
+            <a:schemeClr val="accent1"/>
+          </a:lnRef>
+          <a:fillRef idx="0">
+            <a:schemeClr val="accent1"/>
+          </a:fillRef>
+          <a:effectRef idx="0">
+            <a:schemeClr val="accent1"/>
+          </a:effectRef>
+          <a:fontRef idx="minor">
+            <a:schemeClr val="tx1"/>
+          </a:fontRef>
+        </p:style>
+      </p:cxnSp>
+      <p:cxnSp>
+        <p:nvCxnSpPr>
+          <p:cNvPr id="56" name="Straight Connector 55"/>
+          <p:cNvCxnSpPr/>
+          <p:nvPr/>
+        </p:nvCxnSpPr>
+        <p:spPr>
+          <a:xfrm flipH="1">
+            <a:off x="3593105" y="3408957"/>
+            <a:ext cx="1106002" cy="0"/>
+          </a:xfrm>
+          <a:prstGeom prst="line">
+            <a:avLst/>
+          </a:prstGeom>
+          <a:ln w="28575">
+            <a:solidFill>
+              <a:schemeClr val="tx1"/>
+            </a:solidFill>
+          </a:ln>
+        </p:spPr>
+        <p:style>
+          <a:lnRef idx="1">
+            <a:schemeClr val="accent1"/>
+          </a:lnRef>
+          <a:fillRef idx="0">
+            <a:schemeClr val="accent1"/>
+          </a:fillRef>
+          <a:effectRef idx="0">
+            <a:schemeClr val="accent1"/>
+          </a:effectRef>
+          <a:fontRef idx="minor">
+            <a:schemeClr val="tx1"/>
+          </a:fontRef>
+        </p:style>
+      </p:cxnSp>
+      <p:sp>
+        <p:nvSpPr>
+          <p:cNvPr id="49" name="TextBox 48"/>
+          <p:cNvSpPr txBox="1"/>
+          <p:nvPr/>
+        </p:nvSpPr>
+        <p:spPr>
+          <a:xfrm>
+            <a:off x="3901964" y="3387369"/>
+            <a:ext cx="1293736" cy="646331"/>
+          </a:xfrm>
+          <a:prstGeom prst="rect">
+            <a:avLst/>
+          </a:prstGeom>
+          <a:noFill/>
+        </p:spPr>
+        <p:txBody>
+          <a:bodyPr wrap="square" rtlCol="0">
+            <a:spAutoFit/>
+          </a:bodyPr>
+          <a:lstStyle/>
+          <a:p>
+            <a:r>
+              <a:rPr lang="en-GB" dirty="0" smtClean="0"/>
+              <a:t>Current Transducer</a:t>
+            </a:r>
+            <a:endParaRPr lang="en-GB" dirty="0"/>
+          </a:p>
+        </p:txBody>
+      </p:sp>
+      <p:sp>
+        <p:nvSpPr>
+          <p:cNvPr id="60" name="TextBox 59"/>
+          <p:cNvSpPr txBox="1"/>
+          <p:nvPr/>
+        </p:nvSpPr>
+        <p:spPr>
+          <a:xfrm>
+            <a:off x="7996411" y="1327852"/>
+            <a:ext cx="1293736" cy="646331"/>
+          </a:xfrm>
+          <a:prstGeom prst="rect">
+            <a:avLst/>
+          </a:prstGeom>
+          <a:noFill/>
+        </p:spPr>
+        <p:txBody>
+          <a:bodyPr wrap="square" rtlCol="0">
+            <a:spAutoFit/>
+          </a:bodyPr>
+          <a:lstStyle/>
+          <a:p>
+            <a:pPr algn="ctr"/>
+            <a:r>
+              <a:rPr lang="en-GB" dirty="0" smtClean="0"/>
+              <a:t>Current Source</a:t>
+            </a:r>
+            <a:endParaRPr lang="en-GB" dirty="0"/>
+          </a:p>
+        </p:txBody>
+      </p:sp>
+      <p:sp>
+        <p:nvSpPr>
+          <p:cNvPr id="61" name="TextBox 60"/>
+          <p:cNvSpPr txBox="1"/>
+          <p:nvPr/>
+        </p:nvSpPr>
+        <p:spPr>
+          <a:xfrm>
+            <a:off x="9401719" y="3886293"/>
+            <a:ext cx="1293736" cy="369332"/>
+          </a:xfrm>
+          <a:prstGeom prst="rect">
+            <a:avLst/>
+          </a:prstGeom>
+          <a:noFill/>
+        </p:spPr>
+        <p:txBody>
+          <a:bodyPr wrap="square" rtlCol="0">
+            <a:spAutoFit/>
+          </a:bodyPr>
+          <a:lstStyle/>
+          <a:p>
+            <a:pPr algn="ctr"/>
+            <a:r>
+              <a:rPr lang="en-GB" dirty="0" smtClean="0"/>
+              <a:t>R</a:t>
+            </a:r>
+            <a:r>
+              <a:rPr lang="en-GB" baseline="-25000" dirty="0" smtClean="0"/>
+              <a:t>1</a:t>
+            </a:r>
+            <a:endParaRPr lang="en-GB" baseline="-25000" dirty="0"/>
+          </a:p>
+        </p:txBody>
+      </p:sp>
+      <p:sp>
+        <p:nvSpPr>
+          <p:cNvPr id="62" name="TextBox 61"/>
+          <p:cNvSpPr txBox="1"/>
+          <p:nvPr/>
+        </p:nvSpPr>
+        <p:spPr>
+          <a:xfrm>
+            <a:off x="6995840" y="3886293"/>
+            <a:ext cx="1293736" cy="369332"/>
+          </a:xfrm>
+          <a:prstGeom prst="rect">
+            <a:avLst/>
+          </a:prstGeom>
+          <a:noFill/>
+        </p:spPr>
+        <p:txBody>
+          <a:bodyPr wrap="square" rtlCol="0">
+            <a:spAutoFit/>
+          </a:bodyPr>
+          <a:lstStyle/>
+          <a:p>
+            <a:pPr algn="ctr"/>
+            <a:r>
+              <a:rPr lang="en-GB" dirty="0" smtClean="0"/>
+              <a:t>R</a:t>
+            </a:r>
+            <a:r>
+              <a:rPr lang="en-GB" baseline="-25000" dirty="0"/>
+              <a:t>2</a:t>
+            </a:r>
+          </a:p>
+        </p:txBody>
+      </p:sp>
+      <p:sp>
+        <p:nvSpPr>
+          <p:cNvPr id="63" name="TextBox 62"/>
+          <p:cNvSpPr txBox="1"/>
+          <p:nvPr/>
+        </p:nvSpPr>
+        <p:spPr>
+          <a:xfrm>
+            <a:off x="5294881" y="4779817"/>
+            <a:ext cx="1293736" cy="646331"/>
+          </a:xfrm>
+          <a:prstGeom prst="rect">
+            <a:avLst/>
+          </a:prstGeom>
+          <a:noFill/>
+        </p:spPr>
+        <p:txBody>
+          <a:bodyPr wrap="square" rtlCol="0">
+            <a:spAutoFit/>
+          </a:bodyPr>
+          <a:lstStyle/>
+          <a:p>
+            <a:pPr algn="ctr"/>
+            <a:r>
+              <a:rPr lang="en-GB" dirty="0" smtClean="0"/>
+              <a:t>Calibrated Ammeter</a:t>
+            </a:r>
+            <a:endParaRPr lang="en-GB" dirty="0"/>
+          </a:p>
+        </p:txBody>
+      </p:sp>
+    </p:spTree>
+    <p:extLst>
+      <p:ext uri="{BB962C8B-B14F-4D97-AF65-F5344CB8AC3E}">
+        <p14:creationId xmlns:p14="http://schemas.microsoft.com/office/powerpoint/2010/main" val="3543091740"/>
+      </p:ext>
+    </p:extLst>
+  </p:cSld>
+  <p:clrMapOvr>
+    <a:masterClrMapping/>
+  </p:clrMapOvr>
+</p:sld>
+</file>
+
 <file path=ppt/theme/theme1.xml><?xml version="1.0" encoding="utf-8"?>
 <a:theme xmlns:a="http://schemas.openxmlformats.org/drawingml/2006/main" name="Office Theme">
   <a:themeElements>

</xml_diff>

<commit_message>
Processing of energy trace data
</commit_message>
<xml_diff>
--- a/Report/Dissertation/Images/TestSetup1.pptx
+++ b/Report/Dissertation/Images/TestSetup1.pptx
@@ -10,6 +10,7 @@
     <p:sldId id="258" r:id="rId4"/>
     <p:sldId id="259" r:id="rId5"/>
     <p:sldId id="260" r:id="rId6"/>
+    <p:sldId id="261" r:id="rId7"/>
   </p:sldIdLst>
   <p:sldSz cx="12192000" cy="6858000"/>
   <p:notesSz cx="6858000" cy="9144000"/>
@@ -247,7 +248,7 @@
           <a:p>
             <a:fld id="{89D09D1E-3207-441C-A9AD-878DAAA5462A}" type="datetimeFigureOut">
               <a:rPr lang="en-GB" smtClean="0"/>
-              <a:t>18/08/2018</a:t>
+              <a:t>25/08/2018</a:t>
             </a:fld>
             <a:endParaRPr lang="en-GB"/>
           </a:p>
@@ -417,7 +418,7 @@
           <a:p>
             <a:fld id="{89D09D1E-3207-441C-A9AD-878DAAA5462A}" type="datetimeFigureOut">
               <a:rPr lang="en-GB" smtClean="0"/>
-              <a:t>18/08/2018</a:t>
+              <a:t>25/08/2018</a:t>
             </a:fld>
             <a:endParaRPr lang="en-GB"/>
           </a:p>
@@ -597,7 +598,7 @@
           <a:p>
             <a:fld id="{89D09D1E-3207-441C-A9AD-878DAAA5462A}" type="datetimeFigureOut">
               <a:rPr lang="en-GB" smtClean="0"/>
-              <a:t>18/08/2018</a:t>
+              <a:t>25/08/2018</a:t>
             </a:fld>
             <a:endParaRPr lang="en-GB"/>
           </a:p>
@@ -767,7 +768,7 @@
           <a:p>
             <a:fld id="{89D09D1E-3207-441C-A9AD-878DAAA5462A}" type="datetimeFigureOut">
               <a:rPr lang="en-GB" smtClean="0"/>
-              <a:t>18/08/2018</a:t>
+              <a:t>25/08/2018</a:t>
             </a:fld>
             <a:endParaRPr lang="en-GB"/>
           </a:p>
@@ -1013,7 +1014,7 @@
           <a:p>
             <a:fld id="{89D09D1E-3207-441C-A9AD-878DAAA5462A}" type="datetimeFigureOut">
               <a:rPr lang="en-GB" smtClean="0"/>
-              <a:t>18/08/2018</a:t>
+              <a:t>25/08/2018</a:t>
             </a:fld>
             <a:endParaRPr lang="en-GB"/>
           </a:p>
@@ -1245,7 +1246,7 @@
           <a:p>
             <a:fld id="{89D09D1E-3207-441C-A9AD-878DAAA5462A}" type="datetimeFigureOut">
               <a:rPr lang="en-GB" smtClean="0"/>
-              <a:t>18/08/2018</a:t>
+              <a:t>25/08/2018</a:t>
             </a:fld>
             <a:endParaRPr lang="en-GB"/>
           </a:p>
@@ -1612,7 +1613,7 @@
           <a:p>
             <a:fld id="{89D09D1E-3207-441C-A9AD-878DAAA5462A}" type="datetimeFigureOut">
               <a:rPr lang="en-GB" smtClean="0"/>
-              <a:t>18/08/2018</a:t>
+              <a:t>25/08/2018</a:t>
             </a:fld>
             <a:endParaRPr lang="en-GB"/>
           </a:p>
@@ -1730,7 +1731,7 @@
           <a:p>
             <a:fld id="{89D09D1E-3207-441C-A9AD-878DAAA5462A}" type="datetimeFigureOut">
               <a:rPr lang="en-GB" smtClean="0"/>
-              <a:t>18/08/2018</a:t>
+              <a:t>25/08/2018</a:t>
             </a:fld>
             <a:endParaRPr lang="en-GB"/>
           </a:p>
@@ -1825,7 +1826,7 @@
           <a:p>
             <a:fld id="{89D09D1E-3207-441C-A9AD-878DAAA5462A}" type="datetimeFigureOut">
               <a:rPr lang="en-GB" smtClean="0"/>
-              <a:t>18/08/2018</a:t>
+              <a:t>25/08/2018</a:t>
             </a:fld>
             <a:endParaRPr lang="en-GB"/>
           </a:p>
@@ -2102,7 +2103,7 @@
           <a:p>
             <a:fld id="{89D09D1E-3207-441C-A9AD-878DAAA5462A}" type="datetimeFigureOut">
               <a:rPr lang="en-GB" smtClean="0"/>
-              <a:t>18/08/2018</a:t>
+              <a:t>25/08/2018</a:t>
             </a:fld>
             <a:endParaRPr lang="en-GB"/>
           </a:p>
@@ -2355,7 +2356,7 @@
           <a:p>
             <a:fld id="{89D09D1E-3207-441C-A9AD-878DAAA5462A}" type="datetimeFigureOut">
               <a:rPr lang="en-GB" smtClean="0"/>
-              <a:t>18/08/2018</a:t>
+              <a:t>25/08/2018</a:t>
             </a:fld>
             <a:endParaRPr lang="en-GB"/>
           </a:p>
@@ -2568,7 +2569,7 @@
           <a:p>
             <a:fld id="{89D09D1E-3207-441C-A9AD-878DAAA5462A}" type="datetimeFigureOut">
               <a:rPr lang="en-GB" smtClean="0"/>
-              <a:t>18/08/2018</a:t>
+              <a:t>25/08/2018</a:t>
             </a:fld>
             <a:endParaRPr lang="en-GB"/>
           </a:p>
@@ -3584,6 +3585,13 @@
   <p:clrMapOvr>
     <a:masterClrMapping/>
   </p:clrMapOvr>
+  <p:timing>
+    <p:tnLst>
+      <p:par>
+        <p:cTn id="1" dur="indefinite" restart="never" nodeType="tmRoot"/>
+      </p:par>
+    </p:tnLst>
+  </p:timing>
 </p:sld>
 </file>
 
@@ -3786,6 +3794,13 @@
   <p:clrMapOvr>
     <a:masterClrMapping/>
   </p:clrMapOvr>
+  <p:timing>
+    <p:tnLst>
+      <p:par>
+        <p:cTn id="1" dur="indefinite" restart="never" nodeType="tmRoot"/>
+      </p:par>
+    </p:tnLst>
+  </p:timing>
 </p:sld>
 </file>
 
@@ -6109,6 +6124,686 @@
   <p:clrMapOvr>
     <a:masterClrMapping/>
   </p:clrMapOvr>
+  <p:timing>
+    <p:tnLst>
+      <p:par>
+        <p:cTn id="1" dur="indefinite" restart="never" nodeType="tmRoot"/>
+      </p:par>
+    </p:tnLst>
+  </p:timing>
+</p:sld>
+</file>
+
+<file path=ppt/slides/slide6.xml><?xml version="1.0" encoding="utf-8"?>
+<p:sld xmlns:a="http://schemas.openxmlformats.org/drawingml/2006/main" xmlns:r="http://schemas.openxmlformats.org/officeDocument/2006/relationships" xmlns:p="http://schemas.openxmlformats.org/presentationml/2006/main">
+  <p:cSld>
+    <p:spTree>
+      <p:nvGrpSpPr>
+        <p:cNvPr id="1" name=""/>
+        <p:cNvGrpSpPr/>
+        <p:nvPr/>
+      </p:nvGrpSpPr>
+      <p:grpSpPr>
+        <a:xfrm>
+          <a:off x="0" y="0"/>
+          <a:ext cx="0" cy="0"/>
+          <a:chOff x="0" y="0"/>
+          <a:chExt cx="0" cy="0"/>
+        </a:xfrm>
+      </p:grpSpPr>
+      <p:pic>
+        <p:nvPicPr>
+          <p:cNvPr id="4" name="Picture 3"/>
+          <p:cNvPicPr>
+            <a:picLocks noChangeAspect="1"/>
+          </p:cNvPicPr>
+          <p:nvPr/>
+        </p:nvPicPr>
+        <p:blipFill>
+          <a:blip r:embed="rId2">
+            <a:extLst>
+              <a:ext uri="{28A0092B-C50C-407E-A947-70E740481C1C}">
+                <a14:useLocalDpi xmlns:a14="http://schemas.microsoft.com/office/drawing/2010/main" val="0"/>
+              </a:ext>
+            </a:extLst>
+          </a:blip>
+          <a:stretch>
+            <a:fillRect/>
+          </a:stretch>
+        </p:blipFill>
+        <p:spPr>
+          <a:xfrm>
+            <a:off x="0" y="381000"/>
+            <a:ext cx="12192000" cy="6096000"/>
+          </a:xfrm>
+          <a:prstGeom prst="rect">
+            <a:avLst/>
+          </a:prstGeom>
+        </p:spPr>
+      </p:pic>
+      <p:sp>
+        <p:nvSpPr>
+          <p:cNvPr id="5" name="TextBox 4"/>
+          <p:cNvSpPr txBox="1"/>
+          <p:nvPr/>
+        </p:nvSpPr>
+        <p:spPr>
+          <a:xfrm>
+            <a:off x="653143" y="4999511"/>
+            <a:ext cx="1252847" cy="430887"/>
+          </a:xfrm>
+          <a:prstGeom prst="rect">
+            <a:avLst/>
+          </a:prstGeom>
+          <a:noFill/>
+        </p:spPr>
+        <p:txBody>
+          <a:bodyPr wrap="square" rtlCol="0">
+            <a:spAutoFit/>
+          </a:bodyPr>
+          <a:lstStyle/>
+          <a:p>
+            <a:r>
+              <a:rPr lang="en-GB" sz="1100" dirty="0" smtClean="0"/>
+              <a:t>Move from LPM0 to active mode</a:t>
+            </a:r>
+            <a:endParaRPr lang="en-GB" sz="1100" dirty="0"/>
+          </a:p>
+        </p:txBody>
+      </p:sp>
+      <p:cxnSp>
+        <p:nvCxnSpPr>
+          <p:cNvPr id="7" name="Straight Arrow Connector 6"/>
+          <p:cNvCxnSpPr>
+            <a:stCxn id="5" idx="2"/>
+          </p:cNvCxnSpPr>
+          <p:nvPr/>
+        </p:nvCxnSpPr>
+        <p:spPr>
+          <a:xfrm>
+            <a:off x="1279567" y="5430398"/>
+            <a:ext cx="323602" cy="311321"/>
+          </a:xfrm>
+          <a:prstGeom prst="straightConnector1">
+            <a:avLst/>
+          </a:prstGeom>
+          <a:ln w="19050">
+            <a:solidFill>
+              <a:schemeClr val="tx1"/>
+            </a:solidFill>
+            <a:tailEnd type="triangle"/>
+          </a:ln>
+        </p:spPr>
+        <p:style>
+          <a:lnRef idx="1">
+            <a:schemeClr val="accent1"/>
+          </a:lnRef>
+          <a:fillRef idx="0">
+            <a:schemeClr val="accent1"/>
+          </a:fillRef>
+          <a:effectRef idx="0">
+            <a:schemeClr val="accent1"/>
+          </a:effectRef>
+          <a:fontRef idx="minor">
+            <a:schemeClr val="tx1"/>
+          </a:fontRef>
+        </p:style>
+      </p:cxnSp>
+      <p:sp>
+        <p:nvSpPr>
+          <p:cNvPr id="8" name="TextBox 7"/>
+          <p:cNvSpPr txBox="1"/>
+          <p:nvPr/>
+        </p:nvSpPr>
+        <p:spPr>
+          <a:xfrm>
+            <a:off x="1721923" y="3625931"/>
+            <a:ext cx="1692233" cy="430887"/>
+          </a:xfrm>
+          <a:prstGeom prst="rect">
+            <a:avLst/>
+          </a:prstGeom>
+          <a:noFill/>
+        </p:spPr>
+        <p:txBody>
+          <a:bodyPr wrap="square" rtlCol="0">
+            <a:spAutoFit/>
+          </a:bodyPr>
+          <a:lstStyle/>
+          <a:p>
+            <a:r>
+              <a:rPr lang="en-GB" sz="1100" dirty="0" smtClean="0"/>
+              <a:t>Reading and transmission of current analysis</a:t>
+            </a:r>
+            <a:endParaRPr lang="en-GB" sz="1100" dirty="0"/>
+          </a:p>
+        </p:txBody>
+      </p:sp>
+      <p:cxnSp>
+        <p:nvCxnSpPr>
+          <p:cNvPr id="9" name="Straight Arrow Connector 8"/>
+          <p:cNvCxnSpPr>
+            <a:stCxn id="8" idx="2"/>
+          </p:cNvCxnSpPr>
+          <p:nvPr/>
+        </p:nvCxnSpPr>
+        <p:spPr>
+          <a:xfrm>
+            <a:off x="2568040" y="4056818"/>
+            <a:ext cx="282038" cy="259863"/>
+          </a:xfrm>
+          <a:prstGeom prst="straightConnector1">
+            <a:avLst/>
+          </a:prstGeom>
+          <a:ln w="19050">
+            <a:solidFill>
+              <a:schemeClr val="tx1"/>
+            </a:solidFill>
+            <a:tailEnd type="triangle"/>
+          </a:ln>
+        </p:spPr>
+        <p:style>
+          <a:lnRef idx="1">
+            <a:schemeClr val="accent1"/>
+          </a:lnRef>
+          <a:fillRef idx="0">
+            <a:schemeClr val="accent1"/>
+          </a:fillRef>
+          <a:effectRef idx="0">
+            <a:schemeClr val="accent1"/>
+          </a:effectRef>
+          <a:fontRef idx="minor">
+            <a:schemeClr val="tx1"/>
+          </a:fontRef>
+        </p:style>
+      </p:cxnSp>
+      <p:sp>
+        <p:nvSpPr>
+          <p:cNvPr id="13" name="TextBox 12"/>
+          <p:cNvSpPr txBox="1"/>
+          <p:nvPr/>
+        </p:nvSpPr>
+        <p:spPr>
+          <a:xfrm>
+            <a:off x="3714998" y="4784067"/>
+            <a:ext cx="1252847" cy="430887"/>
+          </a:xfrm>
+          <a:prstGeom prst="rect">
+            <a:avLst/>
+          </a:prstGeom>
+          <a:noFill/>
+        </p:spPr>
+        <p:txBody>
+          <a:bodyPr wrap="square" rtlCol="0">
+            <a:spAutoFit/>
+          </a:bodyPr>
+          <a:lstStyle/>
+          <a:p>
+            <a:r>
+              <a:rPr lang="en-GB" sz="1100" dirty="0" smtClean="0"/>
+              <a:t>Reading ADC for vibration analysis</a:t>
+            </a:r>
+            <a:endParaRPr lang="en-GB" sz="1100" dirty="0"/>
+          </a:p>
+        </p:txBody>
+      </p:sp>
+      <p:cxnSp>
+        <p:nvCxnSpPr>
+          <p:cNvPr id="14" name="Straight Arrow Connector 13"/>
+          <p:cNvCxnSpPr>
+            <a:stCxn id="13" idx="2"/>
+          </p:cNvCxnSpPr>
+          <p:nvPr/>
+        </p:nvCxnSpPr>
+        <p:spPr>
+          <a:xfrm flipH="1">
+            <a:off x="3212276" y="5214954"/>
+            <a:ext cx="1129146" cy="330823"/>
+          </a:xfrm>
+          <a:prstGeom prst="straightConnector1">
+            <a:avLst/>
+          </a:prstGeom>
+          <a:ln w="19050">
+            <a:solidFill>
+              <a:schemeClr val="tx1"/>
+            </a:solidFill>
+            <a:tailEnd type="triangle"/>
+          </a:ln>
+        </p:spPr>
+        <p:style>
+          <a:lnRef idx="1">
+            <a:schemeClr val="accent1"/>
+          </a:lnRef>
+          <a:fillRef idx="0">
+            <a:schemeClr val="accent1"/>
+          </a:fillRef>
+          <a:effectRef idx="0">
+            <a:schemeClr val="accent1"/>
+          </a:effectRef>
+          <a:fontRef idx="minor">
+            <a:schemeClr val="tx1"/>
+          </a:fontRef>
+        </p:style>
+      </p:cxnSp>
+      <p:sp>
+        <p:nvSpPr>
+          <p:cNvPr id="17" name="TextBox 16"/>
+          <p:cNvSpPr txBox="1"/>
+          <p:nvPr/>
+        </p:nvSpPr>
+        <p:spPr>
+          <a:xfrm>
+            <a:off x="5418118" y="3744973"/>
+            <a:ext cx="769917" cy="261610"/>
+          </a:xfrm>
+          <a:prstGeom prst="rect">
+            <a:avLst/>
+          </a:prstGeom>
+          <a:noFill/>
+        </p:spPr>
+        <p:txBody>
+          <a:bodyPr wrap="square" rtlCol="0">
+            <a:spAutoFit/>
+          </a:bodyPr>
+          <a:lstStyle/>
+          <a:p>
+            <a:r>
+              <a:rPr lang="en-GB" sz="1100" dirty="0" smtClean="0"/>
+              <a:t>Time data</a:t>
+            </a:r>
+            <a:endParaRPr lang="en-GB" sz="1100" dirty="0"/>
+          </a:p>
+        </p:txBody>
+      </p:sp>
+      <p:cxnSp>
+        <p:nvCxnSpPr>
+          <p:cNvPr id="18" name="Straight Arrow Connector 17"/>
+          <p:cNvCxnSpPr>
+            <a:stCxn id="17" idx="2"/>
+          </p:cNvCxnSpPr>
+          <p:nvPr/>
+        </p:nvCxnSpPr>
+        <p:spPr>
+          <a:xfrm>
+            <a:off x="5803077" y="4006583"/>
+            <a:ext cx="384958" cy="310098"/>
+          </a:xfrm>
+          <a:prstGeom prst="straightConnector1">
+            <a:avLst/>
+          </a:prstGeom>
+          <a:ln w="19050">
+            <a:solidFill>
+              <a:schemeClr val="tx1"/>
+            </a:solidFill>
+            <a:tailEnd type="triangle"/>
+          </a:ln>
+        </p:spPr>
+        <p:style>
+          <a:lnRef idx="1">
+            <a:schemeClr val="accent1"/>
+          </a:lnRef>
+          <a:fillRef idx="0">
+            <a:schemeClr val="accent1"/>
+          </a:fillRef>
+          <a:effectRef idx="0">
+            <a:schemeClr val="accent1"/>
+          </a:effectRef>
+          <a:fontRef idx="minor">
+            <a:schemeClr val="tx1"/>
+          </a:fontRef>
+        </p:style>
+      </p:cxnSp>
+      <p:sp>
+        <p:nvSpPr>
+          <p:cNvPr id="22" name="TextBox 21"/>
+          <p:cNvSpPr txBox="1"/>
+          <p:nvPr/>
+        </p:nvSpPr>
+        <p:spPr>
+          <a:xfrm>
+            <a:off x="5832273" y="3507492"/>
+            <a:ext cx="1317170" cy="261610"/>
+          </a:xfrm>
+          <a:prstGeom prst="rect">
+            <a:avLst/>
+          </a:prstGeom>
+          <a:noFill/>
+        </p:spPr>
+        <p:txBody>
+          <a:bodyPr wrap="square" rtlCol="0">
+            <a:spAutoFit/>
+          </a:bodyPr>
+          <a:lstStyle/>
+          <a:p>
+            <a:pPr algn="ctr"/>
+            <a:r>
+              <a:rPr lang="en-GB" sz="1100" dirty="0" smtClean="0"/>
+              <a:t>FFT, processing</a:t>
+            </a:r>
+            <a:endParaRPr lang="en-GB" sz="1100" dirty="0"/>
+          </a:p>
+        </p:txBody>
+      </p:sp>
+      <p:cxnSp>
+        <p:nvCxnSpPr>
+          <p:cNvPr id="23" name="Straight Arrow Connector 22"/>
+          <p:cNvCxnSpPr/>
+          <p:nvPr/>
+        </p:nvCxnSpPr>
+        <p:spPr>
+          <a:xfrm flipH="1">
+            <a:off x="6367156" y="3769102"/>
+            <a:ext cx="15088" cy="533911"/>
+          </a:xfrm>
+          <a:prstGeom prst="straightConnector1">
+            <a:avLst/>
+          </a:prstGeom>
+          <a:ln w="19050">
+            <a:solidFill>
+              <a:schemeClr val="tx1"/>
+            </a:solidFill>
+            <a:tailEnd type="triangle"/>
+          </a:ln>
+        </p:spPr>
+        <p:style>
+          <a:lnRef idx="1">
+            <a:schemeClr val="accent1"/>
+          </a:lnRef>
+          <a:fillRef idx="0">
+            <a:schemeClr val="accent1"/>
+          </a:fillRef>
+          <a:effectRef idx="0">
+            <a:schemeClr val="accent1"/>
+          </a:effectRef>
+          <a:fontRef idx="minor">
+            <a:schemeClr val="tx1"/>
+          </a:fontRef>
+        </p:style>
+      </p:cxnSp>
+      <p:sp>
+        <p:nvSpPr>
+          <p:cNvPr id="31" name="TextBox 30"/>
+          <p:cNvSpPr txBox="1"/>
+          <p:nvPr/>
+        </p:nvSpPr>
+        <p:spPr>
+          <a:xfrm>
+            <a:off x="6651173" y="4056818"/>
+            <a:ext cx="943097" cy="261610"/>
+          </a:xfrm>
+          <a:prstGeom prst="rect">
+            <a:avLst/>
+          </a:prstGeom>
+          <a:noFill/>
+        </p:spPr>
+        <p:txBody>
+          <a:bodyPr wrap="square" rtlCol="0">
+            <a:spAutoFit/>
+          </a:bodyPr>
+          <a:lstStyle/>
+          <a:p>
+            <a:r>
+              <a:rPr lang="en-GB" sz="1100" dirty="0" smtClean="0"/>
+              <a:t>Transmission</a:t>
+            </a:r>
+            <a:endParaRPr lang="en-GB" sz="1100" dirty="0"/>
+          </a:p>
+        </p:txBody>
+      </p:sp>
+      <p:cxnSp>
+        <p:nvCxnSpPr>
+          <p:cNvPr id="32" name="Straight Arrow Connector 31"/>
+          <p:cNvCxnSpPr/>
+          <p:nvPr/>
+        </p:nvCxnSpPr>
+        <p:spPr>
+          <a:xfrm flipH="1">
+            <a:off x="6472052" y="4237364"/>
+            <a:ext cx="276595" cy="131299"/>
+          </a:xfrm>
+          <a:prstGeom prst="straightConnector1">
+            <a:avLst/>
+          </a:prstGeom>
+          <a:ln w="19050">
+            <a:solidFill>
+              <a:schemeClr val="tx1"/>
+            </a:solidFill>
+            <a:tailEnd type="triangle"/>
+          </a:ln>
+        </p:spPr>
+        <p:style>
+          <a:lnRef idx="1">
+            <a:schemeClr val="accent1"/>
+          </a:lnRef>
+          <a:fillRef idx="0">
+            <a:schemeClr val="accent1"/>
+          </a:fillRef>
+          <a:effectRef idx="0">
+            <a:schemeClr val="accent1"/>
+          </a:effectRef>
+          <a:fontRef idx="minor">
+            <a:schemeClr val="tx1"/>
+          </a:fontRef>
+        </p:style>
+      </p:cxnSp>
+      <p:sp>
+        <p:nvSpPr>
+          <p:cNvPr id="36" name="TextBox 35"/>
+          <p:cNvSpPr txBox="1"/>
+          <p:nvPr/>
+        </p:nvSpPr>
+        <p:spPr>
+          <a:xfrm>
+            <a:off x="3426035" y="3625931"/>
+            <a:ext cx="1692233" cy="430887"/>
+          </a:xfrm>
+          <a:prstGeom prst="rect">
+            <a:avLst/>
+          </a:prstGeom>
+          <a:noFill/>
+        </p:spPr>
+        <p:txBody>
+          <a:bodyPr wrap="square" rtlCol="0">
+            <a:spAutoFit/>
+          </a:bodyPr>
+          <a:lstStyle/>
+          <a:p>
+            <a:r>
+              <a:rPr lang="en-GB" sz="1100" dirty="0" smtClean="0"/>
+              <a:t>Reading and transmission of vibration analysis</a:t>
+            </a:r>
+            <a:endParaRPr lang="en-GB" sz="1100" dirty="0"/>
+          </a:p>
+        </p:txBody>
+      </p:sp>
+      <p:cxnSp>
+        <p:nvCxnSpPr>
+          <p:cNvPr id="37" name="Straight Arrow Connector 36"/>
+          <p:cNvCxnSpPr/>
+          <p:nvPr/>
+        </p:nvCxnSpPr>
+        <p:spPr>
+          <a:xfrm flipH="1">
+            <a:off x="3504211" y="4056817"/>
+            <a:ext cx="267691" cy="246196"/>
+          </a:xfrm>
+          <a:prstGeom prst="straightConnector1">
+            <a:avLst/>
+          </a:prstGeom>
+          <a:ln w="19050">
+            <a:solidFill>
+              <a:schemeClr val="tx1"/>
+            </a:solidFill>
+            <a:tailEnd type="triangle"/>
+          </a:ln>
+        </p:spPr>
+        <p:style>
+          <a:lnRef idx="1">
+            <a:schemeClr val="accent1"/>
+          </a:lnRef>
+          <a:fillRef idx="0">
+            <a:schemeClr val="accent1"/>
+          </a:fillRef>
+          <a:effectRef idx="0">
+            <a:schemeClr val="accent1"/>
+          </a:effectRef>
+          <a:fontRef idx="minor">
+            <a:schemeClr val="tx1"/>
+          </a:fontRef>
+        </p:style>
+      </p:cxnSp>
+      <p:sp>
+        <p:nvSpPr>
+          <p:cNvPr id="39" name="TextBox 38"/>
+          <p:cNvSpPr txBox="1"/>
+          <p:nvPr/>
+        </p:nvSpPr>
+        <p:spPr>
+          <a:xfrm>
+            <a:off x="1551708" y="1521176"/>
+            <a:ext cx="2003468" cy="430887"/>
+          </a:xfrm>
+          <a:prstGeom prst="rect">
+            <a:avLst/>
+          </a:prstGeom>
+          <a:noFill/>
+        </p:spPr>
+        <p:txBody>
+          <a:bodyPr wrap="square" rtlCol="0">
+            <a:spAutoFit/>
+          </a:bodyPr>
+          <a:lstStyle/>
+          <a:p>
+            <a:r>
+              <a:rPr lang="en-GB" sz="1100" dirty="0" smtClean="0"/>
+              <a:t>Noise in current consumption of current sensor</a:t>
+            </a:r>
+            <a:endParaRPr lang="en-GB" sz="1100" dirty="0"/>
+          </a:p>
+        </p:txBody>
+      </p:sp>
+      <p:cxnSp>
+        <p:nvCxnSpPr>
+          <p:cNvPr id="40" name="Straight Arrow Connector 39"/>
+          <p:cNvCxnSpPr/>
+          <p:nvPr/>
+        </p:nvCxnSpPr>
+        <p:spPr>
+          <a:xfrm>
+            <a:off x="2422566" y="1952063"/>
+            <a:ext cx="145474" cy="221121"/>
+          </a:xfrm>
+          <a:prstGeom prst="straightConnector1">
+            <a:avLst/>
+          </a:prstGeom>
+          <a:ln w="19050">
+            <a:solidFill>
+              <a:schemeClr val="tx1"/>
+            </a:solidFill>
+            <a:tailEnd type="triangle"/>
+          </a:ln>
+        </p:spPr>
+        <p:style>
+          <a:lnRef idx="1">
+            <a:schemeClr val="accent1"/>
+          </a:lnRef>
+          <a:fillRef idx="0">
+            <a:schemeClr val="accent1"/>
+          </a:fillRef>
+          <a:effectRef idx="0">
+            <a:schemeClr val="accent1"/>
+          </a:effectRef>
+          <a:fontRef idx="minor">
+            <a:schemeClr val="tx1"/>
+          </a:fontRef>
+        </p:style>
+      </p:cxnSp>
+      <p:sp>
+        <p:nvSpPr>
+          <p:cNvPr id="53" name="TextBox 52"/>
+          <p:cNvSpPr txBox="1"/>
+          <p:nvPr/>
+        </p:nvSpPr>
+        <p:spPr>
+          <a:xfrm>
+            <a:off x="6400799" y="2665718"/>
+            <a:ext cx="2163288" cy="430887"/>
+          </a:xfrm>
+          <a:prstGeom prst="rect">
+            <a:avLst/>
+          </a:prstGeom>
+          <a:noFill/>
+        </p:spPr>
+        <p:txBody>
+          <a:bodyPr wrap="square" rtlCol="0">
+            <a:spAutoFit/>
+          </a:bodyPr>
+          <a:lstStyle/>
+          <a:p>
+            <a:pPr algn="ctr"/>
+            <a:r>
+              <a:rPr lang="en-GB" sz="1100" dirty="0" smtClean="0"/>
+              <a:t>ADC has constant current use when both sensors are connected</a:t>
+            </a:r>
+            <a:endParaRPr lang="en-GB" sz="1100" dirty="0"/>
+          </a:p>
+        </p:txBody>
+      </p:sp>
+      <p:cxnSp>
+        <p:nvCxnSpPr>
+          <p:cNvPr id="54" name="Straight Arrow Connector 53"/>
+          <p:cNvCxnSpPr>
+            <a:stCxn id="53" idx="0"/>
+          </p:cNvCxnSpPr>
+          <p:nvPr/>
+        </p:nvCxnSpPr>
+        <p:spPr>
+          <a:xfrm flipV="1">
+            <a:off x="7482443" y="2262291"/>
+            <a:ext cx="5691" cy="403427"/>
+          </a:xfrm>
+          <a:prstGeom prst="straightConnector1">
+            <a:avLst/>
+          </a:prstGeom>
+          <a:ln w="19050">
+            <a:solidFill>
+              <a:schemeClr val="tx1"/>
+            </a:solidFill>
+            <a:tailEnd type="triangle"/>
+          </a:ln>
+        </p:spPr>
+        <p:style>
+          <a:lnRef idx="1">
+            <a:schemeClr val="accent1"/>
+          </a:lnRef>
+          <a:fillRef idx="0">
+            <a:schemeClr val="accent1"/>
+          </a:fillRef>
+          <a:effectRef idx="0">
+            <a:schemeClr val="accent1"/>
+          </a:effectRef>
+          <a:fontRef idx="minor">
+            <a:schemeClr val="tx1"/>
+          </a:fontRef>
+        </p:style>
+      </p:cxnSp>
+    </p:spTree>
+    <p:extLst>
+      <p:ext uri="{BB962C8B-B14F-4D97-AF65-F5344CB8AC3E}">
+        <p14:creationId xmlns:p14="http://schemas.microsoft.com/office/powerpoint/2010/main" val="2619377351"/>
+      </p:ext>
+    </p:extLst>
+  </p:cSld>
+  <p:clrMapOvr>
+    <a:masterClrMapping/>
+  </p:clrMapOvr>
+  <p:timing>
+    <p:tnLst>
+      <p:par>
+        <p:cTn id="1" dur="indefinite" restart="never" nodeType="tmRoot"/>
+      </p:par>
+    </p:tnLst>
+  </p:timing>
 </p:sld>
 </file>
 

</xml_diff>

<commit_message>
More graphs and photos added
</commit_message>
<xml_diff>
--- a/Report/Dissertation/Images/TestSetup1.pptx
+++ b/Report/Dissertation/Images/TestSetup1.pptx
@@ -11,6 +11,7 @@
     <p:sldId id="259" r:id="rId5"/>
     <p:sldId id="260" r:id="rId6"/>
     <p:sldId id="261" r:id="rId7"/>
+    <p:sldId id="262" r:id="rId8"/>
   </p:sldIdLst>
   <p:sldSz cx="12192000" cy="6858000"/>
   <p:notesSz cx="6858000" cy="9144000"/>
@@ -248,7 +249,7 @@
           <a:p>
             <a:fld id="{89D09D1E-3207-441C-A9AD-878DAAA5462A}" type="datetimeFigureOut">
               <a:rPr lang="en-GB" smtClean="0"/>
-              <a:t>25/08/2018</a:t>
+              <a:t>26/08/2018</a:t>
             </a:fld>
             <a:endParaRPr lang="en-GB"/>
           </a:p>
@@ -418,7 +419,7 @@
           <a:p>
             <a:fld id="{89D09D1E-3207-441C-A9AD-878DAAA5462A}" type="datetimeFigureOut">
               <a:rPr lang="en-GB" smtClean="0"/>
-              <a:t>25/08/2018</a:t>
+              <a:t>26/08/2018</a:t>
             </a:fld>
             <a:endParaRPr lang="en-GB"/>
           </a:p>
@@ -598,7 +599,7 @@
           <a:p>
             <a:fld id="{89D09D1E-3207-441C-A9AD-878DAAA5462A}" type="datetimeFigureOut">
               <a:rPr lang="en-GB" smtClean="0"/>
-              <a:t>25/08/2018</a:t>
+              <a:t>26/08/2018</a:t>
             </a:fld>
             <a:endParaRPr lang="en-GB"/>
           </a:p>
@@ -768,7 +769,7 @@
           <a:p>
             <a:fld id="{89D09D1E-3207-441C-A9AD-878DAAA5462A}" type="datetimeFigureOut">
               <a:rPr lang="en-GB" smtClean="0"/>
-              <a:t>25/08/2018</a:t>
+              <a:t>26/08/2018</a:t>
             </a:fld>
             <a:endParaRPr lang="en-GB"/>
           </a:p>
@@ -1014,7 +1015,7 @@
           <a:p>
             <a:fld id="{89D09D1E-3207-441C-A9AD-878DAAA5462A}" type="datetimeFigureOut">
               <a:rPr lang="en-GB" smtClean="0"/>
-              <a:t>25/08/2018</a:t>
+              <a:t>26/08/2018</a:t>
             </a:fld>
             <a:endParaRPr lang="en-GB"/>
           </a:p>
@@ -1246,7 +1247,7 @@
           <a:p>
             <a:fld id="{89D09D1E-3207-441C-A9AD-878DAAA5462A}" type="datetimeFigureOut">
               <a:rPr lang="en-GB" smtClean="0"/>
-              <a:t>25/08/2018</a:t>
+              <a:t>26/08/2018</a:t>
             </a:fld>
             <a:endParaRPr lang="en-GB"/>
           </a:p>
@@ -1613,7 +1614,7 @@
           <a:p>
             <a:fld id="{89D09D1E-3207-441C-A9AD-878DAAA5462A}" type="datetimeFigureOut">
               <a:rPr lang="en-GB" smtClean="0"/>
-              <a:t>25/08/2018</a:t>
+              <a:t>26/08/2018</a:t>
             </a:fld>
             <a:endParaRPr lang="en-GB"/>
           </a:p>
@@ -1731,7 +1732,7 @@
           <a:p>
             <a:fld id="{89D09D1E-3207-441C-A9AD-878DAAA5462A}" type="datetimeFigureOut">
               <a:rPr lang="en-GB" smtClean="0"/>
-              <a:t>25/08/2018</a:t>
+              <a:t>26/08/2018</a:t>
             </a:fld>
             <a:endParaRPr lang="en-GB"/>
           </a:p>
@@ -1826,7 +1827,7 @@
           <a:p>
             <a:fld id="{89D09D1E-3207-441C-A9AD-878DAAA5462A}" type="datetimeFigureOut">
               <a:rPr lang="en-GB" smtClean="0"/>
-              <a:t>25/08/2018</a:t>
+              <a:t>26/08/2018</a:t>
             </a:fld>
             <a:endParaRPr lang="en-GB"/>
           </a:p>
@@ -2103,7 +2104,7 @@
           <a:p>
             <a:fld id="{89D09D1E-3207-441C-A9AD-878DAAA5462A}" type="datetimeFigureOut">
               <a:rPr lang="en-GB" smtClean="0"/>
-              <a:t>25/08/2018</a:t>
+              <a:t>26/08/2018</a:t>
             </a:fld>
             <a:endParaRPr lang="en-GB"/>
           </a:p>
@@ -2356,7 +2357,7 @@
           <a:p>
             <a:fld id="{89D09D1E-3207-441C-A9AD-878DAAA5462A}" type="datetimeFigureOut">
               <a:rPr lang="en-GB" smtClean="0"/>
-              <a:t>25/08/2018</a:t>
+              <a:t>26/08/2018</a:t>
             </a:fld>
             <a:endParaRPr lang="en-GB"/>
           </a:p>
@@ -2569,7 +2570,7 @@
           <a:p>
             <a:fld id="{89D09D1E-3207-441C-A9AD-878DAAA5462A}" type="datetimeFigureOut">
               <a:rPr lang="en-GB" smtClean="0"/>
-              <a:t>25/08/2018</a:t>
+              <a:t>26/08/2018</a:t>
             </a:fld>
             <a:endParaRPr lang="en-GB"/>
           </a:p>
@@ -6807,6 +6808,1298 @@
 </p:sld>
 </file>
 
+<file path=ppt/slides/slide7.xml><?xml version="1.0" encoding="utf-8"?>
+<p:sld xmlns:a="http://schemas.openxmlformats.org/drawingml/2006/main" xmlns:r="http://schemas.openxmlformats.org/officeDocument/2006/relationships" xmlns:p="http://schemas.openxmlformats.org/presentationml/2006/main">
+  <p:cSld>
+    <p:spTree>
+      <p:nvGrpSpPr>
+        <p:cNvPr id="1" name=""/>
+        <p:cNvGrpSpPr/>
+        <p:nvPr/>
+      </p:nvGrpSpPr>
+      <p:grpSpPr>
+        <a:xfrm>
+          <a:off x="0" y="0"/>
+          <a:ext cx="0" cy="0"/>
+          <a:chOff x="0" y="0"/>
+          <a:chExt cx="0" cy="0"/>
+        </a:xfrm>
+      </p:grpSpPr>
+      <p:sp>
+        <p:nvSpPr>
+          <p:cNvPr id="22" name="AutoShape 4"/>
+          <p:cNvSpPr>
+            <a:spLocks noChangeArrowheads="1"/>
+          </p:cNvSpPr>
+          <p:nvPr/>
+        </p:nvSpPr>
+        <p:spPr bwMode="auto">
+          <a:xfrm>
+            <a:off x="3524408" y="3222376"/>
+            <a:ext cx="1916150" cy="970280"/>
+          </a:xfrm>
+          <a:prstGeom prst="cube">
+            <a:avLst>
+              <a:gd name="adj" fmla="val 0"/>
+            </a:avLst>
+          </a:prstGeom>
+          <a:solidFill>
+            <a:schemeClr val="bg1">
+              <a:lumMod val="75000"/>
+            </a:schemeClr>
+          </a:solidFill>
+          <a:ln w="9525">
+            <a:solidFill>
+              <a:schemeClr val="tx1"/>
+            </a:solidFill>
+            <a:miter lim="800000"/>
+            <a:headEnd/>
+            <a:tailEnd/>
+          </a:ln>
+          <a:effectLst/>
+          <a:scene3d>
+            <a:camera prst="orthographicFront">
+              <a:rot lat="0" lon="0" rev="0"/>
+            </a:camera>
+            <a:lightRig rig="threePt" dir="t"/>
+          </a:scene3d>
+          <a:extLst/>
+        </p:spPr>
+        <p:txBody>
+          <a:bodyPr wrap="none" anchor="ctr"/>
+          <a:lstStyle/>
+          <a:p>
+            <a:pPr algn="ctr"/>
+            <a:r>
+              <a:rPr lang="en-GB" dirty="0" smtClean="0"/>
+              <a:t>Motor</a:t>
+            </a:r>
+            <a:endParaRPr lang="en-GB" dirty="0"/>
+          </a:p>
+        </p:txBody>
+      </p:sp>
+      <p:sp>
+        <p:nvSpPr>
+          <p:cNvPr id="23" name="AutoShape 4"/>
+          <p:cNvSpPr>
+            <a:spLocks noChangeArrowheads="1"/>
+          </p:cNvSpPr>
+          <p:nvPr/>
+        </p:nvSpPr>
+        <p:spPr bwMode="auto">
+          <a:xfrm>
+            <a:off x="5440558" y="3621855"/>
+            <a:ext cx="4897242" cy="171322"/>
+          </a:xfrm>
+          <a:prstGeom prst="cube">
+            <a:avLst>
+              <a:gd name="adj" fmla="val 0"/>
+            </a:avLst>
+          </a:prstGeom>
+          <a:solidFill>
+            <a:schemeClr val="bg1">
+              <a:lumMod val="85000"/>
+            </a:schemeClr>
+          </a:solidFill>
+          <a:ln w="9525">
+            <a:solidFill>
+              <a:schemeClr val="tx1"/>
+            </a:solidFill>
+            <a:miter lim="800000"/>
+            <a:headEnd/>
+            <a:tailEnd/>
+          </a:ln>
+          <a:effectLst/>
+          <a:scene3d>
+            <a:camera prst="orthographicFront">
+              <a:rot lat="0" lon="0" rev="0"/>
+            </a:camera>
+            <a:lightRig rig="threePt" dir="t"/>
+          </a:scene3d>
+          <a:extLst/>
+        </p:spPr>
+        <p:txBody>
+          <a:bodyPr wrap="none" anchor="ctr"/>
+          <a:lstStyle/>
+          <a:p>
+            <a:pPr algn="ctr"/>
+            <a:endParaRPr lang="en-GB" dirty="0"/>
+          </a:p>
+        </p:txBody>
+      </p:sp>
+      <p:sp>
+        <p:nvSpPr>
+          <p:cNvPr id="24" name="AutoShape 4"/>
+          <p:cNvSpPr>
+            <a:spLocks noChangeArrowheads="1"/>
+          </p:cNvSpPr>
+          <p:nvPr/>
+        </p:nvSpPr>
+        <p:spPr bwMode="auto">
+          <a:xfrm>
+            <a:off x="6081486" y="3374611"/>
+            <a:ext cx="224064" cy="665811"/>
+          </a:xfrm>
+          <a:prstGeom prst="cube">
+            <a:avLst>
+              <a:gd name="adj" fmla="val 0"/>
+            </a:avLst>
+          </a:prstGeom>
+          <a:solidFill>
+            <a:srgbClr val="0000FF"/>
+          </a:solidFill>
+          <a:ln w="19050">
+            <a:solidFill>
+              <a:schemeClr val="tx1"/>
+            </a:solidFill>
+            <a:miter lim="800000"/>
+            <a:headEnd/>
+            <a:tailEnd/>
+          </a:ln>
+          <a:effectLst/>
+          <a:scene3d>
+            <a:camera prst="orthographicFront">
+              <a:rot lat="0" lon="0" rev="0"/>
+            </a:camera>
+            <a:lightRig rig="threePt" dir="t"/>
+          </a:scene3d>
+          <a:extLst/>
+        </p:spPr>
+        <p:txBody>
+          <a:bodyPr wrap="none" anchor="ctr"/>
+          <a:lstStyle/>
+          <a:p>
+            <a:pPr algn="ctr"/>
+            <a:endParaRPr lang="en-GB" dirty="0"/>
+          </a:p>
+        </p:txBody>
+      </p:sp>
+      <p:sp>
+        <p:nvSpPr>
+          <p:cNvPr id="25" name="AutoShape 4"/>
+          <p:cNvSpPr>
+            <a:spLocks noChangeArrowheads="1"/>
+          </p:cNvSpPr>
+          <p:nvPr/>
+        </p:nvSpPr>
+        <p:spPr bwMode="auto">
+          <a:xfrm>
+            <a:off x="7777147" y="3374611"/>
+            <a:ext cx="224064" cy="665811"/>
+          </a:xfrm>
+          <a:prstGeom prst="cube">
+            <a:avLst>
+              <a:gd name="adj" fmla="val 0"/>
+            </a:avLst>
+          </a:prstGeom>
+          <a:solidFill>
+            <a:srgbClr val="0000FF"/>
+          </a:solidFill>
+          <a:ln w="19050">
+            <a:solidFill>
+              <a:schemeClr val="tx1"/>
+            </a:solidFill>
+            <a:miter lim="800000"/>
+            <a:headEnd/>
+            <a:tailEnd/>
+          </a:ln>
+          <a:effectLst/>
+          <a:scene3d>
+            <a:camera prst="orthographicFront">
+              <a:rot lat="0" lon="0" rev="0"/>
+            </a:camera>
+            <a:lightRig rig="threePt" dir="t"/>
+          </a:scene3d>
+          <a:extLst/>
+        </p:spPr>
+        <p:txBody>
+          <a:bodyPr wrap="none" anchor="ctr"/>
+          <a:lstStyle/>
+          <a:p>
+            <a:pPr algn="ctr"/>
+            <a:endParaRPr lang="en-GB" dirty="0"/>
+          </a:p>
+        </p:txBody>
+      </p:sp>
+      <p:sp>
+        <p:nvSpPr>
+          <p:cNvPr id="26" name="AutoShape 4"/>
+          <p:cNvSpPr>
+            <a:spLocks noChangeArrowheads="1"/>
+          </p:cNvSpPr>
+          <p:nvPr/>
+        </p:nvSpPr>
+        <p:spPr bwMode="auto">
+          <a:xfrm>
+            <a:off x="9472808" y="3374611"/>
+            <a:ext cx="224064" cy="665811"/>
+          </a:xfrm>
+          <a:prstGeom prst="cube">
+            <a:avLst>
+              <a:gd name="adj" fmla="val 0"/>
+            </a:avLst>
+          </a:prstGeom>
+          <a:solidFill>
+            <a:srgbClr val="0000FF"/>
+          </a:solidFill>
+          <a:ln w="19050">
+            <a:solidFill>
+              <a:schemeClr val="tx1"/>
+            </a:solidFill>
+            <a:miter lim="800000"/>
+            <a:headEnd/>
+            <a:tailEnd/>
+          </a:ln>
+          <a:effectLst/>
+          <a:scene3d>
+            <a:camera prst="orthographicFront">
+              <a:rot lat="0" lon="0" rev="0"/>
+            </a:camera>
+            <a:lightRig rig="threePt" dir="t"/>
+          </a:scene3d>
+          <a:extLst/>
+        </p:spPr>
+        <p:txBody>
+          <a:bodyPr wrap="none" anchor="ctr"/>
+          <a:lstStyle/>
+          <a:p>
+            <a:pPr algn="ctr"/>
+            <a:endParaRPr lang="en-GB" dirty="0"/>
+          </a:p>
+        </p:txBody>
+      </p:sp>
+      <p:grpSp>
+        <p:nvGrpSpPr>
+          <p:cNvPr id="29" name="Group 28"/>
+          <p:cNvGrpSpPr/>
+          <p:nvPr/>
+        </p:nvGrpSpPr>
+        <p:grpSpPr>
+          <a:xfrm>
+            <a:off x="7703047" y="2796439"/>
+            <a:ext cx="378112" cy="716360"/>
+            <a:chOff x="4102374" y="1774221"/>
+            <a:chExt cx="574568" cy="1088562"/>
+          </a:xfrm>
+        </p:grpSpPr>
+        <p:sp>
+          <p:nvSpPr>
+            <p:cNvPr id="27" name="AutoShape 3"/>
+            <p:cNvSpPr>
+              <a:spLocks noChangeArrowheads="1"/>
+            </p:cNvSpPr>
+            <p:nvPr/>
+          </p:nvSpPr>
+          <p:spPr bwMode="auto">
+            <a:xfrm>
+              <a:off x="4226775" y="2302687"/>
+              <a:ext cx="336701" cy="560096"/>
+            </a:xfrm>
+            <a:prstGeom prst="can">
+              <a:avLst>
+                <a:gd name="adj" fmla="val 36176"/>
+              </a:avLst>
+            </a:prstGeom>
+            <a:solidFill>
+              <a:srgbClr val="0070C0"/>
+            </a:solidFill>
+            <a:ln w="19050">
+              <a:solidFill>
+                <a:schemeClr val="tx1"/>
+              </a:solidFill>
+              <a:round/>
+              <a:headEnd/>
+              <a:tailEnd/>
+            </a:ln>
+            <a:effectLst/>
+          </p:spPr>
+          <p:txBody>
+            <a:bodyPr wrap="none" anchor="ctr"/>
+            <a:lstStyle/>
+            <a:p>
+              <a:endParaRPr lang="en-GB"/>
+            </a:p>
+          </p:txBody>
+        </p:sp>
+        <p:sp>
+          <p:nvSpPr>
+            <p:cNvPr id="28" name="AutoShape 4"/>
+            <p:cNvSpPr>
+              <a:spLocks noChangeArrowheads="1"/>
+            </p:cNvSpPr>
+            <p:nvPr/>
+          </p:nvSpPr>
+          <p:spPr bwMode="auto">
+            <a:xfrm>
+              <a:off x="4102374" y="1774221"/>
+              <a:ext cx="574568" cy="602581"/>
+            </a:xfrm>
+            <a:prstGeom prst="cube">
+              <a:avLst>
+                <a:gd name="adj" fmla="val 8489"/>
+              </a:avLst>
+            </a:prstGeom>
+            <a:solidFill>
+              <a:schemeClr val="accent6"/>
+            </a:solidFill>
+            <a:ln w="9525">
+              <a:solidFill>
+                <a:schemeClr val="tx1"/>
+              </a:solidFill>
+              <a:miter lim="800000"/>
+              <a:headEnd/>
+              <a:tailEnd/>
+            </a:ln>
+            <a:effectLst/>
+            <a:scene3d>
+              <a:camera prst="orthographicFront">
+                <a:rot lat="0" lon="0" rev="0"/>
+              </a:camera>
+              <a:lightRig rig="threePt" dir="t"/>
+            </a:scene3d>
+          </p:spPr>
+          <p:txBody>
+            <a:bodyPr wrap="none" anchor="ctr"/>
+            <a:lstStyle/>
+            <a:p>
+              <a:endParaRPr lang="en-GB"/>
+            </a:p>
+          </p:txBody>
+        </p:sp>
+      </p:grpSp>
+      <p:pic>
+        <p:nvPicPr>
+          <p:cNvPr id="31" name="Picture 2" descr="Image result for ac voltage"/>
+          <p:cNvPicPr>
+            <a:picLocks noChangeAspect="1" noChangeArrowheads="1"/>
+          </p:cNvPicPr>
+          <p:nvPr/>
+        </p:nvPicPr>
+        <p:blipFill>
+          <a:blip r:embed="rId2" cstate="print">
+            <a:extLst>
+              <a:ext uri="{28A0092B-C50C-407E-A947-70E740481C1C}">
+                <a14:useLocalDpi xmlns:a14="http://schemas.microsoft.com/office/drawing/2010/main" val="0"/>
+              </a:ext>
+            </a:extLst>
+          </a:blip>
+          <a:srcRect/>
+          <a:stretch>
+            <a:fillRect/>
+          </a:stretch>
+        </p:blipFill>
+        <p:spPr bwMode="auto">
+          <a:xfrm>
+            <a:off x="1187819" y="3297941"/>
+            <a:ext cx="819150" cy="819150"/>
+          </a:xfrm>
+          <a:prstGeom prst="rect">
+            <a:avLst/>
+          </a:prstGeom>
+          <a:noFill/>
+          <a:extLst>
+            <a:ext uri="{909E8E84-426E-40DD-AFC4-6F175D3DCCD1}">
+              <a14:hiddenFill xmlns:a14="http://schemas.microsoft.com/office/drawing/2010/main">
+                <a:solidFill>
+                  <a:srgbClr val="FFFFFF"/>
+                </a:solidFill>
+              </a14:hiddenFill>
+            </a:ext>
+          </a:extLst>
+        </p:spPr>
+      </p:pic>
+      <p:cxnSp>
+        <p:nvCxnSpPr>
+          <p:cNvPr id="32" name="Straight Connector 31"/>
+          <p:cNvCxnSpPr/>
+          <p:nvPr/>
+        </p:nvCxnSpPr>
+        <p:spPr>
+          <a:xfrm>
+            <a:off x="1865272" y="3417331"/>
+            <a:ext cx="1659136" cy="0"/>
+          </a:xfrm>
+          <a:prstGeom prst="line">
+            <a:avLst/>
+          </a:prstGeom>
+          <a:ln w="38100">
+            <a:solidFill>
+              <a:schemeClr val="tx1"/>
+            </a:solidFill>
+          </a:ln>
+        </p:spPr>
+        <p:style>
+          <a:lnRef idx="1">
+            <a:schemeClr val="accent1"/>
+          </a:lnRef>
+          <a:fillRef idx="0">
+            <a:schemeClr val="accent1"/>
+          </a:fillRef>
+          <a:effectRef idx="0">
+            <a:schemeClr val="accent1"/>
+          </a:effectRef>
+          <a:fontRef idx="minor">
+            <a:schemeClr val="tx1"/>
+          </a:fontRef>
+        </p:style>
+      </p:cxnSp>
+      <p:cxnSp>
+        <p:nvCxnSpPr>
+          <p:cNvPr id="33" name="Straight Connector 32"/>
+          <p:cNvCxnSpPr>
+            <a:stCxn id="31" idx="3"/>
+            <a:endCxn id="22" idx="2"/>
+          </p:cNvCxnSpPr>
+          <p:nvPr/>
+        </p:nvCxnSpPr>
+        <p:spPr>
+          <a:xfrm>
+            <a:off x="2006969" y="3707516"/>
+            <a:ext cx="1517439" cy="0"/>
+          </a:xfrm>
+          <a:prstGeom prst="line">
+            <a:avLst/>
+          </a:prstGeom>
+          <a:ln w="38100">
+            <a:solidFill>
+              <a:schemeClr val="tx1"/>
+            </a:solidFill>
+          </a:ln>
+        </p:spPr>
+        <p:style>
+          <a:lnRef idx="1">
+            <a:schemeClr val="accent1"/>
+          </a:lnRef>
+          <a:fillRef idx="0">
+            <a:schemeClr val="accent1"/>
+          </a:fillRef>
+          <a:effectRef idx="0">
+            <a:schemeClr val="accent1"/>
+          </a:effectRef>
+          <a:fontRef idx="minor">
+            <a:schemeClr val="tx1"/>
+          </a:fontRef>
+        </p:style>
+      </p:cxnSp>
+      <p:cxnSp>
+        <p:nvCxnSpPr>
+          <p:cNvPr id="34" name="Straight Connector 33"/>
+          <p:cNvCxnSpPr/>
+          <p:nvPr/>
+        </p:nvCxnSpPr>
+        <p:spPr>
+          <a:xfrm>
+            <a:off x="1865272" y="4002178"/>
+            <a:ext cx="1659136" cy="0"/>
+          </a:xfrm>
+          <a:prstGeom prst="line">
+            <a:avLst/>
+          </a:prstGeom>
+          <a:ln w="38100">
+            <a:solidFill>
+              <a:schemeClr val="tx1"/>
+            </a:solidFill>
+          </a:ln>
+        </p:spPr>
+        <p:style>
+          <a:lnRef idx="1">
+            <a:schemeClr val="accent1"/>
+          </a:lnRef>
+          <a:fillRef idx="0">
+            <a:schemeClr val="accent1"/>
+          </a:fillRef>
+          <a:effectRef idx="0">
+            <a:schemeClr val="accent1"/>
+          </a:effectRef>
+          <a:fontRef idx="minor">
+            <a:schemeClr val="tx1"/>
+          </a:fontRef>
+        </p:style>
+      </p:cxnSp>
+      <p:sp>
+        <p:nvSpPr>
+          <p:cNvPr id="38" name="TextBox 37"/>
+          <p:cNvSpPr txBox="1"/>
+          <p:nvPr/>
+        </p:nvSpPr>
+        <p:spPr>
+          <a:xfrm>
+            <a:off x="1383022" y="4107980"/>
+            <a:ext cx="2280927" cy="369332"/>
+          </a:xfrm>
+          <a:prstGeom prst="rect">
+            <a:avLst/>
+          </a:prstGeom>
+          <a:noFill/>
+        </p:spPr>
+        <p:txBody>
+          <a:bodyPr wrap="square" rtlCol="0">
+            <a:spAutoFit/>
+          </a:bodyPr>
+          <a:lstStyle/>
+          <a:p>
+            <a:pPr algn="ctr"/>
+            <a:r>
+              <a:rPr lang="en-GB" dirty="0" smtClean="0"/>
+              <a:t>3 Phase Power Supply</a:t>
+            </a:r>
+            <a:endParaRPr lang="en-GB" dirty="0"/>
+          </a:p>
+        </p:txBody>
+      </p:sp>
+      <p:sp>
+        <p:nvSpPr>
+          <p:cNvPr id="44" name="TextBox 43"/>
+          <p:cNvSpPr txBox="1"/>
+          <p:nvPr/>
+        </p:nvSpPr>
+        <p:spPr>
+          <a:xfrm>
+            <a:off x="1386099" y="2517040"/>
+            <a:ext cx="1293736" cy="646331"/>
+          </a:xfrm>
+          <a:prstGeom prst="rect">
+            <a:avLst/>
+          </a:prstGeom>
+          <a:noFill/>
+        </p:spPr>
+        <p:txBody>
+          <a:bodyPr wrap="square" rtlCol="0">
+            <a:spAutoFit/>
+          </a:bodyPr>
+          <a:lstStyle/>
+          <a:p>
+            <a:r>
+              <a:rPr lang="en-GB" dirty="0" smtClean="0"/>
+              <a:t>Current Transducer</a:t>
+            </a:r>
+            <a:endParaRPr lang="en-GB" dirty="0"/>
+          </a:p>
+        </p:txBody>
+      </p:sp>
+      <p:grpSp>
+        <p:nvGrpSpPr>
+          <p:cNvPr id="49" name="Group 48"/>
+          <p:cNvGrpSpPr/>
+          <p:nvPr/>
+        </p:nvGrpSpPr>
+        <p:grpSpPr>
+          <a:xfrm>
+            <a:off x="2569535" y="3198420"/>
+            <a:ext cx="605728" cy="428870"/>
+            <a:chOff x="4810546" y="931119"/>
+            <a:chExt cx="1209033" cy="671746"/>
+          </a:xfrm>
+        </p:grpSpPr>
+        <p:sp>
+          <p:nvSpPr>
+            <p:cNvPr id="50" name="Oval 49"/>
+            <p:cNvSpPr/>
+            <p:nvPr/>
+          </p:nvSpPr>
+          <p:spPr>
+            <a:xfrm>
+              <a:off x="5030900" y="1053549"/>
+              <a:ext cx="768324" cy="426885"/>
+            </a:xfrm>
+            <a:prstGeom prst="ellipse">
+              <a:avLst/>
+            </a:prstGeom>
+            <a:noFill/>
+            <a:ln w="38100">
+              <a:solidFill>
+                <a:srgbClr val="00B0F0"/>
+              </a:solidFill>
+            </a:ln>
+          </p:spPr>
+          <p:style>
+            <a:lnRef idx="2">
+              <a:schemeClr val="accent1">
+                <a:shade val="50000"/>
+              </a:schemeClr>
+            </a:lnRef>
+            <a:fillRef idx="1">
+              <a:schemeClr val="accent1"/>
+            </a:fillRef>
+            <a:effectRef idx="0">
+              <a:schemeClr val="accent1"/>
+            </a:effectRef>
+            <a:fontRef idx="minor">
+              <a:schemeClr val="lt1"/>
+            </a:fontRef>
+          </p:style>
+          <p:txBody>
+            <a:bodyPr rtlCol="0" anchor="ctr"/>
+            <a:lstStyle/>
+            <a:p>
+              <a:pPr algn="ctr"/>
+              <a:endParaRPr lang="en-GB"/>
+            </a:p>
+          </p:txBody>
+        </p:sp>
+        <p:sp>
+          <p:nvSpPr>
+            <p:cNvPr id="51" name="Oval 50"/>
+            <p:cNvSpPr/>
+            <p:nvPr/>
+          </p:nvSpPr>
+          <p:spPr>
+            <a:xfrm>
+              <a:off x="4810546" y="931119"/>
+              <a:ext cx="1209033" cy="671746"/>
+            </a:xfrm>
+            <a:prstGeom prst="ellipse">
+              <a:avLst/>
+            </a:prstGeom>
+            <a:noFill/>
+            <a:ln w="38100">
+              <a:solidFill>
+                <a:srgbClr val="00B0F0"/>
+              </a:solidFill>
+            </a:ln>
+          </p:spPr>
+          <p:style>
+            <a:lnRef idx="2">
+              <a:schemeClr val="accent1">
+                <a:shade val="50000"/>
+              </a:schemeClr>
+            </a:lnRef>
+            <a:fillRef idx="1">
+              <a:schemeClr val="accent1"/>
+            </a:fillRef>
+            <a:effectRef idx="0">
+              <a:schemeClr val="accent1"/>
+            </a:effectRef>
+            <a:fontRef idx="minor">
+              <a:schemeClr val="lt1"/>
+            </a:fontRef>
+          </p:style>
+          <p:txBody>
+            <a:bodyPr rtlCol="0" anchor="ctr"/>
+            <a:lstStyle/>
+            <a:p>
+              <a:pPr algn="ctr"/>
+              <a:endParaRPr lang="en-GB"/>
+            </a:p>
+          </p:txBody>
+        </p:sp>
+      </p:grpSp>
+      <p:sp>
+        <p:nvSpPr>
+          <p:cNvPr id="52" name="TextBox 51"/>
+          <p:cNvSpPr txBox="1"/>
+          <p:nvPr/>
+        </p:nvSpPr>
+        <p:spPr>
+          <a:xfrm>
+            <a:off x="7961629" y="2245536"/>
+            <a:ext cx="1542911" cy="369332"/>
+          </a:xfrm>
+          <a:prstGeom prst="rect">
+            <a:avLst/>
+          </a:prstGeom>
+          <a:noFill/>
+        </p:spPr>
+        <p:txBody>
+          <a:bodyPr wrap="square" rtlCol="0">
+            <a:spAutoFit/>
+          </a:bodyPr>
+          <a:lstStyle/>
+          <a:p>
+            <a:pPr algn="ctr"/>
+            <a:r>
+              <a:rPr lang="en-GB" dirty="0" smtClean="0"/>
+              <a:t>MEMS sensor</a:t>
+            </a:r>
+            <a:endParaRPr lang="en-GB" dirty="0"/>
+          </a:p>
+        </p:txBody>
+      </p:sp>
+      <p:sp>
+        <p:nvSpPr>
+          <p:cNvPr id="53" name="TextBox 52"/>
+          <p:cNvSpPr txBox="1"/>
+          <p:nvPr/>
+        </p:nvSpPr>
+        <p:spPr>
+          <a:xfrm>
+            <a:off x="8393837" y="2990206"/>
+            <a:ext cx="1877368" cy="369332"/>
+          </a:xfrm>
+          <a:prstGeom prst="rect">
+            <a:avLst/>
+          </a:prstGeom>
+          <a:noFill/>
+        </p:spPr>
+        <p:txBody>
+          <a:bodyPr wrap="square" rtlCol="0">
+            <a:spAutoFit/>
+          </a:bodyPr>
+          <a:lstStyle/>
+          <a:p>
+            <a:r>
+              <a:rPr lang="en-GB" dirty="0" smtClean="0"/>
+              <a:t>Mechanical Fixing</a:t>
+            </a:r>
+            <a:endParaRPr lang="en-GB" dirty="0"/>
+          </a:p>
+        </p:txBody>
+      </p:sp>
+      <p:sp>
+        <p:nvSpPr>
+          <p:cNvPr id="54" name="AutoShape 4"/>
+          <p:cNvSpPr>
+            <a:spLocks noChangeArrowheads="1"/>
+          </p:cNvSpPr>
+          <p:nvPr/>
+        </p:nvSpPr>
+        <p:spPr bwMode="auto">
+          <a:xfrm>
+            <a:off x="4500886" y="1864748"/>
+            <a:ext cx="1759222" cy="791698"/>
+          </a:xfrm>
+          <a:prstGeom prst="cube">
+            <a:avLst>
+              <a:gd name="adj" fmla="val 0"/>
+            </a:avLst>
+          </a:prstGeom>
+          <a:solidFill>
+            <a:srgbClr val="FF3300"/>
+          </a:solidFill>
+          <a:ln w="9525">
+            <a:solidFill>
+              <a:schemeClr val="tx1"/>
+            </a:solidFill>
+            <a:miter lim="800000"/>
+            <a:headEnd/>
+            <a:tailEnd/>
+          </a:ln>
+          <a:effectLst/>
+          <a:scene3d>
+            <a:camera prst="orthographicFront">
+              <a:rot lat="0" lon="0" rev="0"/>
+            </a:camera>
+            <a:lightRig rig="threePt" dir="t"/>
+          </a:scene3d>
+          <a:extLst>
+            <a:ext uri="{AF507438-7753-43E0-B8FC-AC1667EBCBE1}">
+              <a14:hiddenEffects xmlns:a14="http://schemas.microsoft.com/office/drawing/2010/main">
+                <a:effectLst>
+                  <a:outerShdw dist="35921" dir="2700000" algn="ctr" rotWithShape="0">
+                    <a:schemeClr val="bg2"/>
+                  </a:outerShdw>
+                </a:effectLst>
+              </a14:hiddenEffects>
+            </a:ext>
+          </a:extLst>
+        </p:spPr>
+        <p:txBody>
+          <a:bodyPr wrap="none" anchor="ctr"/>
+          <a:lstStyle/>
+          <a:p>
+            <a:pPr algn="ctr"/>
+            <a:r>
+              <a:rPr lang="en-GB" dirty="0" smtClean="0"/>
+              <a:t>MSP432 </a:t>
+            </a:r>
+          </a:p>
+          <a:p>
+            <a:pPr algn="ctr"/>
+            <a:r>
+              <a:rPr lang="en-GB" dirty="0" smtClean="0"/>
+              <a:t>Launchpad</a:t>
+            </a:r>
+            <a:endParaRPr lang="en-GB" dirty="0"/>
+          </a:p>
+        </p:txBody>
+      </p:sp>
+      <p:cxnSp>
+        <p:nvCxnSpPr>
+          <p:cNvPr id="55" name="Straight Connector 54"/>
+          <p:cNvCxnSpPr/>
+          <p:nvPr/>
+        </p:nvCxnSpPr>
+        <p:spPr>
+          <a:xfrm>
+            <a:off x="2872399" y="3417331"/>
+            <a:ext cx="505813" cy="0"/>
+          </a:xfrm>
+          <a:prstGeom prst="line">
+            <a:avLst/>
+          </a:prstGeom>
+          <a:ln w="38100">
+            <a:solidFill>
+              <a:schemeClr val="tx1"/>
+            </a:solidFill>
+          </a:ln>
+        </p:spPr>
+        <p:style>
+          <a:lnRef idx="1">
+            <a:schemeClr val="accent1"/>
+          </a:lnRef>
+          <a:fillRef idx="0">
+            <a:schemeClr val="accent1"/>
+          </a:fillRef>
+          <a:effectRef idx="0">
+            <a:schemeClr val="accent1"/>
+          </a:effectRef>
+          <a:fontRef idx="minor">
+            <a:schemeClr val="tx1"/>
+          </a:fontRef>
+        </p:style>
+      </p:cxnSp>
+      <p:cxnSp>
+        <p:nvCxnSpPr>
+          <p:cNvPr id="57" name="Straight Connector 56"/>
+          <p:cNvCxnSpPr/>
+          <p:nvPr/>
+        </p:nvCxnSpPr>
+        <p:spPr>
+          <a:xfrm>
+            <a:off x="2872399" y="2517040"/>
+            <a:ext cx="1628487" cy="0"/>
+          </a:xfrm>
+          <a:prstGeom prst="line">
+            <a:avLst/>
+          </a:prstGeom>
+          <a:ln w="38100">
+            <a:solidFill>
+              <a:schemeClr val="tx1"/>
+            </a:solidFill>
+          </a:ln>
+        </p:spPr>
+        <p:style>
+          <a:lnRef idx="1">
+            <a:schemeClr val="accent1"/>
+          </a:lnRef>
+          <a:fillRef idx="0">
+            <a:schemeClr val="accent1"/>
+          </a:fillRef>
+          <a:effectRef idx="0">
+            <a:schemeClr val="accent1"/>
+          </a:effectRef>
+          <a:fontRef idx="minor">
+            <a:schemeClr val="tx1"/>
+          </a:fontRef>
+        </p:style>
+      </p:cxnSp>
+      <p:cxnSp>
+        <p:nvCxnSpPr>
+          <p:cNvPr id="59" name="Straight Connector 58"/>
+          <p:cNvCxnSpPr/>
+          <p:nvPr/>
+        </p:nvCxnSpPr>
+        <p:spPr>
+          <a:xfrm flipV="1">
+            <a:off x="2872399" y="2501871"/>
+            <a:ext cx="0" cy="678057"/>
+          </a:xfrm>
+          <a:prstGeom prst="line">
+            <a:avLst/>
+          </a:prstGeom>
+          <a:ln w="38100">
+            <a:solidFill>
+              <a:schemeClr val="tx1"/>
+            </a:solidFill>
+          </a:ln>
+        </p:spPr>
+        <p:style>
+          <a:lnRef idx="1">
+            <a:schemeClr val="accent1"/>
+          </a:lnRef>
+          <a:fillRef idx="0">
+            <a:schemeClr val="accent1"/>
+          </a:fillRef>
+          <a:effectRef idx="0">
+            <a:schemeClr val="accent1"/>
+          </a:effectRef>
+          <a:fontRef idx="minor">
+            <a:schemeClr val="tx1"/>
+          </a:fontRef>
+        </p:style>
+      </p:cxnSp>
+      <p:cxnSp>
+        <p:nvCxnSpPr>
+          <p:cNvPr id="65" name="Straight Connector 64"/>
+          <p:cNvCxnSpPr/>
+          <p:nvPr/>
+        </p:nvCxnSpPr>
+        <p:spPr>
+          <a:xfrm>
+            <a:off x="6260108" y="2482401"/>
+            <a:ext cx="1628487" cy="0"/>
+          </a:xfrm>
+          <a:prstGeom prst="line">
+            <a:avLst/>
+          </a:prstGeom>
+          <a:ln w="38100">
+            <a:solidFill>
+              <a:schemeClr val="tx1"/>
+            </a:solidFill>
+          </a:ln>
+        </p:spPr>
+        <p:style>
+          <a:lnRef idx="1">
+            <a:schemeClr val="accent1"/>
+          </a:lnRef>
+          <a:fillRef idx="0">
+            <a:schemeClr val="accent1"/>
+          </a:fillRef>
+          <a:effectRef idx="0">
+            <a:schemeClr val="accent1"/>
+          </a:effectRef>
+          <a:fontRef idx="minor">
+            <a:schemeClr val="tx1"/>
+          </a:fontRef>
+        </p:style>
+      </p:cxnSp>
+      <p:cxnSp>
+        <p:nvCxnSpPr>
+          <p:cNvPr id="66" name="Straight Connector 65"/>
+          <p:cNvCxnSpPr>
+            <a:stCxn id="28" idx="1"/>
+          </p:cNvCxnSpPr>
+          <p:nvPr/>
+        </p:nvCxnSpPr>
+        <p:spPr>
+          <a:xfrm flipV="1">
+            <a:off x="7876054" y="2466155"/>
+            <a:ext cx="2478" cy="362382"/>
+          </a:xfrm>
+          <a:prstGeom prst="line">
+            <a:avLst/>
+          </a:prstGeom>
+          <a:ln w="38100">
+            <a:solidFill>
+              <a:schemeClr val="tx1"/>
+            </a:solidFill>
+          </a:ln>
+        </p:spPr>
+        <p:style>
+          <a:lnRef idx="1">
+            <a:schemeClr val="accent1"/>
+          </a:lnRef>
+          <a:fillRef idx="0">
+            <a:schemeClr val="accent1"/>
+          </a:fillRef>
+          <a:effectRef idx="0">
+            <a:schemeClr val="accent1"/>
+          </a:effectRef>
+          <a:fontRef idx="minor">
+            <a:schemeClr val="tx1"/>
+          </a:fontRef>
+        </p:style>
+      </p:cxnSp>
+      <p:sp>
+        <p:nvSpPr>
+          <p:cNvPr id="68" name="AutoShape 4"/>
+          <p:cNvSpPr>
+            <a:spLocks noChangeArrowheads="1"/>
+          </p:cNvSpPr>
+          <p:nvPr/>
+        </p:nvSpPr>
+        <p:spPr bwMode="auto">
+          <a:xfrm>
+            <a:off x="1187819" y="1629611"/>
+            <a:ext cx="1314872" cy="797124"/>
+          </a:xfrm>
+          <a:prstGeom prst="cube">
+            <a:avLst>
+              <a:gd name="adj" fmla="val 0"/>
+            </a:avLst>
+          </a:prstGeom>
+          <a:solidFill>
+            <a:schemeClr val="bg1"/>
+          </a:solidFill>
+          <a:ln w="9525">
+            <a:solidFill>
+              <a:schemeClr val="tx1"/>
+            </a:solidFill>
+            <a:miter lim="800000"/>
+            <a:headEnd/>
+            <a:tailEnd/>
+          </a:ln>
+          <a:effectLst/>
+          <a:scene3d>
+            <a:camera prst="orthographicFront">
+              <a:rot lat="0" lon="0" rev="0"/>
+            </a:camera>
+            <a:lightRig rig="threePt" dir="t"/>
+          </a:scene3d>
+        </p:spPr>
+        <p:txBody>
+          <a:bodyPr wrap="none" anchor="ctr"/>
+          <a:lstStyle/>
+          <a:p>
+            <a:pPr algn="ctr"/>
+            <a:r>
+              <a:rPr lang="en-GB" dirty="0" smtClean="0"/>
+              <a:t>Computer</a:t>
+            </a:r>
+            <a:endParaRPr lang="en-GB" dirty="0"/>
+          </a:p>
+        </p:txBody>
+      </p:sp>
+      <p:cxnSp>
+        <p:nvCxnSpPr>
+          <p:cNvPr id="69" name="Straight Connector 68"/>
+          <p:cNvCxnSpPr/>
+          <p:nvPr/>
+        </p:nvCxnSpPr>
+        <p:spPr>
+          <a:xfrm flipV="1">
+            <a:off x="2502691" y="2028173"/>
+            <a:ext cx="1998195" cy="2508"/>
+          </a:xfrm>
+          <a:prstGeom prst="line">
+            <a:avLst/>
+          </a:prstGeom>
+          <a:ln w="38100">
+            <a:solidFill>
+              <a:schemeClr val="tx1"/>
+            </a:solidFill>
+          </a:ln>
+        </p:spPr>
+        <p:style>
+          <a:lnRef idx="1">
+            <a:schemeClr val="accent1"/>
+          </a:lnRef>
+          <a:fillRef idx="0">
+            <a:schemeClr val="accent1"/>
+          </a:fillRef>
+          <a:effectRef idx="0">
+            <a:schemeClr val="accent1"/>
+          </a:effectRef>
+          <a:fontRef idx="minor">
+            <a:schemeClr val="tx1"/>
+          </a:fontRef>
+        </p:style>
+      </p:cxnSp>
+      <p:sp>
+        <p:nvSpPr>
+          <p:cNvPr id="73" name="TextBox 72"/>
+          <p:cNvSpPr txBox="1"/>
+          <p:nvPr/>
+        </p:nvSpPr>
+        <p:spPr>
+          <a:xfrm>
+            <a:off x="5422062" y="4036846"/>
+            <a:ext cx="1542911" cy="369332"/>
+          </a:xfrm>
+          <a:prstGeom prst="rect">
+            <a:avLst/>
+          </a:prstGeom>
+          <a:noFill/>
+        </p:spPr>
+        <p:txBody>
+          <a:bodyPr wrap="square" rtlCol="0">
+            <a:spAutoFit/>
+          </a:bodyPr>
+          <a:lstStyle/>
+          <a:p>
+            <a:pPr algn="ctr"/>
+            <a:r>
+              <a:rPr lang="en-GB" dirty="0" smtClean="0"/>
+              <a:t>Bearing 3</a:t>
+            </a:r>
+            <a:endParaRPr lang="en-GB" dirty="0"/>
+          </a:p>
+        </p:txBody>
+      </p:sp>
+      <p:sp>
+        <p:nvSpPr>
+          <p:cNvPr id="74" name="TextBox 73"/>
+          <p:cNvSpPr txBox="1"/>
+          <p:nvPr/>
+        </p:nvSpPr>
+        <p:spPr>
+          <a:xfrm>
+            <a:off x="7117139" y="4036846"/>
+            <a:ext cx="1542911" cy="369332"/>
+          </a:xfrm>
+          <a:prstGeom prst="rect">
+            <a:avLst/>
+          </a:prstGeom>
+          <a:noFill/>
+        </p:spPr>
+        <p:txBody>
+          <a:bodyPr wrap="square" rtlCol="0">
+            <a:spAutoFit/>
+          </a:bodyPr>
+          <a:lstStyle/>
+          <a:p>
+            <a:pPr algn="ctr"/>
+            <a:r>
+              <a:rPr lang="en-GB" dirty="0" smtClean="0"/>
+              <a:t>Bearing 2</a:t>
+            </a:r>
+            <a:endParaRPr lang="en-GB" dirty="0"/>
+          </a:p>
+        </p:txBody>
+      </p:sp>
+      <p:sp>
+        <p:nvSpPr>
+          <p:cNvPr id="75" name="TextBox 74"/>
+          <p:cNvSpPr txBox="1"/>
+          <p:nvPr/>
+        </p:nvSpPr>
+        <p:spPr>
+          <a:xfrm>
+            <a:off x="8813384" y="4036846"/>
+            <a:ext cx="1542911" cy="369332"/>
+          </a:xfrm>
+          <a:prstGeom prst="rect">
+            <a:avLst/>
+          </a:prstGeom>
+          <a:noFill/>
+        </p:spPr>
+        <p:txBody>
+          <a:bodyPr wrap="square" rtlCol="0">
+            <a:spAutoFit/>
+          </a:bodyPr>
+          <a:lstStyle/>
+          <a:p>
+            <a:pPr algn="ctr"/>
+            <a:r>
+              <a:rPr lang="en-GB" dirty="0" smtClean="0"/>
+              <a:t>Bearing 1</a:t>
+            </a:r>
+            <a:endParaRPr lang="en-GB" dirty="0"/>
+          </a:p>
+        </p:txBody>
+      </p:sp>
+      <p:cxnSp>
+        <p:nvCxnSpPr>
+          <p:cNvPr id="76" name="Straight Arrow Connector 75"/>
+          <p:cNvCxnSpPr>
+            <a:endCxn id="51" idx="1"/>
+          </p:cNvCxnSpPr>
+          <p:nvPr/>
+        </p:nvCxnSpPr>
+        <p:spPr>
+          <a:xfrm>
+            <a:off x="2476984" y="3105996"/>
+            <a:ext cx="181258" cy="155231"/>
+          </a:xfrm>
+          <a:prstGeom prst="straightConnector1">
+            <a:avLst/>
+          </a:prstGeom>
+          <a:ln w="38100">
+            <a:solidFill>
+              <a:schemeClr val="tx1"/>
+            </a:solidFill>
+            <a:tailEnd type="triangle"/>
+          </a:ln>
+        </p:spPr>
+        <p:style>
+          <a:lnRef idx="1">
+            <a:schemeClr val="accent1"/>
+          </a:lnRef>
+          <a:fillRef idx="0">
+            <a:schemeClr val="accent1"/>
+          </a:fillRef>
+          <a:effectRef idx="0">
+            <a:schemeClr val="accent1"/>
+          </a:effectRef>
+          <a:fontRef idx="minor">
+            <a:schemeClr val="tx1"/>
+          </a:fontRef>
+        </p:style>
+      </p:cxnSp>
+      <p:cxnSp>
+        <p:nvCxnSpPr>
+          <p:cNvPr id="78" name="Straight Arrow Connector 77"/>
+          <p:cNvCxnSpPr/>
+          <p:nvPr/>
+        </p:nvCxnSpPr>
+        <p:spPr>
+          <a:xfrm flipH="1">
+            <a:off x="8081159" y="2561992"/>
+            <a:ext cx="177144" cy="224244"/>
+          </a:xfrm>
+          <a:prstGeom prst="straightConnector1">
+            <a:avLst/>
+          </a:prstGeom>
+          <a:ln w="38100">
+            <a:solidFill>
+              <a:schemeClr val="tx1"/>
+            </a:solidFill>
+            <a:tailEnd type="triangle"/>
+          </a:ln>
+        </p:spPr>
+        <p:style>
+          <a:lnRef idx="1">
+            <a:schemeClr val="accent1"/>
+          </a:lnRef>
+          <a:fillRef idx="0">
+            <a:schemeClr val="accent1"/>
+          </a:fillRef>
+          <a:effectRef idx="0">
+            <a:schemeClr val="accent1"/>
+          </a:effectRef>
+          <a:fontRef idx="minor">
+            <a:schemeClr val="tx1"/>
+          </a:fontRef>
+        </p:style>
+      </p:cxnSp>
+      <p:cxnSp>
+        <p:nvCxnSpPr>
+          <p:cNvPr id="82" name="Straight Arrow Connector 81"/>
+          <p:cNvCxnSpPr>
+            <a:endCxn id="27" idx="4"/>
+          </p:cNvCxnSpPr>
+          <p:nvPr/>
+        </p:nvCxnSpPr>
+        <p:spPr>
+          <a:xfrm flipH="1">
+            <a:off x="8006489" y="3213470"/>
+            <a:ext cx="419961" cy="115035"/>
+          </a:xfrm>
+          <a:prstGeom prst="straightConnector1">
+            <a:avLst/>
+          </a:prstGeom>
+          <a:ln w="38100">
+            <a:solidFill>
+              <a:schemeClr val="tx1"/>
+            </a:solidFill>
+            <a:tailEnd type="triangle"/>
+          </a:ln>
+        </p:spPr>
+        <p:style>
+          <a:lnRef idx="1">
+            <a:schemeClr val="accent1"/>
+          </a:lnRef>
+          <a:fillRef idx="0">
+            <a:schemeClr val="accent1"/>
+          </a:fillRef>
+          <a:effectRef idx="0">
+            <a:schemeClr val="accent1"/>
+          </a:effectRef>
+          <a:fontRef idx="minor">
+            <a:schemeClr val="tx1"/>
+          </a:fontRef>
+        </p:style>
+      </p:cxnSp>
+    </p:spTree>
+    <p:extLst>
+      <p:ext uri="{BB962C8B-B14F-4D97-AF65-F5344CB8AC3E}">
+        <p14:creationId xmlns:p14="http://schemas.microsoft.com/office/powerpoint/2010/main" val="1488683552"/>
+      </p:ext>
+    </p:extLst>
+  </p:cSld>
+  <p:clrMapOvr>
+    <a:masterClrMapping/>
+  </p:clrMapOvr>
+  <p:timing>
+    <p:tnLst>
+      <p:par>
+        <p:cTn id="1" dur="indefinite" restart="never" nodeType="tmRoot"/>
+      </p:par>
+    </p:tnLst>
+  </p:timing>
+</p:sld>
+</file>
+
 <file path=ppt/theme/theme1.xml><?xml version="1.0" encoding="utf-8"?>
 <a:theme xmlns:a="http://schemas.openxmlformats.org/drawingml/2006/main" name="Office Theme">
   <a:themeElements>

</xml_diff>

<commit_message>
More pictures for report
</commit_message>
<xml_diff>
--- a/Report/Dissertation/Images/TestSetup1.pptx
+++ b/Report/Dissertation/Images/TestSetup1.pptx
@@ -12,6 +12,7 @@
     <p:sldId id="260" r:id="rId6"/>
     <p:sldId id="261" r:id="rId7"/>
     <p:sldId id="262" r:id="rId8"/>
+    <p:sldId id="263" r:id="rId9"/>
   </p:sldIdLst>
   <p:sldSz cx="12192000" cy="6858000"/>
   <p:notesSz cx="6858000" cy="9144000"/>
@@ -249,7 +250,7 @@
           <a:p>
             <a:fld id="{89D09D1E-3207-441C-A9AD-878DAAA5462A}" type="datetimeFigureOut">
               <a:rPr lang="en-GB" smtClean="0"/>
-              <a:t>26/08/2018</a:t>
+              <a:t>27/08/2018</a:t>
             </a:fld>
             <a:endParaRPr lang="en-GB"/>
           </a:p>
@@ -419,7 +420,7 @@
           <a:p>
             <a:fld id="{89D09D1E-3207-441C-A9AD-878DAAA5462A}" type="datetimeFigureOut">
               <a:rPr lang="en-GB" smtClean="0"/>
-              <a:t>26/08/2018</a:t>
+              <a:t>27/08/2018</a:t>
             </a:fld>
             <a:endParaRPr lang="en-GB"/>
           </a:p>
@@ -599,7 +600,7 @@
           <a:p>
             <a:fld id="{89D09D1E-3207-441C-A9AD-878DAAA5462A}" type="datetimeFigureOut">
               <a:rPr lang="en-GB" smtClean="0"/>
-              <a:t>26/08/2018</a:t>
+              <a:t>27/08/2018</a:t>
             </a:fld>
             <a:endParaRPr lang="en-GB"/>
           </a:p>
@@ -769,7 +770,7 @@
           <a:p>
             <a:fld id="{89D09D1E-3207-441C-A9AD-878DAAA5462A}" type="datetimeFigureOut">
               <a:rPr lang="en-GB" smtClean="0"/>
-              <a:t>26/08/2018</a:t>
+              <a:t>27/08/2018</a:t>
             </a:fld>
             <a:endParaRPr lang="en-GB"/>
           </a:p>
@@ -1015,7 +1016,7 @@
           <a:p>
             <a:fld id="{89D09D1E-3207-441C-A9AD-878DAAA5462A}" type="datetimeFigureOut">
               <a:rPr lang="en-GB" smtClean="0"/>
-              <a:t>26/08/2018</a:t>
+              <a:t>27/08/2018</a:t>
             </a:fld>
             <a:endParaRPr lang="en-GB"/>
           </a:p>
@@ -1247,7 +1248,7 @@
           <a:p>
             <a:fld id="{89D09D1E-3207-441C-A9AD-878DAAA5462A}" type="datetimeFigureOut">
               <a:rPr lang="en-GB" smtClean="0"/>
-              <a:t>26/08/2018</a:t>
+              <a:t>27/08/2018</a:t>
             </a:fld>
             <a:endParaRPr lang="en-GB"/>
           </a:p>
@@ -1614,7 +1615,7 @@
           <a:p>
             <a:fld id="{89D09D1E-3207-441C-A9AD-878DAAA5462A}" type="datetimeFigureOut">
               <a:rPr lang="en-GB" smtClean="0"/>
-              <a:t>26/08/2018</a:t>
+              <a:t>27/08/2018</a:t>
             </a:fld>
             <a:endParaRPr lang="en-GB"/>
           </a:p>
@@ -1732,7 +1733,7 @@
           <a:p>
             <a:fld id="{89D09D1E-3207-441C-A9AD-878DAAA5462A}" type="datetimeFigureOut">
               <a:rPr lang="en-GB" smtClean="0"/>
-              <a:t>26/08/2018</a:t>
+              <a:t>27/08/2018</a:t>
             </a:fld>
             <a:endParaRPr lang="en-GB"/>
           </a:p>
@@ -1827,7 +1828,7 @@
           <a:p>
             <a:fld id="{89D09D1E-3207-441C-A9AD-878DAAA5462A}" type="datetimeFigureOut">
               <a:rPr lang="en-GB" smtClean="0"/>
-              <a:t>26/08/2018</a:t>
+              <a:t>27/08/2018</a:t>
             </a:fld>
             <a:endParaRPr lang="en-GB"/>
           </a:p>
@@ -2104,7 +2105,7 @@
           <a:p>
             <a:fld id="{89D09D1E-3207-441C-A9AD-878DAAA5462A}" type="datetimeFigureOut">
               <a:rPr lang="en-GB" smtClean="0"/>
-              <a:t>26/08/2018</a:t>
+              <a:t>27/08/2018</a:t>
             </a:fld>
             <a:endParaRPr lang="en-GB"/>
           </a:p>
@@ -2357,7 +2358,7 @@
           <a:p>
             <a:fld id="{89D09D1E-3207-441C-A9AD-878DAAA5462A}" type="datetimeFigureOut">
               <a:rPr lang="en-GB" smtClean="0"/>
-              <a:t>26/08/2018</a:t>
+              <a:t>27/08/2018</a:t>
             </a:fld>
             <a:endParaRPr lang="en-GB"/>
           </a:p>
@@ -2570,7 +2571,7 @@
           <a:p>
             <a:fld id="{89D09D1E-3207-441C-A9AD-878DAAA5462A}" type="datetimeFigureOut">
               <a:rPr lang="en-GB" smtClean="0"/>
-              <a:t>26/08/2018</a:t>
+              <a:t>27/08/2018</a:t>
             </a:fld>
             <a:endParaRPr lang="en-GB"/>
           </a:p>
@@ -8100,6 +8101,182 @@
 </p:sld>
 </file>
 
+<file path=ppt/slides/slide8.xml><?xml version="1.0" encoding="utf-8"?>
+<p:sld xmlns:a="http://schemas.openxmlformats.org/drawingml/2006/main" xmlns:r="http://schemas.openxmlformats.org/officeDocument/2006/relationships" xmlns:p="http://schemas.openxmlformats.org/presentationml/2006/main">
+  <p:cSld>
+    <p:spTree>
+      <p:nvGrpSpPr>
+        <p:cNvPr id="1" name=""/>
+        <p:cNvGrpSpPr/>
+        <p:nvPr/>
+      </p:nvGrpSpPr>
+      <p:grpSpPr>
+        <a:xfrm>
+          <a:off x="0" y="0"/>
+          <a:ext cx="0" cy="0"/>
+          <a:chOff x="0" y="0"/>
+          <a:chExt cx="0" cy="0"/>
+        </a:xfrm>
+      </p:grpSpPr>
+      <p:pic>
+        <p:nvPicPr>
+          <p:cNvPr id="7" name="Picture 6"/>
+          <p:cNvPicPr>
+            <a:picLocks noChangeAspect="1"/>
+          </p:cNvPicPr>
+          <p:nvPr/>
+        </p:nvPicPr>
+        <p:blipFill>
+          <a:blip r:embed="rId2"/>
+          <a:stretch>
+            <a:fillRect/>
+          </a:stretch>
+        </p:blipFill>
+        <p:spPr>
+          <a:xfrm>
+            <a:off x="7445034" y="2036707"/>
+            <a:ext cx="3702900" cy="2813621"/>
+          </a:xfrm>
+          <a:prstGeom prst="rect">
+            <a:avLst/>
+          </a:prstGeom>
+        </p:spPr>
+      </p:pic>
+      <p:grpSp>
+        <p:nvGrpSpPr>
+          <p:cNvPr id="9" name="Group 8"/>
+          <p:cNvGrpSpPr/>
+          <p:nvPr/>
+        </p:nvGrpSpPr>
+        <p:grpSpPr>
+          <a:xfrm>
+            <a:off x="1094756" y="2042555"/>
+            <a:ext cx="4477217" cy="2845068"/>
+            <a:chOff x="1094756" y="2042555"/>
+            <a:chExt cx="4477217" cy="2845068"/>
+          </a:xfrm>
+        </p:grpSpPr>
+        <p:pic>
+          <p:nvPicPr>
+            <p:cNvPr id="5" name="Picture 4"/>
+            <p:cNvPicPr>
+              <a:picLocks noChangeAspect="1"/>
+            </p:cNvPicPr>
+            <p:nvPr/>
+          </p:nvPicPr>
+          <p:blipFill>
+            <a:blip r:embed="rId3"/>
+            <a:stretch>
+              <a:fillRect/>
+            </a:stretch>
+          </p:blipFill>
+          <p:spPr>
+            <a:xfrm>
+              <a:off x="1094756" y="2042555"/>
+              <a:ext cx="4477217" cy="2845068"/>
+            </a:xfrm>
+            <a:prstGeom prst="rect">
+              <a:avLst/>
+            </a:prstGeom>
+          </p:spPr>
+        </p:pic>
+        <p:sp>
+          <p:nvSpPr>
+            <p:cNvPr id="8" name="Oval 7"/>
+            <p:cNvSpPr/>
+            <p:nvPr/>
+          </p:nvSpPr>
+          <p:spPr>
+            <a:xfrm>
+              <a:off x="1371600" y="4469328"/>
+              <a:ext cx="472440" cy="381000"/>
+            </a:xfrm>
+            <a:prstGeom prst="ellipse">
+              <a:avLst/>
+            </a:prstGeom>
+            <a:solidFill>
+              <a:schemeClr val="bg1"/>
+            </a:solidFill>
+            <a:ln>
+              <a:solidFill>
+                <a:schemeClr val="bg1"/>
+              </a:solidFill>
+            </a:ln>
+          </p:spPr>
+          <p:style>
+            <a:lnRef idx="2">
+              <a:schemeClr val="accent1">
+                <a:shade val="50000"/>
+              </a:schemeClr>
+            </a:lnRef>
+            <a:fillRef idx="1">
+              <a:schemeClr val="accent1"/>
+            </a:fillRef>
+            <a:effectRef idx="0">
+              <a:schemeClr val="accent1"/>
+            </a:effectRef>
+            <a:fontRef idx="minor">
+              <a:schemeClr val="lt1"/>
+            </a:fontRef>
+          </p:style>
+          <p:txBody>
+            <a:bodyPr rtlCol="0" anchor="ctr"/>
+            <a:lstStyle/>
+            <a:p>
+              <a:pPr algn="ctr"/>
+              <a:endParaRPr lang="en-GB"/>
+            </a:p>
+          </p:txBody>
+        </p:sp>
+      </p:grpSp>
+      <p:pic>
+        <p:nvPicPr>
+          <p:cNvPr id="6" name="Picture 5"/>
+          <p:cNvPicPr>
+            <a:picLocks noChangeAspect="1"/>
+          </p:cNvPicPr>
+          <p:nvPr/>
+        </p:nvPicPr>
+        <p:blipFill>
+          <a:blip r:embed="rId4">
+            <a:clrChange>
+              <a:clrFrom>
+                <a:srgbClr val="FFFFFF"/>
+              </a:clrFrom>
+              <a:clrTo>
+                <a:srgbClr val="FFFFFF">
+                  <a:alpha val="0"/>
+                </a:srgbClr>
+              </a:clrTo>
+            </a:clrChange>
+          </a:blip>
+          <a:stretch>
+            <a:fillRect/>
+          </a:stretch>
+        </p:blipFill>
+        <p:spPr>
+          <a:xfrm>
+            <a:off x="4819267" y="2036707"/>
+            <a:ext cx="2700169" cy="2813622"/>
+          </a:xfrm>
+          <a:prstGeom prst="rect">
+            <a:avLst/>
+          </a:prstGeom>
+        </p:spPr>
+      </p:pic>
+    </p:spTree>
+    <p:extLst>
+      <p:ext uri="{BB962C8B-B14F-4D97-AF65-F5344CB8AC3E}">
+        <p14:creationId xmlns:p14="http://schemas.microsoft.com/office/powerpoint/2010/main" val="3775812930"/>
+      </p:ext>
+    </p:extLst>
+  </p:cSld>
+  <p:clrMapOvr>
+    <a:masterClrMapping/>
+  </p:clrMapOvr>
+</p:sld>
+</file>
+
 <file path=ppt/theme/theme1.xml><?xml version="1.0" encoding="utf-8"?>
 <a:theme xmlns:a="http://schemas.openxmlformats.org/drawingml/2006/main" name="Office Theme">
   <a:themeElements>

</xml_diff>

<commit_message>
Lots of new or corrected images
</commit_message>
<xml_diff>
--- a/Report/Dissertation/Images/TestSetup1.pptx
+++ b/Report/Dissertation/Images/TestSetup1.pptx
@@ -250,7 +250,7 @@
           <a:p>
             <a:fld id="{89D09D1E-3207-441C-A9AD-878DAAA5462A}" type="datetimeFigureOut">
               <a:rPr lang="en-GB" smtClean="0"/>
-              <a:t>27/08/2018</a:t>
+              <a:t>28/08/2018</a:t>
             </a:fld>
             <a:endParaRPr lang="en-GB"/>
           </a:p>
@@ -420,7 +420,7 @@
           <a:p>
             <a:fld id="{89D09D1E-3207-441C-A9AD-878DAAA5462A}" type="datetimeFigureOut">
               <a:rPr lang="en-GB" smtClean="0"/>
-              <a:t>27/08/2018</a:t>
+              <a:t>28/08/2018</a:t>
             </a:fld>
             <a:endParaRPr lang="en-GB"/>
           </a:p>
@@ -600,7 +600,7 @@
           <a:p>
             <a:fld id="{89D09D1E-3207-441C-A9AD-878DAAA5462A}" type="datetimeFigureOut">
               <a:rPr lang="en-GB" smtClean="0"/>
-              <a:t>27/08/2018</a:t>
+              <a:t>28/08/2018</a:t>
             </a:fld>
             <a:endParaRPr lang="en-GB"/>
           </a:p>
@@ -770,7 +770,7 @@
           <a:p>
             <a:fld id="{89D09D1E-3207-441C-A9AD-878DAAA5462A}" type="datetimeFigureOut">
               <a:rPr lang="en-GB" smtClean="0"/>
-              <a:t>27/08/2018</a:t>
+              <a:t>28/08/2018</a:t>
             </a:fld>
             <a:endParaRPr lang="en-GB"/>
           </a:p>
@@ -1016,7 +1016,7 @@
           <a:p>
             <a:fld id="{89D09D1E-3207-441C-A9AD-878DAAA5462A}" type="datetimeFigureOut">
               <a:rPr lang="en-GB" smtClean="0"/>
-              <a:t>27/08/2018</a:t>
+              <a:t>28/08/2018</a:t>
             </a:fld>
             <a:endParaRPr lang="en-GB"/>
           </a:p>
@@ -1248,7 +1248,7 @@
           <a:p>
             <a:fld id="{89D09D1E-3207-441C-A9AD-878DAAA5462A}" type="datetimeFigureOut">
               <a:rPr lang="en-GB" smtClean="0"/>
-              <a:t>27/08/2018</a:t>
+              <a:t>28/08/2018</a:t>
             </a:fld>
             <a:endParaRPr lang="en-GB"/>
           </a:p>
@@ -1615,7 +1615,7 @@
           <a:p>
             <a:fld id="{89D09D1E-3207-441C-A9AD-878DAAA5462A}" type="datetimeFigureOut">
               <a:rPr lang="en-GB" smtClean="0"/>
-              <a:t>27/08/2018</a:t>
+              <a:t>28/08/2018</a:t>
             </a:fld>
             <a:endParaRPr lang="en-GB"/>
           </a:p>
@@ -1733,7 +1733,7 @@
           <a:p>
             <a:fld id="{89D09D1E-3207-441C-A9AD-878DAAA5462A}" type="datetimeFigureOut">
               <a:rPr lang="en-GB" smtClean="0"/>
-              <a:t>27/08/2018</a:t>
+              <a:t>28/08/2018</a:t>
             </a:fld>
             <a:endParaRPr lang="en-GB"/>
           </a:p>
@@ -1828,7 +1828,7 @@
           <a:p>
             <a:fld id="{89D09D1E-3207-441C-A9AD-878DAAA5462A}" type="datetimeFigureOut">
               <a:rPr lang="en-GB" smtClean="0"/>
-              <a:t>27/08/2018</a:t>
+              <a:t>28/08/2018</a:t>
             </a:fld>
             <a:endParaRPr lang="en-GB"/>
           </a:p>
@@ -2105,7 +2105,7 @@
           <a:p>
             <a:fld id="{89D09D1E-3207-441C-A9AD-878DAAA5462A}" type="datetimeFigureOut">
               <a:rPr lang="en-GB" smtClean="0"/>
-              <a:t>27/08/2018</a:t>
+              <a:t>28/08/2018</a:t>
             </a:fld>
             <a:endParaRPr lang="en-GB"/>
           </a:p>
@@ -2358,7 +2358,7 @@
           <a:p>
             <a:fld id="{89D09D1E-3207-441C-A9AD-878DAAA5462A}" type="datetimeFigureOut">
               <a:rPr lang="en-GB" smtClean="0"/>
-              <a:t>27/08/2018</a:t>
+              <a:t>28/08/2018</a:t>
             </a:fld>
             <a:endParaRPr lang="en-GB"/>
           </a:p>
@@ -2571,7 +2571,7 @@
           <a:p>
             <a:fld id="{89D09D1E-3207-441C-A9AD-878DAAA5462A}" type="datetimeFigureOut">
               <a:rPr lang="en-GB" smtClean="0"/>
-              <a:t>27/08/2018</a:t>
+              <a:t>28/08/2018</a:t>
             </a:fld>
             <a:endParaRPr lang="en-GB"/>
           </a:p>
@@ -4135,7 +4135,7 @@
       </p:grpSpPr>
       <p:pic>
         <p:nvPicPr>
-          <p:cNvPr id="4" name="Picture 3"/>
+          <p:cNvPr id="3" name="Picture 2"/>
           <p:cNvPicPr>
             <a:picLocks noChangeAspect="1"/>
           </p:cNvPicPr>
@@ -4155,8 +4155,8 @@
         </p:blipFill>
         <p:spPr>
           <a:xfrm>
-            <a:off x="12899" y="0"/>
-            <a:ext cx="12192000" cy="6705600"/>
+            <a:off x="-7444" y="-29277"/>
+            <a:ext cx="12215213" cy="6718367"/>
           </a:xfrm>
           <a:prstGeom prst="rect">
             <a:avLst/>
@@ -4171,7 +4171,7 @@
         </p:nvSpPr>
         <p:spPr>
           <a:xfrm>
-            <a:off x="755650" y="234950"/>
+            <a:off x="788044" y="641806"/>
             <a:ext cx="1047750" cy="369332"/>
           </a:xfrm>
           <a:prstGeom prst="rect">
@@ -4205,8 +4205,8 @@
         </p:nvCxnSpPr>
         <p:spPr>
           <a:xfrm flipH="1">
-            <a:off x="704850" y="495300"/>
-            <a:ext cx="139700" cy="88900"/>
+            <a:off x="800100" y="947405"/>
+            <a:ext cx="66676" cy="128051"/>
           </a:xfrm>
           <a:prstGeom prst="straightConnector1">
             <a:avLst/>
@@ -4241,7 +4241,7 @@
         </p:nvCxnSpPr>
         <p:spPr>
           <a:xfrm>
-            <a:off x="651470" y="2707574"/>
+            <a:off x="777676" y="2757764"/>
             <a:ext cx="8930" cy="1089726"/>
           </a:xfrm>
           <a:prstGeom prst="straightConnector1">
@@ -4277,7 +4277,7 @@
         </p:nvSpPr>
         <p:spPr>
           <a:xfrm>
-            <a:off x="844550" y="4368800"/>
+            <a:off x="949969" y="4439106"/>
             <a:ext cx="2495550" cy="369332"/>
           </a:xfrm>
           <a:prstGeom prst="rect">
@@ -4321,7 +4321,7 @@
         </p:nvCxnSpPr>
         <p:spPr>
           <a:xfrm flipH="1">
-            <a:off x="711200" y="4553466"/>
+            <a:off x="816619" y="4623772"/>
             <a:ext cx="133350" cy="4"/>
           </a:xfrm>
           <a:prstGeom prst="straightConnector1">
@@ -4357,7 +4357,7 @@
         </p:nvSpPr>
         <p:spPr>
           <a:xfrm>
-            <a:off x="686594" y="2964468"/>
+            <a:off x="800100" y="3014658"/>
             <a:ext cx="1804194" cy="523220"/>
           </a:xfrm>
           <a:prstGeom prst="rect">
@@ -4387,8 +4387,8 @@
         </p:nvCxnSpPr>
         <p:spPr>
           <a:xfrm flipH="1">
-            <a:off x="866776" y="3455194"/>
-            <a:ext cx="107155" cy="250031"/>
+            <a:off x="990203" y="3505384"/>
+            <a:ext cx="97235" cy="271273"/>
           </a:xfrm>
           <a:prstGeom prst="straightConnector1">
             <a:avLst/>
@@ -4423,8 +4423,8 @@
         </p:nvCxnSpPr>
         <p:spPr>
           <a:xfrm flipH="1">
-            <a:off x="1042593" y="3451577"/>
-            <a:ext cx="31549" cy="211440"/>
+            <a:off x="1162597" y="3501767"/>
+            <a:ext cx="25052" cy="274890"/>
           </a:xfrm>
           <a:prstGeom prst="straightConnector1">
             <a:avLst/>
@@ -4459,7 +4459,7 @@
         </p:nvSpPr>
         <p:spPr>
           <a:xfrm>
-            <a:off x="2223294" y="3263900"/>
+            <a:off x="2440485" y="3259723"/>
             <a:ext cx="1804194" cy="307777"/>
           </a:xfrm>
           <a:prstGeom prst="rect">
@@ -4475,9 +4475,9 @@
           <a:p>
             <a:r>
               <a:rPr lang="en-GB" sz="1400" dirty="0" smtClean="0"/>
-              <a:t>Very noisy</a:t>
-            </a:r>
-            <a:endParaRPr lang="en-GB" baseline="-25000" dirty="0"/>
+              <a:t>Noisy range</a:t>
+            </a:r>
+            <a:endParaRPr lang="en-GB" sz="1400" dirty="0"/>
           </a:p>
         </p:txBody>
       </p:sp>
@@ -4488,9 +4488,9 @@
           <p:nvPr/>
         </p:nvCxnSpPr>
         <p:spPr>
-          <a:xfrm>
-            <a:off x="2579292" y="3571677"/>
-            <a:ext cx="0" cy="136723"/>
+          <a:xfrm flipH="1">
+            <a:off x="2636789" y="3537878"/>
+            <a:ext cx="42911" cy="182167"/>
           </a:xfrm>
           <a:prstGeom prst="straightConnector1">
             <a:avLst/>
@@ -4570,9 +4570,9 @@
           <p:nvPr/>
         </p:nvCxnSpPr>
         <p:spPr>
-          <a:xfrm flipH="1">
-            <a:off x="1239440" y="3455194"/>
-            <a:ext cx="101" cy="342106"/>
+          <a:xfrm>
+            <a:off x="1353047" y="3501767"/>
+            <a:ext cx="1" cy="358423"/>
           </a:xfrm>
           <a:prstGeom prst="straightConnector1">
             <a:avLst/>
@@ -4602,15 +4602,13 @@
       <p:cxnSp>
         <p:nvCxnSpPr>
           <p:cNvPr id="32" name="Straight Arrow Connector 31"/>
-          <p:cNvCxnSpPr>
-            <a:stCxn id="18" idx="2"/>
-          </p:cNvCxnSpPr>
+          <p:cNvCxnSpPr/>
           <p:nvPr/>
         </p:nvCxnSpPr>
         <p:spPr>
           <a:xfrm>
-            <a:off x="1588691" y="3487688"/>
-            <a:ext cx="6747" cy="416024"/>
+            <a:off x="1709046" y="3498454"/>
+            <a:ext cx="0" cy="443182"/>
           </a:xfrm>
           <a:prstGeom prst="straightConnector1">
             <a:avLst/>
@@ -4645,7 +4643,7 @@
         </p:nvSpPr>
         <p:spPr>
           <a:xfrm>
-            <a:off x="504124" y="2323068"/>
+            <a:off x="617630" y="2373258"/>
             <a:ext cx="2495550" cy="369332"/>
           </a:xfrm>
           <a:prstGeom prst="rect">
@@ -4717,7 +4715,7 @@
         </p:nvCxnSpPr>
         <p:spPr>
           <a:xfrm>
-            <a:off x="9339943" y="5572273"/>
+            <a:off x="9365343" y="5546873"/>
             <a:ext cx="0" cy="454454"/>
           </a:xfrm>
           <a:prstGeom prst="straightConnector1">
@@ -4753,7 +4751,7 @@
         </p:nvSpPr>
         <p:spPr>
           <a:xfrm>
-            <a:off x="704850" y="1108730"/>
+            <a:off x="800100" y="1134130"/>
             <a:ext cx="1804194" cy="523220"/>
           </a:xfrm>
           <a:prstGeom prst="rect">
@@ -4783,7 +4781,7 @@
         </p:nvCxnSpPr>
         <p:spPr>
           <a:xfrm flipH="1">
-            <a:off x="1064023" y="1587885"/>
+            <a:off x="1159273" y="1613285"/>
             <a:ext cx="31550" cy="243296"/>
           </a:xfrm>
           <a:prstGeom prst="straightConnector1">
@@ -4819,7 +4817,7 @@
         </p:nvCxnSpPr>
         <p:spPr>
           <a:xfrm flipH="1">
-            <a:off x="1252538" y="1585504"/>
+            <a:off x="1347788" y="1610904"/>
             <a:ext cx="2082" cy="304791"/>
           </a:xfrm>
           <a:prstGeom prst="straightConnector1">
@@ -4855,7 +4853,7 @@
         </p:nvCxnSpPr>
         <p:spPr>
           <a:xfrm>
-            <a:off x="1433512" y="1587885"/>
+            <a:off x="1528762" y="1613285"/>
             <a:ext cx="4763" cy="252076"/>
           </a:xfrm>
           <a:prstGeom prst="straightConnector1">
@@ -4891,7 +4889,7 @@
         </p:nvCxnSpPr>
         <p:spPr>
           <a:xfrm>
-            <a:off x="1712119" y="1585504"/>
+            <a:off x="1807369" y="1610904"/>
             <a:ext cx="90189" cy="279015"/>
           </a:xfrm>
           <a:prstGeom prst="straightConnector1">
@@ -6155,7 +6153,7 @@
       </p:grpSpPr>
       <p:pic>
         <p:nvPicPr>
-          <p:cNvPr id="4" name="Picture 3"/>
+          <p:cNvPr id="41" name="Picture 40"/>
           <p:cNvPicPr>
             <a:picLocks noChangeAspect="1"/>
           </p:cNvPicPr>
@@ -6175,7 +6173,7 @@
         </p:blipFill>
         <p:spPr>
           <a:xfrm>
-            <a:off x="0" y="381000"/>
+            <a:off x="0" y="380999"/>
             <a:ext cx="12192000" cy="6096000"/>
           </a:xfrm>
           <a:prstGeom prst="rect">
@@ -6327,7 +6325,7 @@
         </p:nvSpPr>
         <p:spPr>
           <a:xfrm>
-            <a:off x="3714998" y="4784067"/>
+            <a:off x="3720936" y="4547512"/>
             <a:ext cx="1252847" cy="430887"/>
           </a:xfrm>
           <a:prstGeom prst="rect">
@@ -6359,8 +6357,8 @@
         </p:nvCxnSpPr>
         <p:spPr>
           <a:xfrm flipH="1">
-            <a:off x="3212276" y="5214954"/>
-            <a:ext cx="1129146" cy="330823"/>
+            <a:off x="3224151" y="4978399"/>
+            <a:ext cx="1123209" cy="583888"/>
           </a:xfrm>
           <a:prstGeom prst="straightConnector1">
             <a:avLst/>
@@ -6395,8 +6393,8 @@
         </p:nvSpPr>
         <p:spPr>
           <a:xfrm>
-            <a:off x="5418118" y="3744973"/>
-            <a:ext cx="769917" cy="261610"/>
+            <a:off x="5182712" y="3899754"/>
+            <a:ext cx="769917" cy="430887"/>
           </a:xfrm>
           <a:prstGeom prst="rect">
             <a:avLst/>
@@ -6409,9 +6407,14 @@
           </a:bodyPr>
           <a:lstStyle/>
           <a:p>
+            <a:pPr algn="ctr"/>
             <a:r>
               <a:rPr lang="en-GB" sz="1100" dirty="0" smtClean="0"/>
-              <a:t>Time data</a:t>
+              <a:t>Time </a:t>
+            </a:r>
+            <a:r>
+              <a:rPr lang="en-GB" sz="1100" dirty="0" smtClean="0"/>
+              <a:t>domain</a:t>
             </a:r>
             <a:endParaRPr lang="en-GB" sz="1100" dirty="0"/>
           </a:p>
@@ -6420,15 +6423,13 @@
       <p:cxnSp>
         <p:nvCxnSpPr>
           <p:cNvPr id="18" name="Straight Arrow Connector 17"/>
-          <p:cNvCxnSpPr>
-            <a:stCxn id="17" idx="2"/>
-          </p:cNvCxnSpPr>
+          <p:cNvCxnSpPr/>
           <p:nvPr/>
         </p:nvCxnSpPr>
         <p:spPr>
           <a:xfrm>
-            <a:off x="5803077" y="4006583"/>
-            <a:ext cx="384958" cy="310098"/>
+            <a:off x="5738873" y="4115197"/>
+            <a:ext cx="404876" cy="201484"/>
           </a:xfrm>
           <a:prstGeom prst="straightConnector1">
             <a:avLst/>
@@ -6463,8 +6464,8 @@
         </p:nvSpPr>
         <p:spPr>
           <a:xfrm>
-            <a:off x="5832273" y="3507492"/>
-            <a:ext cx="1317170" cy="261610"/>
+            <a:off x="6379991" y="3754676"/>
+            <a:ext cx="1618629" cy="261610"/>
           </a:xfrm>
           <a:prstGeom prst="rect">
             <a:avLst/>
@@ -6480,7 +6481,11 @@
             <a:pPr algn="ctr"/>
             <a:r>
               <a:rPr lang="en-GB" sz="1100" dirty="0" smtClean="0"/>
-              <a:t>FFT, processing</a:t>
+              <a:t>FFT, </a:t>
+            </a:r>
+            <a:r>
+              <a:rPr lang="en-GB" sz="1100" dirty="0" smtClean="0"/>
+              <a:t>Frequency domain</a:t>
             </a:r>
             <a:endParaRPr lang="en-GB" sz="1100" dirty="0"/>
           </a:p>
@@ -6494,8 +6499,8 @@
         </p:nvCxnSpPr>
         <p:spPr>
           <a:xfrm flipH="1">
-            <a:off x="6367156" y="3769102"/>
-            <a:ext cx="15088" cy="533911"/>
+            <a:off x="6379991" y="3974306"/>
+            <a:ext cx="197441" cy="307182"/>
           </a:xfrm>
           <a:prstGeom prst="straightConnector1">
             <a:avLst/>
@@ -6530,7 +6535,7 @@
         </p:nvSpPr>
         <p:spPr>
           <a:xfrm>
-            <a:off x="6651173" y="4056818"/>
+            <a:off x="6634673" y="3997823"/>
             <a:ext cx="943097" cy="261610"/>
           </a:xfrm>
           <a:prstGeom prst="rect">
@@ -6560,8 +6565,8 @@
         </p:nvCxnSpPr>
         <p:spPr>
           <a:xfrm flipH="1">
-            <a:off x="6472052" y="4237364"/>
-            <a:ext cx="276595" cy="131299"/>
+            <a:off x="6456853" y="4150289"/>
+            <a:ext cx="256010" cy="209780"/>
           </a:xfrm>
           <a:prstGeom prst="straightConnector1">
             <a:avLst/>
@@ -6662,8 +6667,8 @@
         </p:nvSpPr>
         <p:spPr>
           <a:xfrm>
-            <a:off x="1551708" y="1521176"/>
-            <a:ext cx="2003468" cy="430887"/>
+            <a:off x="774207" y="1458536"/>
+            <a:ext cx="1178871" cy="600164"/>
           </a:xfrm>
           <a:prstGeom prst="rect">
             <a:avLst/>
@@ -6692,8 +6697,8 @@
         </p:nvCxnSpPr>
         <p:spPr>
           <a:xfrm>
-            <a:off x="2422566" y="1952063"/>
-            <a:ext cx="145474" cy="221121"/>
+            <a:off x="1355687" y="2026001"/>
+            <a:ext cx="15913" cy="202849"/>
           </a:xfrm>
           <a:prstGeom prst="straightConnector1">
             <a:avLst/>
@@ -6728,7 +6733,7 @@
         </p:nvSpPr>
         <p:spPr>
           <a:xfrm>
-            <a:off x="6400799" y="2665718"/>
+            <a:off x="5569529" y="1379671"/>
             <a:ext cx="2163288" cy="430887"/>
           </a:xfrm>
           <a:prstGeom prst="rect">
@@ -6755,14 +6760,231 @@
         <p:nvCxnSpPr>
           <p:cNvPr id="54" name="Straight Arrow Connector 53"/>
           <p:cNvCxnSpPr>
-            <a:stCxn id="53" idx="0"/>
+            <a:stCxn id="53" idx="2"/>
           </p:cNvCxnSpPr>
           <p:nvPr/>
         </p:nvCxnSpPr>
         <p:spPr>
-          <a:xfrm flipV="1">
-            <a:off x="7482443" y="2262291"/>
-            <a:ext cx="5691" cy="403427"/>
+          <a:xfrm>
+            <a:off x="6651173" y="1810558"/>
+            <a:ext cx="194127" cy="362626"/>
+          </a:xfrm>
+          <a:prstGeom prst="straightConnector1">
+            <a:avLst/>
+          </a:prstGeom>
+          <a:ln w="19050">
+            <a:solidFill>
+              <a:schemeClr val="tx1"/>
+            </a:solidFill>
+            <a:tailEnd type="triangle"/>
+          </a:ln>
+        </p:spPr>
+        <p:style>
+          <a:lnRef idx="1">
+            <a:schemeClr val="accent1"/>
+          </a:lnRef>
+          <a:fillRef idx="0">
+            <a:schemeClr val="accent1"/>
+          </a:fillRef>
+          <a:effectRef idx="0">
+            <a:schemeClr val="accent1"/>
+          </a:effectRef>
+          <a:fontRef idx="minor">
+            <a:schemeClr val="tx1"/>
+          </a:fontRef>
+        </p:style>
+      </p:cxnSp>
+      <p:sp>
+        <p:nvSpPr>
+          <p:cNvPr id="10" name="Left Brace 9"/>
+          <p:cNvSpPr/>
+          <p:nvPr/>
+        </p:nvSpPr>
+        <p:spPr>
+          <a:xfrm rot="16200000">
+            <a:off x="7195852" y="1964298"/>
+            <a:ext cx="143446" cy="1136650"/>
+          </a:xfrm>
+          <a:prstGeom prst="leftBrace">
+            <a:avLst/>
+          </a:prstGeom>
+          <a:ln w="19050">
+            <a:solidFill>
+              <a:schemeClr val="tx1"/>
+            </a:solidFill>
+            <a:headEnd type="none" w="med" len="med"/>
+            <a:tailEnd type="none" w="med" len="med"/>
+          </a:ln>
+        </p:spPr>
+        <p:style>
+          <a:lnRef idx="1">
+            <a:schemeClr val="accent1"/>
+          </a:lnRef>
+          <a:fillRef idx="0">
+            <a:schemeClr val="accent1"/>
+          </a:fillRef>
+          <a:effectRef idx="0">
+            <a:schemeClr val="accent1"/>
+          </a:effectRef>
+          <a:fontRef idx="minor">
+            <a:schemeClr val="tx1"/>
+          </a:fontRef>
+        </p:style>
+        <p:txBody>
+          <a:bodyPr rtlCol="0" anchor="ctr"/>
+          <a:lstStyle/>
+          <a:p>
+            <a:pPr algn="ctr"/>
+            <a:endParaRPr lang="en-GB"/>
+          </a:p>
+        </p:txBody>
+      </p:sp>
+      <p:sp>
+        <p:nvSpPr>
+          <p:cNvPr id="25" name="TextBox 24"/>
+          <p:cNvSpPr txBox="1"/>
+          <p:nvPr/>
+        </p:nvSpPr>
+        <p:spPr>
+          <a:xfrm>
+            <a:off x="6185931" y="2680514"/>
+            <a:ext cx="2163288" cy="261610"/>
+          </a:xfrm>
+          <a:prstGeom prst="rect">
+            <a:avLst/>
+          </a:prstGeom>
+          <a:noFill/>
+        </p:spPr>
+        <p:txBody>
+          <a:bodyPr wrap="square" rtlCol="0">
+            <a:spAutoFit/>
+          </a:bodyPr>
+          <a:lstStyle/>
+          <a:p>
+            <a:pPr algn="ctr"/>
+            <a:r>
+              <a:rPr lang="en-GB" sz="1100" dirty="0" smtClean="0"/>
+              <a:t>Exits </a:t>
+            </a:r>
+            <a:r>
+              <a:rPr lang="en-GB" sz="1100" smtClean="0"/>
+              <a:t>LPM0 during </a:t>
+            </a:r>
+            <a:r>
+              <a:rPr lang="en-GB" sz="1100" dirty="0" smtClean="0"/>
+              <a:t>read from ADC</a:t>
+            </a:r>
+            <a:endParaRPr lang="en-GB" sz="1100" dirty="0"/>
+          </a:p>
+        </p:txBody>
+      </p:sp>
+      <p:sp>
+        <p:nvSpPr>
+          <p:cNvPr id="26" name="TextBox 25"/>
+          <p:cNvSpPr txBox="1"/>
+          <p:nvPr/>
+        </p:nvSpPr>
+        <p:spPr>
+          <a:xfrm>
+            <a:off x="8743211" y="1810558"/>
+            <a:ext cx="2335312" cy="261610"/>
+          </a:xfrm>
+          <a:prstGeom prst="rect">
+            <a:avLst/>
+          </a:prstGeom>
+          <a:noFill/>
+        </p:spPr>
+        <p:txBody>
+          <a:bodyPr wrap="square" rtlCol="0">
+            <a:spAutoFit/>
+          </a:bodyPr>
+          <a:lstStyle/>
+          <a:p>
+            <a:pPr algn="ctr"/>
+            <a:r>
+              <a:rPr lang="en-GB" sz="1100" dirty="0" smtClean="0"/>
+              <a:t>Returns to LPM0 after transmission</a:t>
+            </a:r>
+            <a:endParaRPr lang="en-GB" sz="1100" dirty="0"/>
+          </a:p>
+        </p:txBody>
+      </p:sp>
+      <p:cxnSp>
+        <p:nvCxnSpPr>
+          <p:cNvPr id="27" name="Straight Arrow Connector 26"/>
+          <p:cNvCxnSpPr/>
+          <p:nvPr/>
+        </p:nvCxnSpPr>
+        <p:spPr>
+          <a:xfrm flipH="1">
+            <a:off x="8667750" y="2072443"/>
+            <a:ext cx="443018" cy="460179"/>
+          </a:xfrm>
+          <a:prstGeom prst="straightConnector1">
+            <a:avLst/>
+          </a:prstGeom>
+          <a:ln w="19050">
+            <a:solidFill>
+              <a:schemeClr val="tx1"/>
+            </a:solidFill>
+            <a:tailEnd type="triangle"/>
+          </a:ln>
+        </p:spPr>
+        <p:style>
+          <a:lnRef idx="1">
+            <a:schemeClr val="accent1"/>
+          </a:lnRef>
+          <a:fillRef idx="0">
+            <a:schemeClr val="accent1"/>
+          </a:fillRef>
+          <a:effectRef idx="0">
+            <a:schemeClr val="accent1"/>
+          </a:effectRef>
+          <a:fontRef idx="minor">
+            <a:schemeClr val="tx1"/>
+          </a:fontRef>
+        </p:style>
+      </p:cxnSp>
+      <p:sp>
+        <p:nvSpPr>
+          <p:cNvPr id="35" name="TextBox 34"/>
+          <p:cNvSpPr txBox="1"/>
+          <p:nvPr/>
+        </p:nvSpPr>
+        <p:spPr>
+          <a:xfrm>
+            <a:off x="5585981" y="3654676"/>
+            <a:ext cx="943097" cy="261610"/>
+          </a:xfrm>
+          <a:prstGeom prst="rect">
+            <a:avLst/>
+          </a:prstGeom>
+          <a:noFill/>
+        </p:spPr>
+        <p:txBody>
+          <a:bodyPr wrap="square" rtlCol="0">
+            <a:spAutoFit/>
+          </a:bodyPr>
+          <a:lstStyle/>
+          <a:p>
+            <a:r>
+              <a:rPr lang="en-GB" sz="1100" dirty="0" smtClean="0"/>
+              <a:t>Transmission</a:t>
+            </a:r>
+            <a:endParaRPr lang="en-GB" sz="1100" dirty="0"/>
+          </a:p>
+        </p:txBody>
+      </p:sp>
+      <p:cxnSp>
+        <p:nvCxnSpPr>
+          <p:cNvPr id="38" name="Straight Arrow Connector 37"/>
+          <p:cNvCxnSpPr/>
+          <p:nvPr/>
+        </p:nvCxnSpPr>
+        <p:spPr>
+          <a:xfrm>
+            <a:off x="6090205" y="3880669"/>
+            <a:ext cx="165339" cy="449972"/>
           </a:xfrm>
           <a:prstGeom prst="straightConnector1">
             <a:avLst/>

</xml_diff>